<commit_message>
Addition to presentation slide
</commit_message>
<xml_diff>
--- a/PresentationSlide.pptx
+++ b/PresentationSlide.pptx
@@ -6,6 +6,8 @@
   </p:sldMasterIdLst>
   <p:sldIdLst>
     <p:sldId id="256" r:id="rId2"/>
+    <p:sldId id="257" r:id="rId3"/>
+    <p:sldId id="258" r:id="rId4"/>
   </p:sldIdLst>
   <p:sldSz cx="12192000" cy="6858000"/>
   <p:notesSz cx="6858000" cy="9144000"/>
@@ -6816,6 +6818,626 @@
 </p:sld>
 </file>
 
+<file path=ppt/slides/slide2.xml><?xml version="1.0" encoding="utf-8"?>
+<p:sld xmlns:a="http://schemas.openxmlformats.org/drawingml/2006/main" xmlns:r="http://schemas.openxmlformats.org/officeDocument/2006/relationships" xmlns:p="http://schemas.openxmlformats.org/presentationml/2006/main">
+  <p:cSld>
+    <p:spTree>
+      <p:nvGrpSpPr>
+        <p:cNvPr id="1" name=""/>
+        <p:cNvGrpSpPr/>
+        <p:nvPr/>
+      </p:nvGrpSpPr>
+      <p:grpSpPr>
+        <a:xfrm>
+          <a:off x="0" y="0"/>
+          <a:ext cx="0" cy="0"/>
+          <a:chOff x="0" y="0"/>
+          <a:chExt cx="0" cy="0"/>
+        </a:xfrm>
+      </p:grpSpPr>
+      <p:pic>
+        <p:nvPicPr>
+          <p:cNvPr id="5" name="Picture 4">
+            <a:extLst>
+              <a:ext uri="{FF2B5EF4-FFF2-40B4-BE49-F238E27FC236}">
+                <a16:creationId xmlns:a16="http://schemas.microsoft.com/office/drawing/2014/main" id="{1DAB94B4-442E-41D7-B730-2434C6C9E5EC}"/>
+              </a:ext>
+            </a:extLst>
+          </p:cNvPr>
+          <p:cNvPicPr>
+            <a:picLocks noChangeAspect="1"/>
+          </p:cNvPicPr>
+          <p:nvPr/>
+        </p:nvPicPr>
+        <p:blipFill>
+          <a:blip r:embed="rId2">
+            <a:extLst>
+              <a:ext uri="{28A0092B-C50C-407E-A947-70E740481C1C}">
+                <a14:useLocalDpi xmlns:a14="http://schemas.microsoft.com/office/drawing/2010/main" val="0"/>
+              </a:ext>
+            </a:extLst>
+          </a:blip>
+          <a:stretch>
+            <a:fillRect/>
+          </a:stretch>
+        </p:blipFill>
+        <p:spPr>
+          <a:xfrm>
+            <a:off x="250279" y="57523"/>
+            <a:ext cx="5964991" cy="2873686"/>
+          </a:xfrm>
+          <a:prstGeom prst="rect">
+            <a:avLst/>
+          </a:prstGeom>
+        </p:spPr>
+      </p:pic>
+      <p:sp>
+        <p:nvSpPr>
+          <p:cNvPr id="6" name="TextBox 5">
+            <a:extLst>
+              <a:ext uri="{FF2B5EF4-FFF2-40B4-BE49-F238E27FC236}">
+                <a16:creationId xmlns:a16="http://schemas.microsoft.com/office/drawing/2014/main" id="{93AB5F2C-0613-4ABF-92BC-C55856493303}"/>
+              </a:ext>
+            </a:extLst>
+          </p:cNvPr>
+          <p:cNvSpPr txBox="1"/>
+          <p:nvPr/>
+        </p:nvSpPr>
+        <p:spPr>
+          <a:xfrm>
+            <a:off x="5976730" y="162061"/>
+            <a:ext cx="5964991" cy="6370975"/>
+          </a:xfrm>
+          <a:prstGeom prst="rect">
+            <a:avLst/>
+          </a:prstGeom>
+          <a:solidFill>
+            <a:schemeClr val="bg1">
+              <a:lumMod val="85000"/>
+            </a:schemeClr>
+          </a:solidFill>
+        </p:spPr>
+        <p:txBody>
+          <a:bodyPr wrap="square" rtlCol="0">
+            <a:spAutoFit/>
+          </a:bodyPr>
+          <a:lstStyle/>
+          <a:p>
+            <a:r>
+              <a:rPr lang="en-US" sz="1200" b="1" dirty="0"/>
+              <a:t>The RECS survey data consisted of 500+ variables collected across housing characteristics, appliances used, fuel types, annual consumption and cost of consumption.</a:t>
+            </a:r>
+          </a:p>
+          <a:p>
+            <a:endParaRPr lang="en-US" sz="1200" b="1" dirty="0"/>
+          </a:p>
+          <a:p>
+            <a:r>
+              <a:rPr lang="en-US" sz="1200" b="1" dirty="0">
+                <a:highlight>
+                  <a:srgbClr val="FFFF00"/>
+                </a:highlight>
+              </a:rPr>
+              <a:t>Data Exploration</a:t>
+            </a:r>
+            <a:r>
+              <a:rPr lang="en-US" sz="1200" b="1" dirty="0"/>
+              <a:t> </a:t>
+            </a:r>
+            <a:r>
+              <a:rPr lang="en-US" sz="1200" dirty="0"/>
+              <a:t>of RECS data entailed</a:t>
+            </a:r>
+          </a:p>
+          <a:p>
+            <a:pPr marL="342900" indent="-342900">
+              <a:buAutoNum type="arabicPeriod"/>
+            </a:pPr>
+            <a:r>
+              <a:rPr lang="en-US" sz="1200" dirty="0"/>
+              <a:t>Identification &amp; classification of data features (e.g., categorical, numerical, independent / predictors and dependent / output variables)</a:t>
+            </a:r>
+          </a:p>
+          <a:p>
+            <a:pPr marL="342900" indent="-342900">
+              <a:buAutoNum type="arabicPeriod"/>
+            </a:pPr>
+            <a:r>
+              <a:rPr lang="en-US" sz="1200" dirty="0"/>
+              <a:t>Obtain Missing, duplicate and redundant values.</a:t>
+            </a:r>
+          </a:p>
+          <a:p>
+            <a:pPr marL="342900" indent="-342900">
+              <a:buAutoNum type="arabicPeriod"/>
+            </a:pPr>
+            <a:r>
+              <a:rPr lang="en-US" sz="1200" dirty="0"/>
+              <a:t>Understand distribution of data using violin plots</a:t>
+            </a:r>
+          </a:p>
+          <a:p>
+            <a:pPr marL="342900" indent="-342900">
+              <a:buAutoNum type="arabicPeriod"/>
+            </a:pPr>
+            <a:r>
+              <a:rPr lang="en-US" sz="1200" dirty="0"/>
+              <a:t>Early identification of correlation using spearman method</a:t>
+            </a:r>
+          </a:p>
+          <a:p>
+            <a:pPr marL="342900" indent="-342900">
+              <a:buAutoNum type="arabicPeriod"/>
+            </a:pPr>
+            <a:r>
+              <a:rPr lang="en-US" sz="1200" dirty="0"/>
+              <a:t>Possible data roll-ups to reduce predictor dimension</a:t>
+            </a:r>
+          </a:p>
+          <a:p>
+            <a:pPr marL="342900" indent="-342900">
+              <a:buAutoNum type="arabicPeriod"/>
+            </a:pPr>
+            <a:endParaRPr lang="en-US" sz="1200" dirty="0"/>
+          </a:p>
+          <a:p>
+            <a:r>
+              <a:rPr lang="en-US" sz="1200" dirty="0">
+                <a:highlight>
+                  <a:srgbClr val="FFFF00"/>
+                </a:highlight>
+              </a:rPr>
+              <a:t>Data Merging &amp; Transformation</a:t>
+            </a:r>
+            <a:r>
+              <a:rPr lang="en-US" sz="1200" dirty="0"/>
+              <a:t> focused on creating a combined dataset of all the years (2001, 2009 and 2015) with  all the required columns.</a:t>
+            </a:r>
+          </a:p>
+          <a:p>
+            <a:endParaRPr lang="en-US" sz="1200" dirty="0"/>
+          </a:p>
+          <a:p>
+            <a:r>
+              <a:rPr lang="en-US" sz="1200" dirty="0"/>
+              <a:t>Rules employed for transformation:</a:t>
+            </a:r>
+          </a:p>
+          <a:p>
+            <a:pPr marL="342900" indent="-342900">
+              <a:buAutoNum type="arabicPeriod"/>
+            </a:pPr>
+            <a:r>
+              <a:rPr lang="en-US" sz="1200" dirty="0"/>
+              <a:t>All columns starting with "Z" is dropped as they are only informational columns</a:t>
+            </a:r>
+          </a:p>
+          <a:p>
+            <a:pPr marL="342900" indent="-342900">
+              <a:buAutoNum type="arabicPeriod"/>
+            </a:pPr>
+            <a:r>
+              <a:rPr lang="en-US" sz="1200" dirty="0"/>
+              <a:t>Categorical values like </a:t>
+            </a:r>
+            <a:r>
+              <a:rPr lang="en-US" sz="1200" dirty="0" err="1"/>
+              <a:t>YearMade</a:t>
+            </a:r>
+            <a:r>
+              <a:rPr lang="en-US" sz="1200" dirty="0"/>
+              <a:t> were converted to same standards across years</a:t>
+            </a:r>
+          </a:p>
+          <a:p>
+            <a:pPr marL="342900" indent="-342900">
+              <a:buAutoNum type="arabicPeriod"/>
+            </a:pPr>
+            <a:r>
+              <a:rPr lang="en-US" sz="1200" dirty="0"/>
+              <a:t>1997 and 2005 years data dropped owing skewness and high number of missing predictors</a:t>
+            </a:r>
+          </a:p>
+          <a:p>
+            <a:pPr marL="342900" indent="-342900">
+              <a:buAutoNum type="arabicPeriod"/>
+            </a:pPr>
+            <a:r>
+              <a:rPr lang="en-US" sz="1200" dirty="0"/>
+              <a:t>Grouping of electronic appliances into 3 categories TVREL, PCOFFEQUIP, PHONE</a:t>
+            </a:r>
+          </a:p>
+          <a:p>
+            <a:pPr marL="342900" indent="-342900">
+              <a:buAutoNum type="arabicPeriod"/>
+            </a:pPr>
+            <a:r>
+              <a:rPr lang="en-US" sz="1200" dirty="0"/>
+              <a:t>Single unit (BTU) for energy consumption</a:t>
+            </a:r>
+          </a:p>
+          <a:p>
+            <a:pPr marL="342900" indent="-342900">
+              <a:buAutoNum type="arabicPeriod"/>
+            </a:pPr>
+            <a:r>
+              <a:rPr lang="en-US" sz="1200" dirty="0"/>
+              <a:t>Addition of new columns (e.g., Country) for visualization</a:t>
+            </a:r>
+          </a:p>
+          <a:p>
+            <a:pPr marL="342900" indent="-342900">
+              <a:buAutoNum type="arabicPeriod"/>
+            </a:pPr>
+            <a:r>
+              <a:rPr lang="en-US" sz="1200" dirty="0"/>
+              <a:t>New calculated fields esp. for TOTAL BTU and TOTAL DOLLAR</a:t>
+            </a:r>
+          </a:p>
+          <a:p>
+            <a:pPr marL="342900" indent="-342900">
+              <a:buAutoNum type="arabicPeriod"/>
+            </a:pPr>
+            <a:endParaRPr lang="en-US" sz="1200" dirty="0"/>
+          </a:p>
+          <a:p>
+            <a:r>
+              <a:rPr lang="en-US" sz="1200" dirty="0"/>
+              <a:t>MISSING VALUES TREATMENT : </a:t>
+            </a:r>
+          </a:p>
+          <a:p>
+            <a:pPr marL="285750" indent="-285750">
+              <a:buFontTx/>
+              <a:buChar char="-"/>
+            </a:pPr>
+            <a:r>
+              <a:rPr lang="en-US" sz="1200" dirty="0"/>
+              <a:t>Categorical values – Mode used to fill missing values</a:t>
+            </a:r>
+          </a:p>
+          <a:p>
+            <a:pPr marL="285750" indent="-285750">
+              <a:buFontTx/>
+              <a:buChar char="-"/>
+            </a:pPr>
+            <a:r>
+              <a:rPr lang="en-US" sz="1200" dirty="0"/>
+              <a:t>Numerical values – median used to fill missing values</a:t>
+            </a:r>
+          </a:p>
+          <a:p>
+            <a:endParaRPr lang="en-US" sz="1200" dirty="0"/>
+          </a:p>
+          <a:p>
+            <a:r>
+              <a:rPr lang="en-US" sz="1200" dirty="0"/>
+              <a:t>OUTLIER TREATMENT:</a:t>
+            </a:r>
+          </a:p>
+          <a:p>
+            <a:pPr marL="285750" indent="-285750">
+              <a:buFontTx/>
+              <a:buChar char="-"/>
+            </a:pPr>
+            <a:r>
+              <a:rPr lang="en-US" sz="1200" dirty="0"/>
+              <a:t>Using Box plots, outlier were identified and dropped for Total BTU (&gt; 210000) and Total Dollar (&gt; 4000) columns. </a:t>
+            </a:r>
+          </a:p>
+        </p:txBody>
+      </p:sp>
+      <p:pic>
+        <p:nvPicPr>
+          <p:cNvPr id="11" name="Picture 10">
+            <a:extLst>
+              <a:ext uri="{FF2B5EF4-FFF2-40B4-BE49-F238E27FC236}">
+                <a16:creationId xmlns:a16="http://schemas.microsoft.com/office/drawing/2014/main" id="{D09FC2A0-DF35-4C40-9D61-86AE89009AD2}"/>
+              </a:ext>
+            </a:extLst>
+          </p:cNvPr>
+          <p:cNvPicPr>
+            <a:picLocks noChangeAspect="1"/>
+          </p:cNvPicPr>
+          <p:nvPr/>
+        </p:nvPicPr>
+        <p:blipFill>
+          <a:blip r:embed="rId3"/>
+          <a:stretch>
+            <a:fillRect/>
+          </a:stretch>
+        </p:blipFill>
+        <p:spPr>
+          <a:xfrm>
+            <a:off x="229358" y="3190353"/>
+            <a:ext cx="5747372" cy="2873686"/>
+          </a:xfrm>
+          <a:prstGeom prst="rect">
+            <a:avLst/>
+          </a:prstGeom>
+        </p:spPr>
+      </p:pic>
+    </p:spTree>
+    <p:extLst>
+      <p:ext uri="{BB962C8B-B14F-4D97-AF65-F5344CB8AC3E}">
+        <p14:creationId xmlns:p14="http://schemas.microsoft.com/office/powerpoint/2010/main" val="3204843970"/>
+      </p:ext>
+    </p:extLst>
+  </p:cSld>
+  <p:clrMapOvr>
+    <a:masterClrMapping/>
+  </p:clrMapOvr>
+</p:sld>
+</file>
+
+<file path=ppt/slides/slide3.xml><?xml version="1.0" encoding="utf-8"?>
+<p:sld xmlns:a="http://schemas.openxmlformats.org/drawingml/2006/main" xmlns:r="http://schemas.openxmlformats.org/officeDocument/2006/relationships" xmlns:p="http://schemas.openxmlformats.org/presentationml/2006/main">
+  <p:cSld>
+    <p:spTree>
+      <p:nvGrpSpPr>
+        <p:cNvPr id="1" name=""/>
+        <p:cNvGrpSpPr/>
+        <p:nvPr/>
+      </p:nvGrpSpPr>
+      <p:grpSpPr>
+        <a:xfrm>
+          <a:off x="0" y="0"/>
+          <a:ext cx="0" cy="0"/>
+          <a:chOff x="0" y="0"/>
+          <a:chExt cx="0" cy="0"/>
+        </a:xfrm>
+      </p:grpSpPr>
+      <p:sp>
+        <p:nvSpPr>
+          <p:cNvPr id="2" name="Title 1">
+            <a:extLst>
+              <a:ext uri="{FF2B5EF4-FFF2-40B4-BE49-F238E27FC236}">
+                <a16:creationId xmlns:a16="http://schemas.microsoft.com/office/drawing/2014/main" id="{3CAD7160-D67E-4748-A815-B0FE9C388269}"/>
+              </a:ext>
+            </a:extLst>
+          </p:cNvPr>
+          <p:cNvSpPr>
+            <a:spLocks noGrp="1"/>
+          </p:cNvSpPr>
+          <p:nvPr>
+            <p:ph type="title"/>
+          </p:nvPr>
+        </p:nvSpPr>
+        <p:spPr>
+          <a:xfrm>
+            <a:off x="1127464" y="470517"/>
+            <a:ext cx="3116062" cy="435005"/>
+          </a:xfrm>
+        </p:spPr>
+        <p:txBody>
+          <a:bodyPr/>
+          <a:lstStyle/>
+          <a:p>
+            <a:r>
+              <a:rPr lang="en-US" dirty="0"/>
+              <a:t>Feature Selector </a:t>
+            </a:r>
+          </a:p>
+        </p:txBody>
+      </p:sp>
+      <p:pic>
+        <p:nvPicPr>
+          <p:cNvPr id="6" name="Content Placeholder 5">
+            <a:extLst>
+              <a:ext uri="{FF2B5EF4-FFF2-40B4-BE49-F238E27FC236}">
+                <a16:creationId xmlns:a16="http://schemas.microsoft.com/office/drawing/2014/main" id="{17023D77-B482-4B49-B5A9-F25757355299}"/>
+              </a:ext>
+            </a:extLst>
+          </p:cNvPr>
+          <p:cNvPicPr>
+            <a:picLocks noGrp="1" noChangeAspect="1"/>
+          </p:cNvPicPr>
+          <p:nvPr>
+            <p:ph idx="1"/>
+          </p:nvPr>
+        </p:nvPicPr>
+        <p:blipFill>
+          <a:blip r:embed="rId2">
+            <a:extLst>
+              <a:ext uri="{28A0092B-C50C-407E-A947-70E740481C1C}">
+                <a14:useLocalDpi xmlns:a14="http://schemas.microsoft.com/office/drawing/2010/main" val="0"/>
+              </a:ext>
+            </a:extLst>
+          </a:blip>
+          <a:stretch>
+            <a:fillRect/>
+          </a:stretch>
+        </p:blipFill>
+        <p:spPr>
+          <a:xfrm>
+            <a:off x="4580407" y="0"/>
+            <a:ext cx="4589533" cy="2707689"/>
+          </a:xfrm>
+        </p:spPr>
+      </p:pic>
+      <p:sp>
+        <p:nvSpPr>
+          <p:cNvPr id="4" name="Text Placeholder 3">
+            <a:extLst>
+              <a:ext uri="{FF2B5EF4-FFF2-40B4-BE49-F238E27FC236}">
+                <a16:creationId xmlns:a16="http://schemas.microsoft.com/office/drawing/2014/main" id="{29811666-DECA-4FA8-A52E-92102B594DEC}"/>
+              </a:ext>
+            </a:extLst>
+          </p:cNvPr>
+          <p:cNvSpPr>
+            <a:spLocks noGrp="1"/>
+          </p:cNvSpPr>
+          <p:nvPr>
+            <p:ph type="body" sz="half" idx="2"/>
+          </p:nvPr>
+        </p:nvSpPr>
+        <p:spPr>
+          <a:xfrm>
+            <a:off x="677336" y="1012055"/>
+            <a:ext cx="3770378" cy="2849731"/>
+          </a:xfrm>
+        </p:spPr>
+        <p:txBody>
+          <a:bodyPr>
+            <a:normAutofit fontScale="40000" lnSpcReduction="20000"/>
+          </a:bodyPr>
+          <a:lstStyle/>
+          <a:p>
+            <a:r>
+              <a:rPr lang="en-US" sz="2100" dirty="0"/>
+              <a:t>There are five methods used to identify features to remove:</a:t>
+            </a:r>
+          </a:p>
+          <a:p>
+            <a:r>
+              <a:rPr lang="en-US" sz="2100" dirty="0"/>
+              <a:t>Missing Values – Any feature with 60% of data missing is removed </a:t>
+            </a:r>
+          </a:p>
+          <a:p>
+            <a:r>
+              <a:rPr lang="en-US" sz="2100" dirty="0"/>
+              <a:t>Single Unique Values- Any constant Values across the dataset is removed.</a:t>
+            </a:r>
+          </a:p>
+          <a:p>
+            <a:r>
+              <a:rPr lang="en-US" sz="2100" dirty="0"/>
+              <a:t>Collinear Features-Identify features with 98% correlation.</a:t>
+            </a:r>
+          </a:p>
+          <a:p>
+            <a:r>
+              <a:rPr lang="en-US" sz="2100" dirty="0"/>
+              <a:t>Zero Importance Features – Identify zero importance features after one hot encoding.</a:t>
+            </a:r>
+          </a:p>
+          <a:p>
+            <a:r>
+              <a:rPr lang="en-US" sz="2100" dirty="0"/>
+              <a:t>Low Importance Features-Identify features with Low importance (i.e. where cumulative importance is below the threshold of 98 %)</a:t>
+            </a:r>
+          </a:p>
+          <a:p>
+            <a:endParaRPr lang="en-US" sz="2100" dirty="0"/>
+          </a:p>
+          <a:p>
+            <a:r>
+              <a:rPr lang="en-US" sz="2100" dirty="0"/>
+              <a:t>After transformation and merging  initial set of features to begin with was 194 and with feature selection, the number of features that were identified has having an impact to the pricing or BTU was determined to be 86</a:t>
+            </a:r>
+          </a:p>
+          <a:p>
+            <a:endParaRPr lang="en-US" sz="2100" dirty="0"/>
+          </a:p>
+          <a:p>
+            <a:br>
+              <a:rPr lang="en-US" dirty="0"/>
+            </a:br>
+            <a:endParaRPr lang="en-US" dirty="0"/>
+          </a:p>
+          <a:p>
+            <a:endParaRPr lang="en-US" dirty="0"/>
+          </a:p>
+          <a:p>
+            <a:endParaRPr lang="en-US" dirty="0"/>
+          </a:p>
+          <a:p>
+            <a:endParaRPr lang="en-US" dirty="0"/>
+          </a:p>
+          <a:p>
+            <a:endParaRPr lang="en-US" dirty="0"/>
+          </a:p>
+          <a:p>
+            <a:endParaRPr lang="en-US" dirty="0"/>
+          </a:p>
+        </p:txBody>
+      </p:sp>
+      <p:pic>
+        <p:nvPicPr>
+          <p:cNvPr id="8" name="Picture 7">
+            <a:extLst>
+              <a:ext uri="{FF2B5EF4-FFF2-40B4-BE49-F238E27FC236}">
+                <a16:creationId xmlns:a16="http://schemas.microsoft.com/office/drawing/2014/main" id="{CF3F796C-70B4-4A89-AF5C-A3F75C038782}"/>
+              </a:ext>
+            </a:extLst>
+          </p:cNvPr>
+          <p:cNvPicPr>
+            <a:picLocks noChangeAspect="1"/>
+          </p:cNvPicPr>
+          <p:nvPr/>
+        </p:nvPicPr>
+        <p:blipFill>
+          <a:blip r:embed="rId3">
+            <a:extLst>
+              <a:ext uri="{28A0092B-C50C-407E-A947-70E740481C1C}">
+                <a14:useLocalDpi xmlns:a14="http://schemas.microsoft.com/office/drawing/2010/main" val="0"/>
+              </a:ext>
+            </a:extLst>
+          </a:blip>
+          <a:stretch>
+            <a:fillRect/>
+          </a:stretch>
+        </p:blipFill>
+        <p:spPr>
+          <a:xfrm>
+            <a:off x="5202315" y="3172674"/>
+            <a:ext cx="4115133" cy="3086084"/>
+          </a:xfrm>
+          <a:prstGeom prst="rect">
+            <a:avLst/>
+          </a:prstGeom>
+        </p:spPr>
+      </p:pic>
+      <p:pic>
+        <p:nvPicPr>
+          <p:cNvPr id="10" name="Picture 9">
+            <a:extLst>
+              <a:ext uri="{FF2B5EF4-FFF2-40B4-BE49-F238E27FC236}">
+                <a16:creationId xmlns:a16="http://schemas.microsoft.com/office/drawing/2014/main" id="{F697EE75-49E4-49EA-A779-14CA01293DBB}"/>
+              </a:ext>
+            </a:extLst>
+          </p:cNvPr>
+          <p:cNvPicPr>
+            <a:picLocks noChangeAspect="1"/>
+          </p:cNvPicPr>
+          <p:nvPr/>
+        </p:nvPicPr>
+        <p:blipFill>
+          <a:blip r:embed="rId4">
+            <a:extLst>
+              <a:ext uri="{28A0092B-C50C-407E-A947-70E740481C1C}">
+                <a14:useLocalDpi xmlns:a14="http://schemas.microsoft.com/office/drawing/2010/main" val="0"/>
+              </a:ext>
+            </a:extLst>
+          </a:blip>
+          <a:stretch>
+            <a:fillRect/>
+          </a:stretch>
+        </p:blipFill>
+        <p:spPr>
+          <a:xfrm>
+            <a:off x="1127464" y="3223128"/>
+            <a:ext cx="3231472" cy="3506147"/>
+          </a:xfrm>
+          <a:prstGeom prst="rect">
+            <a:avLst/>
+          </a:prstGeom>
+        </p:spPr>
+      </p:pic>
+    </p:spTree>
+    <p:extLst>
+      <p:ext uri="{BB962C8B-B14F-4D97-AF65-F5344CB8AC3E}">
+        <p14:creationId xmlns:p14="http://schemas.microsoft.com/office/powerpoint/2010/main" val="707371002"/>
+      </p:ext>
+    </p:extLst>
+  </p:cSld>
+  <p:clrMapOvr>
+    <a:masterClrMapping/>
+  </p:clrMapOvr>
+</p:sld>
+</file>
+
 <file path=ppt/theme/theme1.xml><?xml version="1.0" encoding="utf-8"?>
 <a:theme xmlns:a="http://schemas.openxmlformats.org/drawingml/2006/main" name="Facet">
   <a:themeElements>

</xml_diff>

<commit_message>
Pushing the presentation and changes to linear
</commit_message>
<xml_diff>
--- a/PresentationSlide.pptx
+++ b/PresentationSlide.pptx
@@ -10,6 +10,8 @@
     <p:sldId id="258" r:id="rId4"/>
     <p:sldId id="259" r:id="rId5"/>
     <p:sldId id="260" r:id="rId6"/>
+    <p:sldId id="262" r:id="rId7"/>
+    <p:sldId id="261" r:id="rId8"/>
   </p:sldIdLst>
   <p:sldSz cx="12192000" cy="6858000"/>
   <p:notesSz cx="6858000" cy="9144000"/>
@@ -8066,23 +8068,7 @@
                   <a:schemeClr val="tx1"/>
                 </a:solidFill>
               </a:rPr>
-              <a:t> – Fine Tune model using </a:t>
-            </a:r>
-            <a:r>
-              <a:rPr lang="en-US" sz="1200" dirty="0" err="1">
-                <a:solidFill>
-                  <a:schemeClr val="tx1"/>
-                </a:solidFill>
-              </a:rPr>
-              <a:t>GridsearchCV</a:t>
-            </a:r>
-            <a:r>
-              <a:rPr lang="en-US" sz="1200" dirty="0">
-                <a:solidFill>
-                  <a:schemeClr val="tx1"/>
-                </a:solidFill>
-              </a:rPr>
-              <a:t> to determine optimum hyper-parameters for the best r2 score</a:t>
+              <a:t> – Fine Tune model using GridsearchCV to determine optimum hyper-parameters for the best r2 score</a:t>
             </a:r>
           </a:p>
         </p:txBody>
@@ -8790,6 +8776,1069 @@
 </p:sld>
 </file>
 
+<file path=ppt/slides/slide6.xml><?xml version="1.0" encoding="utf-8"?>
+<p:sld xmlns:a="http://schemas.openxmlformats.org/drawingml/2006/main" xmlns:r="http://schemas.openxmlformats.org/officeDocument/2006/relationships" xmlns:p="http://schemas.openxmlformats.org/presentationml/2006/main">
+  <p:cSld>
+    <p:spTree>
+      <p:nvGrpSpPr>
+        <p:cNvPr id="1" name=""/>
+        <p:cNvGrpSpPr/>
+        <p:nvPr/>
+      </p:nvGrpSpPr>
+      <p:grpSpPr>
+        <a:xfrm>
+          <a:off x="0" y="0"/>
+          <a:ext cx="0" cy="0"/>
+          <a:chOff x="0" y="0"/>
+          <a:chExt cx="0" cy="0"/>
+        </a:xfrm>
+      </p:grpSpPr>
+      <p:sp>
+        <p:nvSpPr>
+          <p:cNvPr id="5" name="TextBox 4">
+            <a:extLst>
+              <a:ext uri="{FF2B5EF4-FFF2-40B4-BE49-F238E27FC236}">
+                <a16:creationId xmlns:a16="http://schemas.microsoft.com/office/drawing/2014/main" id="{E618A879-07CD-4346-87B2-78C6583069E6}"/>
+              </a:ext>
+            </a:extLst>
+          </p:cNvPr>
+          <p:cNvSpPr txBox="1"/>
+          <p:nvPr/>
+        </p:nvSpPr>
+        <p:spPr>
+          <a:xfrm>
+            <a:off x="228601" y="188844"/>
+            <a:ext cx="10396329" cy="338554"/>
+          </a:xfrm>
+          <a:prstGeom prst="rect">
+            <a:avLst/>
+          </a:prstGeom>
+          <a:noFill/>
+        </p:spPr>
+        <p:txBody>
+          <a:bodyPr wrap="square" rtlCol="0">
+            <a:spAutoFit/>
+          </a:bodyPr>
+          <a:lstStyle/>
+          <a:p>
+            <a:r>
+              <a:rPr lang="en-US" sz="1600" dirty="0"/>
+              <a:t>Linear Regression Models : </a:t>
+            </a:r>
+          </a:p>
+        </p:txBody>
+      </p:sp>
+      <p:sp>
+        <p:nvSpPr>
+          <p:cNvPr id="27" name="Freeform: Shape 26">
+            <a:extLst>
+              <a:ext uri="{FF2B5EF4-FFF2-40B4-BE49-F238E27FC236}">
+                <a16:creationId xmlns:a16="http://schemas.microsoft.com/office/drawing/2014/main" id="{08A6CB71-224C-4627-9A69-EB399C26D260}"/>
+              </a:ext>
+            </a:extLst>
+          </p:cNvPr>
+          <p:cNvSpPr/>
+          <p:nvPr/>
+        </p:nvSpPr>
+        <p:spPr>
+          <a:xfrm>
+            <a:off x="727970" y="723461"/>
+            <a:ext cx="2671213" cy="930102"/>
+          </a:xfrm>
+          <a:custGeom>
+            <a:avLst/>
+            <a:gdLst>
+              <a:gd name="connsiteX0" fmla="*/ 0 w 2357070"/>
+              <a:gd name="connsiteY0" fmla="*/ 275034 h 1649872"/>
+              <a:gd name="connsiteX1" fmla="*/ 275034 w 2357070"/>
+              <a:gd name="connsiteY1" fmla="*/ 0 h 1649872"/>
+              <a:gd name="connsiteX2" fmla="*/ 2082036 w 2357070"/>
+              <a:gd name="connsiteY2" fmla="*/ 0 h 1649872"/>
+              <a:gd name="connsiteX3" fmla="*/ 2357070 w 2357070"/>
+              <a:gd name="connsiteY3" fmla="*/ 275034 h 1649872"/>
+              <a:gd name="connsiteX4" fmla="*/ 2357070 w 2357070"/>
+              <a:gd name="connsiteY4" fmla="*/ 1374838 h 1649872"/>
+              <a:gd name="connsiteX5" fmla="*/ 2082036 w 2357070"/>
+              <a:gd name="connsiteY5" fmla="*/ 1649872 h 1649872"/>
+              <a:gd name="connsiteX6" fmla="*/ 275034 w 2357070"/>
+              <a:gd name="connsiteY6" fmla="*/ 1649872 h 1649872"/>
+              <a:gd name="connsiteX7" fmla="*/ 0 w 2357070"/>
+              <a:gd name="connsiteY7" fmla="*/ 1374838 h 1649872"/>
+              <a:gd name="connsiteX8" fmla="*/ 0 w 2357070"/>
+              <a:gd name="connsiteY8" fmla="*/ 275034 h 1649872"/>
+            </a:gdLst>
+            <a:ahLst/>
+            <a:cxnLst>
+              <a:cxn ang="0">
+                <a:pos x="connsiteX0" y="connsiteY0"/>
+              </a:cxn>
+              <a:cxn ang="0">
+                <a:pos x="connsiteX1" y="connsiteY1"/>
+              </a:cxn>
+              <a:cxn ang="0">
+                <a:pos x="connsiteX2" y="connsiteY2"/>
+              </a:cxn>
+              <a:cxn ang="0">
+                <a:pos x="connsiteX3" y="connsiteY3"/>
+              </a:cxn>
+              <a:cxn ang="0">
+                <a:pos x="connsiteX4" y="connsiteY4"/>
+              </a:cxn>
+              <a:cxn ang="0">
+                <a:pos x="connsiteX5" y="connsiteY5"/>
+              </a:cxn>
+              <a:cxn ang="0">
+                <a:pos x="connsiteX6" y="connsiteY6"/>
+              </a:cxn>
+              <a:cxn ang="0">
+                <a:pos x="connsiteX7" y="connsiteY7"/>
+              </a:cxn>
+              <a:cxn ang="0">
+                <a:pos x="connsiteX8" y="connsiteY8"/>
+              </a:cxn>
+            </a:cxnLst>
+            <a:rect l="l" t="t" r="r" b="b"/>
+            <a:pathLst>
+              <a:path w="2357070" h="1649872">
+                <a:moveTo>
+                  <a:pt x="0" y="275034"/>
+                </a:moveTo>
+                <a:cubicBezTo>
+                  <a:pt x="0" y="123137"/>
+                  <a:pt x="123137" y="0"/>
+                  <a:pt x="275034" y="0"/>
+                </a:cubicBezTo>
+                <a:lnTo>
+                  <a:pt x="2082036" y="0"/>
+                </a:lnTo>
+                <a:cubicBezTo>
+                  <a:pt x="2233933" y="0"/>
+                  <a:pt x="2357070" y="123137"/>
+                  <a:pt x="2357070" y="275034"/>
+                </a:cubicBezTo>
+                <a:lnTo>
+                  <a:pt x="2357070" y="1374838"/>
+                </a:lnTo>
+                <a:cubicBezTo>
+                  <a:pt x="2357070" y="1526735"/>
+                  <a:pt x="2233933" y="1649872"/>
+                  <a:pt x="2082036" y="1649872"/>
+                </a:cubicBezTo>
+                <a:lnTo>
+                  <a:pt x="275034" y="1649872"/>
+                </a:lnTo>
+                <a:cubicBezTo>
+                  <a:pt x="123137" y="1649872"/>
+                  <a:pt x="0" y="1526735"/>
+                  <a:pt x="0" y="1374838"/>
+                </a:cubicBezTo>
+                <a:lnTo>
+                  <a:pt x="0" y="275034"/>
+                </a:lnTo>
+                <a:close/>
+              </a:path>
+            </a:pathLst>
+          </a:custGeom>
+          <a:noFill/>
+          <a:ln>
+            <a:solidFill>
+              <a:schemeClr val="accent1"/>
+            </a:solidFill>
+          </a:ln>
+        </p:spPr>
+        <p:style>
+          <a:lnRef idx="2">
+            <a:schemeClr val="lt1">
+              <a:hueOff val="0"/>
+              <a:satOff val="0"/>
+              <a:lumOff val="0"/>
+              <a:alphaOff val="0"/>
+            </a:schemeClr>
+          </a:lnRef>
+          <a:fillRef idx="1">
+            <a:schemeClr val="accent1">
+              <a:hueOff val="0"/>
+              <a:satOff val="0"/>
+              <a:lumOff val="0"/>
+              <a:alphaOff val="0"/>
+            </a:schemeClr>
+          </a:fillRef>
+          <a:effectRef idx="0">
+            <a:schemeClr val="accent1">
+              <a:hueOff val="0"/>
+              <a:satOff val="0"/>
+              <a:lumOff val="0"/>
+              <a:alphaOff val="0"/>
+            </a:schemeClr>
+          </a:effectRef>
+          <a:fontRef idx="minor">
+            <a:schemeClr val="lt1"/>
+          </a:fontRef>
+        </p:style>
+        <p:txBody>
+          <a:bodyPr spcFirstLastPara="0" vert="horz" wrap="square" lIns="133895" tIns="133895" rIns="133895" bIns="133895" numCol="1" spcCol="1270" anchor="ctr" anchorCtr="0">
+            <a:noAutofit/>
+          </a:bodyPr>
+          <a:lstStyle/>
+          <a:p>
+            <a:pPr marL="0" lvl="0" indent="0" algn="l" defTabSz="622300">
+              <a:lnSpc>
+                <a:spcPct val="90000"/>
+              </a:lnSpc>
+              <a:spcBef>
+                <a:spcPct val="0"/>
+              </a:spcBef>
+              <a:spcAft>
+                <a:spcPct val="35000"/>
+              </a:spcAft>
+              <a:buNone/>
+            </a:pPr>
+            <a:r>
+              <a:rPr lang="en-US" sz="1200" b="1" kern="1200" dirty="0">
+                <a:solidFill>
+                  <a:schemeClr val="tx1"/>
+                </a:solidFill>
+              </a:rPr>
+              <a:t>Step 1</a:t>
+            </a:r>
+            <a:r>
+              <a:rPr lang="en-US" sz="1200" kern="1200" dirty="0">
+                <a:solidFill>
+                  <a:schemeClr val="tx1"/>
+                </a:solidFill>
+              </a:rPr>
+              <a:t> – Creating base Model for Linear Regression </a:t>
+            </a:r>
+          </a:p>
+          <a:p>
+            <a:pPr marL="0" lvl="0" indent="0" algn="l" defTabSz="622300">
+              <a:lnSpc>
+                <a:spcPct val="90000"/>
+              </a:lnSpc>
+              <a:spcBef>
+                <a:spcPct val="0"/>
+              </a:spcBef>
+              <a:spcAft>
+                <a:spcPct val="35000"/>
+              </a:spcAft>
+              <a:buNone/>
+            </a:pPr>
+            <a:r>
+              <a:rPr lang="en-US" sz="1200" dirty="0">
+                <a:solidFill>
+                  <a:schemeClr val="tx1"/>
+                </a:solidFill>
+              </a:rPr>
+              <a:t>(Linear, Lasso , ElasticNet)</a:t>
+            </a:r>
+            <a:endParaRPr lang="en-US" sz="1200" kern="1200" dirty="0">
+              <a:solidFill>
+                <a:schemeClr val="tx1"/>
+              </a:solidFill>
+            </a:endParaRPr>
+          </a:p>
+        </p:txBody>
+      </p:sp>
+      <p:sp>
+        <p:nvSpPr>
+          <p:cNvPr id="29" name="Freeform: Shape 28">
+            <a:extLst>
+              <a:ext uri="{FF2B5EF4-FFF2-40B4-BE49-F238E27FC236}">
+                <a16:creationId xmlns:a16="http://schemas.microsoft.com/office/drawing/2014/main" id="{CC082855-0F08-43EA-B263-25A0DB88F36C}"/>
+              </a:ext>
+            </a:extLst>
+          </p:cNvPr>
+          <p:cNvSpPr/>
+          <p:nvPr/>
+        </p:nvSpPr>
+        <p:spPr>
+          <a:xfrm>
+            <a:off x="3690318" y="665826"/>
+            <a:ext cx="2473983" cy="987758"/>
+          </a:xfrm>
+          <a:custGeom>
+            <a:avLst/>
+            <a:gdLst>
+              <a:gd name="connsiteX0" fmla="*/ 0 w 2357070"/>
+              <a:gd name="connsiteY0" fmla="*/ 275034 h 1649872"/>
+              <a:gd name="connsiteX1" fmla="*/ 275034 w 2357070"/>
+              <a:gd name="connsiteY1" fmla="*/ 0 h 1649872"/>
+              <a:gd name="connsiteX2" fmla="*/ 2082036 w 2357070"/>
+              <a:gd name="connsiteY2" fmla="*/ 0 h 1649872"/>
+              <a:gd name="connsiteX3" fmla="*/ 2357070 w 2357070"/>
+              <a:gd name="connsiteY3" fmla="*/ 275034 h 1649872"/>
+              <a:gd name="connsiteX4" fmla="*/ 2357070 w 2357070"/>
+              <a:gd name="connsiteY4" fmla="*/ 1374838 h 1649872"/>
+              <a:gd name="connsiteX5" fmla="*/ 2082036 w 2357070"/>
+              <a:gd name="connsiteY5" fmla="*/ 1649872 h 1649872"/>
+              <a:gd name="connsiteX6" fmla="*/ 275034 w 2357070"/>
+              <a:gd name="connsiteY6" fmla="*/ 1649872 h 1649872"/>
+              <a:gd name="connsiteX7" fmla="*/ 0 w 2357070"/>
+              <a:gd name="connsiteY7" fmla="*/ 1374838 h 1649872"/>
+              <a:gd name="connsiteX8" fmla="*/ 0 w 2357070"/>
+              <a:gd name="connsiteY8" fmla="*/ 275034 h 1649872"/>
+            </a:gdLst>
+            <a:ahLst/>
+            <a:cxnLst>
+              <a:cxn ang="0">
+                <a:pos x="connsiteX0" y="connsiteY0"/>
+              </a:cxn>
+              <a:cxn ang="0">
+                <a:pos x="connsiteX1" y="connsiteY1"/>
+              </a:cxn>
+              <a:cxn ang="0">
+                <a:pos x="connsiteX2" y="connsiteY2"/>
+              </a:cxn>
+              <a:cxn ang="0">
+                <a:pos x="connsiteX3" y="connsiteY3"/>
+              </a:cxn>
+              <a:cxn ang="0">
+                <a:pos x="connsiteX4" y="connsiteY4"/>
+              </a:cxn>
+              <a:cxn ang="0">
+                <a:pos x="connsiteX5" y="connsiteY5"/>
+              </a:cxn>
+              <a:cxn ang="0">
+                <a:pos x="connsiteX6" y="connsiteY6"/>
+              </a:cxn>
+              <a:cxn ang="0">
+                <a:pos x="connsiteX7" y="connsiteY7"/>
+              </a:cxn>
+              <a:cxn ang="0">
+                <a:pos x="connsiteX8" y="connsiteY8"/>
+              </a:cxn>
+            </a:cxnLst>
+            <a:rect l="l" t="t" r="r" b="b"/>
+            <a:pathLst>
+              <a:path w="2357070" h="1649872">
+                <a:moveTo>
+                  <a:pt x="0" y="275034"/>
+                </a:moveTo>
+                <a:cubicBezTo>
+                  <a:pt x="0" y="123137"/>
+                  <a:pt x="123137" y="0"/>
+                  <a:pt x="275034" y="0"/>
+                </a:cubicBezTo>
+                <a:lnTo>
+                  <a:pt x="2082036" y="0"/>
+                </a:lnTo>
+                <a:cubicBezTo>
+                  <a:pt x="2233933" y="0"/>
+                  <a:pt x="2357070" y="123137"/>
+                  <a:pt x="2357070" y="275034"/>
+                </a:cubicBezTo>
+                <a:lnTo>
+                  <a:pt x="2357070" y="1374838"/>
+                </a:lnTo>
+                <a:cubicBezTo>
+                  <a:pt x="2357070" y="1526735"/>
+                  <a:pt x="2233933" y="1649872"/>
+                  <a:pt x="2082036" y="1649872"/>
+                </a:cubicBezTo>
+                <a:lnTo>
+                  <a:pt x="275034" y="1649872"/>
+                </a:lnTo>
+                <a:cubicBezTo>
+                  <a:pt x="123137" y="1649872"/>
+                  <a:pt x="0" y="1526735"/>
+                  <a:pt x="0" y="1374838"/>
+                </a:cubicBezTo>
+                <a:lnTo>
+                  <a:pt x="0" y="275034"/>
+                </a:lnTo>
+                <a:close/>
+              </a:path>
+            </a:pathLst>
+          </a:custGeom>
+          <a:noFill/>
+          <a:ln>
+            <a:solidFill>
+              <a:schemeClr val="accent1"/>
+            </a:solidFill>
+          </a:ln>
+        </p:spPr>
+        <p:style>
+          <a:lnRef idx="2">
+            <a:schemeClr val="lt1">
+              <a:hueOff val="0"/>
+              <a:satOff val="0"/>
+              <a:lumOff val="0"/>
+              <a:alphaOff val="0"/>
+            </a:schemeClr>
+          </a:lnRef>
+          <a:fillRef idx="1">
+            <a:schemeClr val="accent1">
+              <a:hueOff val="0"/>
+              <a:satOff val="0"/>
+              <a:lumOff val="0"/>
+              <a:alphaOff val="0"/>
+            </a:schemeClr>
+          </a:fillRef>
+          <a:effectRef idx="0">
+            <a:schemeClr val="accent1">
+              <a:hueOff val="0"/>
+              <a:satOff val="0"/>
+              <a:lumOff val="0"/>
+              <a:alphaOff val="0"/>
+            </a:schemeClr>
+          </a:effectRef>
+          <a:fontRef idx="minor">
+            <a:schemeClr val="lt1"/>
+          </a:fontRef>
+        </p:style>
+        <p:txBody>
+          <a:bodyPr spcFirstLastPara="0" vert="horz" wrap="square" lIns="133895" tIns="133895" rIns="133895" bIns="133895" numCol="1" spcCol="1270" anchor="ctr" anchorCtr="0">
+            <a:noAutofit/>
+          </a:bodyPr>
+          <a:lstStyle/>
+          <a:p>
+            <a:pPr defTabSz="622300">
+              <a:lnSpc>
+                <a:spcPct val="90000"/>
+              </a:lnSpc>
+              <a:spcBef>
+                <a:spcPct val="0"/>
+              </a:spcBef>
+              <a:spcAft>
+                <a:spcPct val="35000"/>
+              </a:spcAft>
+            </a:pPr>
+            <a:r>
+              <a:rPr lang="en-US" sz="1200" b="1" dirty="0">
+                <a:solidFill>
+                  <a:schemeClr val="tx1"/>
+                </a:solidFill>
+              </a:rPr>
+              <a:t>Step2</a:t>
+            </a:r>
+            <a:r>
+              <a:rPr lang="en-US" sz="1200" dirty="0">
+                <a:solidFill>
+                  <a:schemeClr val="tx1"/>
+                </a:solidFill>
+              </a:rPr>
+              <a:t> – Fine Tune model using LassoCV ( for Lasso Model) and determining the best alpha, and performing GridsearchCV for ElasticNet for range of alphas</a:t>
+            </a:r>
+          </a:p>
+        </p:txBody>
+      </p:sp>
+      <p:sp>
+        <p:nvSpPr>
+          <p:cNvPr id="31" name="Freeform: Shape 30">
+            <a:extLst>
+              <a:ext uri="{FF2B5EF4-FFF2-40B4-BE49-F238E27FC236}">
+                <a16:creationId xmlns:a16="http://schemas.microsoft.com/office/drawing/2014/main" id="{3F86357A-FC59-4E64-A550-D98A57AF9CF9}"/>
+              </a:ext>
+            </a:extLst>
+          </p:cNvPr>
+          <p:cNvSpPr/>
+          <p:nvPr/>
+        </p:nvSpPr>
+        <p:spPr>
+          <a:xfrm>
+            <a:off x="6535334" y="723460"/>
+            <a:ext cx="2582033" cy="930103"/>
+          </a:xfrm>
+          <a:custGeom>
+            <a:avLst/>
+            <a:gdLst>
+              <a:gd name="connsiteX0" fmla="*/ 0 w 2357070"/>
+              <a:gd name="connsiteY0" fmla="*/ 275034 h 1649872"/>
+              <a:gd name="connsiteX1" fmla="*/ 275034 w 2357070"/>
+              <a:gd name="connsiteY1" fmla="*/ 0 h 1649872"/>
+              <a:gd name="connsiteX2" fmla="*/ 2082036 w 2357070"/>
+              <a:gd name="connsiteY2" fmla="*/ 0 h 1649872"/>
+              <a:gd name="connsiteX3" fmla="*/ 2357070 w 2357070"/>
+              <a:gd name="connsiteY3" fmla="*/ 275034 h 1649872"/>
+              <a:gd name="connsiteX4" fmla="*/ 2357070 w 2357070"/>
+              <a:gd name="connsiteY4" fmla="*/ 1374838 h 1649872"/>
+              <a:gd name="connsiteX5" fmla="*/ 2082036 w 2357070"/>
+              <a:gd name="connsiteY5" fmla="*/ 1649872 h 1649872"/>
+              <a:gd name="connsiteX6" fmla="*/ 275034 w 2357070"/>
+              <a:gd name="connsiteY6" fmla="*/ 1649872 h 1649872"/>
+              <a:gd name="connsiteX7" fmla="*/ 0 w 2357070"/>
+              <a:gd name="connsiteY7" fmla="*/ 1374838 h 1649872"/>
+              <a:gd name="connsiteX8" fmla="*/ 0 w 2357070"/>
+              <a:gd name="connsiteY8" fmla="*/ 275034 h 1649872"/>
+            </a:gdLst>
+            <a:ahLst/>
+            <a:cxnLst>
+              <a:cxn ang="0">
+                <a:pos x="connsiteX0" y="connsiteY0"/>
+              </a:cxn>
+              <a:cxn ang="0">
+                <a:pos x="connsiteX1" y="connsiteY1"/>
+              </a:cxn>
+              <a:cxn ang="0">
+                <a:pos x="connsiteX2" y="connsiteY2"/>
+              </a:cxn>
+              <a:cxn ang="0">
+                <a:pos x="connsiteX3" y="connsiteY3"/>
+              </a:cxn>
+              <a:cxn ang="0">
+                <a:pos x="connsiteX4" y="connsiteY4"/>
+              </a:cxn>
+              <a:cxn ang="0">
+                <a:pos x="connsiteX5" y="connsiteY5"/>
+              </a:cxn>
+              <a:cxn ang="0">
+                <a:pos x="connsiteX6" y="connsiteY6"/>
+              </a:cxn>
+              <a:cxn ang="0">
+                <a:pos x="connsiteX7" y="connsiteY7"/>
+              </a:cxn>
+              <a:cxn ang="0">
+                <a:pos x="connsiteX8" y="connsiteY8"/>
+              </a:cxn>
+            </a:cxnLst>
+            <a:rect l="l" t="t" r="r" b="b"/>
+            <a:pathLst>
+              <a:path w="2357070" h="1649872">
+                <a:moveTo>
+                  <a:pt x="0" y="275034"/>
+                </a:moveTo>
+                <a:cubicBezTo>
+                  <a:pt x="0" y="123137"/>
+                  <a:pt x="123137" y="0"/>
+                  <a:pt x="275034" y="0"/>
+                </a:cubicBezTo>
+                <a:lnTo>
+                  <a:pt x="2082036" y="0"/>
+                </a:lnTo>
+                <a:cubicBezTo>
+                  <a:pt x="2233933" y="0"/>
+                  <a:pt x="2357070" y="123137"/>
+                  <a:pt x="2357070" y="275034"/>
+                </a:cubicBezTo>
+                <a:lnTo>
+                  <a:pt x="2357070" y="1374838"/>
+                </a:lnTo>
+                <a:cubicBezTo>
+                  <a:pt x="2357070" y="1526735"/>
+                  <a:pt x="2233933" y="1649872"/>
+                  <a:pt x="2082036" y="1649872"/>
+                </a:cubicBezTo>
+                <a:lnTo>
+                  <a:pt x="275034" y="1649872"/>
+                </a:lnTo>
+                <a:cubicBezTo>
+                  <a:pt x="123137" y="1649872"/>
+                  <a:pt x="0" y="1526735"/>
+                  <a:pt x="0" y="1374838"/>
+                </a:cubicBezTo>
+                <a:lnTo>
+                  <a:pt x="0" y="275034"/>
+                </a:lnTo>
+                <a:close/>
+              </a:path>
+            </a:pathLst>
+          </a:custGeom>
+          <a:noFill/>
+          <a:ln>
+            <a:solidFill>
+              <a:schemeClr val="accent1"/>
+            </a:solidFill>
+          </a:ln>
+        </p:spPr>
+        <p:style>
+          <a:lnRef idx="2">
+            <a:schemeClr val="lt1">
+              <a:hueOff val="0"/>
+              <a:satOff val="0"/>
+              <a:lumOff val="0"/>
+              <a:alphaOff val="0"/>
+            </a:schemeClr>
+          </a:lnRef>
+          <a:fillRef idx="1">
+            <a:schemeClr val="accent1">
+              <a:hueOff val="0"/>
+              <a:satOff val="0"/>
+              <a:lumOff val="0"/>
+              <a:alphaOff val="0"/>
+            </a:schemeClr>
+          </a:fillRef>
+          <a:effectRef idx="0">
+            <a:schemeClr val="accent1">
+              <a:hueOff val="0"/>
+              <a:satOff val="0"/>
+              <a:lumOff val="0"/>
+              <a:alphaOff val="0"/>
+            </a:schemeClr>
+          </a:effectRef>
+          <a:fontRef idx="minor">
+            <a:schemeClr val="lt1"/>
+          </a:fontRef>
+        </p:style>
+        <p:txBody>
+          <a:bodyPr spcFirstLastPara="0" vert="horz" wrap="square" lIns="133895" tIns="133895" rIns="133895" bIns="133895" numCol="1" spcCol="1270" anchor="ctr" anchorCtr="0">
+            <a:noAutofit/>
+          </a:bodyPr>
+          <a:lstStyle/>
+          <a:p>
+            <a:pPr marL="0" lvl="0" indent="0" algn="l" defTabSz="622300">
+              <a:lnSpc>
+                <a:spcPct val="90000"/>
+              </a:lnSpc>
+              <a:spcBef>
+                <a:spcPct val="0"/>
+              </a:spcBef>
+              <a:spcAft>
+                <a:spcPct val="35000"/>
+              </a:spcAft>
+              <a:buNone/>
+            </a:pPr>
+            <a:r>
+              <a:rPr lang="en-US" sz="1200" b="1" kern="1200" dirty="0">
+                <a:solidFill>
+                  <a:schemeClr val="tx1"/>
+                </a:solidFill>
+              </a:rPr>
+              <a:t>Step3</a:t>
+            </a:r>
+            <a:r>
+              <a:rPr lang="en-US" sz="1200" kern="1200" dirty="0">
+                <a:solidFill>
+                  <a:schemeClr val="tx1"/>
+                </a:solidFill>
+              </a:rPr>
+              <a:t> – Compare different models for accuracy</a:t>
+            </a:r>
+          </a:p>
+        </p:txBody>
+      </p:sp>
+      <p:graphicFrame>
+        <p:nvGraphicFramePr>
+          <p:cNvPr id="37" name="Table 36">
+            <a:extLst>
+              <a:ext uri="{FF2B5EF4-FFF2-40B4-BE49-F238E27FC236}">
+                <a16:creationId xmlns:a16="http://schemas.microsoft.com/office/drawing/2014/main" id="{A8BDD122-C0F0-4FDB-8714-C90A322FF873}"/>
+              </a:ext>
+            </a:extLst>
+          </p:cNvPr>
+          <p:cNvGraphicFramePr>
+            <a:graphicFrameLocks noGrp="1"/>
+          </p:cNvGraphicFramePr>
+          <p:nvPr>
+            <p:extLst>
+              <p:ext uri="{D42A27DB-BD31-4B8C-83A1-F6EECF244321}">
+                <p14:modId xmlns:p14="http://schemas.microsoft.com/office/powerpoint/2010/main" val="3921586709"/>
+              </p:ext>
+            </p:extLst>
+          </p:nvPr>
+        </p:nvGraphicFramePr>
+        <p:xfrm>
+          <a:off x="2063575" y="2023403"/>
+          <a:ext cx="5873062" cy="1971549"/>
+        </p:xfrm>
+        <a:graphic>
+          <a:graphicData uri="http://schemas.openxmlformats.org/drawingml/2006/table">
+            <a:tbl>
+              <a:tblPr firstRow="1" bandRow="1">
+                <a:tableStyleId>{3B4B98B0-60AC-42C2-AFA5-B58CD77FA1E5}</a:tableStyleId>
+              </a:tblPr>
+              <a:tblGrid>
+                <a:gridCol w="1130445">
+                  <a:extLst>
+                    <a:ext uri="{9D8B030D-6E8A-4147-A177-3AD203B41FA5}">
+                      <a16:colId xmlns:a16="http://schemas.microsoft.com/office/drawing/2014/main" val="1628376606"/>
+                    </a:ext>
+                  </a:extLst>
+                </a:gridCol>
+                <a:gridCol w="1561076">
+                  <a:extLst>
+                    <a:ext uri="{9D8B030D-6E8A-4147-A177-3AD203B41FA5}">
+                      <a16:colId xmlns:a16="http://schemas.microsoft.com/office/drawing/2014/main" val="3537171461"/>
+                    </a:ext>
+                  </a:extLst>
+                </a:gridCol>
+                <a:gridCol w="1307487">
+                  <a:extLst>
+                    <a:ext uri="{9D8B030D-6E8A-4147-A177-3AD203B41FA5}">
+                      <a16:colId xmlns:a16="http://schemas.microsoft.com/office/drawing/2014/main" val="2534363247"/>
+                    </a:ext>
+                  </a:extLst>
+                </a:gridCol>
+                <a:gridCol w="1874054">
+                  <a:extLst>
+                    <a:ext uri="{9D8B030D-6E8A-4147-A177-3AD203B41FA5}">
+                      <a16:colId xmlns:a16="http://schemas.microsoft.com/office/drawing/2014/main" val="3554354182"/>
+                    </a:ext>
+                  </a:extLst>
+                </a:gridCol>
+              </a:tblGrid>
+              <a:tr h="1081138">
+                <a:tc>
+                  <a:txBody>
+                    <a:bodyPr/>
+                    <a:lstStyle/>
+                    <a:p>
+                      <a:r>
+                        <a:rPr lang="en-US" sz="1600" dirty="0"/>
+                        <a:t>RESULTS for $</a:t>
+                      </a:r>
+                      <a:endParaRPr lang="en-US" sz="1600" dirty="0">
+                        <a:solidFill>
+                          <a:schemeClr val="tx1"/>
+                        </a:solidFill>
+                      </a:endParaRPr>
+                    </a:p>
+                  </a:txBody>
+                  <a:tcPr/>
+                </a:tc>
+                <a:tc>
+                  <a:txBody>
+                    <a:bodyPr/>
+                    <a:lstStyle/>
+                    <a:p>
+                      <a:r>
+                        <a:rPr lang="en-US" sz="1200" dirty="0"/>
+                        <a:t>Linear</a:t>
+                      </a:r>
+                    </a:p>
+                  </a:txBody>
+                  <a:tcPr>
+                    <a:solidFill>
+                      <a:schemeClr val="bg2"/>
+                    </a:solidFill>
+                  </a:tcPr>
+                </a:tc>
+                <a:tc>
+                  <a:txBody>
+                    <a:bodyPr/>
+                    <a:lstStyle/>
+                    <a:p>
+                      <a:r>
+                        <a:rPr lang="en-US" sz="1200" dirty="0"/>
+                        <a:t>LassoCV</a:t>
+                      </a:r>
+                    </a:p>
+                  </a:txBody>
+                  <a:tcPr>
+                    <a:solidFill>
+                      <a:schemeClr val="bg2"/>
+                    </a:solidFill>
+                  </a:tcPr>
+                </a:tc>
+                <a:tc>
+                  <a:txBody>
+                    <a:bodyPr/>
+                    <a:lstStyle/>
+                    <a:p>
+                      <a:r>
+                        <a:rPr lang="en-US" sz="1200" dirty="0"/>
+                        <a:t>Elastic Net</a:t>
+                      </a:r>
+                    </a:p>
+                  </a:txBody>
+                  <a:tcPr>
+                    <a:solidFill>
+                      <a:schemeClr val="bg2"/>
+                    </a:solidFill>
+                  </a:tcPr>
+                </a:tc>
+                <a:extLst>
+                  <a:ext uri="{0D108BD9-81ED-4DB2-BD59-A6C34878D82A}">
+                    <a16:rowId xmlns:a16="http://schemas.microsoft.com/office/drawing/2014/main" val="1637909296"/>
+                  </a:ext>
+                </a:extLst>
+              </a:tr>
+              <a:tr h="530032">
+                <a:tc>
+                  <a:txBody>
+                    <a:bodyPr/>
+                    <a:lstStyle/>
+                    <a:p>
+                      <a:r>
+                        <a:rPr lang="en-US" sz="1200" dirty="0"/>
+                        <a:t>Test RMSE</a:t>
+                      </a:r>
+                    </a:p>
+                  </a:txBody>
+                  <a:tcPr/>
+                </a:tc>
+                <a:tc>
+                  <a:txBody>
+                    <a:bodyPr/>
+                    <a:lstStyle/>
+                    <a:p>
+                      <a:r>
+                        <a:rPr lang="en-US" sz="1200" dirty="0"/>
+                        <a:t>346.4495</a:t>
+                      </a:r>
+                    </a:p>
+                  </a:txBody>
+                  <a:tcPr/>
+                </a:tc>
+                <a:tc>
+                  <a:txBody>
+                    <a:bodyPr/>
+                    <a:lstStyle/>
+                    <a:p>
+                      <a:r>
+                        <a:rPr lang="en-US" sz="1200" dirty="0"/>
+                        <a:t>346.2505</a:t>
+                      </a:r>
+                    </a:p>
+                  </a:txBody>
+                  <a:tcPr/>
+                </a:tc>
+                <a:tc>
+                  <a:txBody>
+                    <a:bodyPr/>
+                    <a:lstStyle/>
+                    <a:p>
+                      <a:r>
+                        <a:rPr lang="en-US" sz="1200" dirty="0"/>
+                        <a:t>346.4526</a:t>
+                      </a:r>
+                    </a:p>
+                  </a:txBody>
+                  <a:tcPr/>
+                </a:tc>
+                <a:extLst>
+                  <a:ext uri="{0D108BD9-81ED-4DB2-BD59-A6C34878D82A}">
+                    <a16:rowId xmlns:a16="http://schemas.microsoft.com/office/drawing/2014/main" val="3035129995"/>
+                  </a:ext>
+                </a:extLst>
+              </a:tr>
+              <a:tr h="360379">
+                <a:tc>
+                  <a:txBody>
+                    <a:bodyPr/>
+                    <a:lstStyle/>
+                    <a:p>
+                      <a:r>
+                        <a:rPr lang="en-US" sz="1200" dirty="0"/>
+                        <a:t>Test r</a:t>
+                      </a:r>
+                      <a:r>
+                        <a:rPr lang="en-US" sz="1200" baseline="30000" dirty="0"/>
+                        <a:t>2</a:t>
+                      </a:r>
+                    </a:p>
+                  </a:txBody>
+                  <a:tcPr/>
+                </a:tc>
+                <a:tc>
+                  <a:txBody>
+                    <a:bodyPr/>
+                    <a:lstStyle/>
+                    <a:p>
+                      <a:r>
+                        <a:rPr lang="en-US" sz="1200" dirty="0"/>
+                        <a:t>81.08%</a:t>
+                      </a:r>
+                    </a:p>
+                  </a:txBody>
+                  <a:tcPr/>
+                </a:tc>
+                <a:tc>
+                  <a:txBody>
+                    <a:bodyPr/>
+                    <a:lstStyle/>
+                    <a:p>
+                      <a:r>
+                        <a:rPr lang="en-US" sz="1200" dirty="0"/>
+                        <a:t>81.11%</a:t>
+                      </a:r>
+                    </a:p>
+                  </a:txBody>
+                  <a:tcPr/>
+                </a:tc>
+                <a:tc>
+                  <a:txBody>
+                    <a:bodyPr/>
+                    <a:lstStyle/>
+                    <a:p>
+                      <a:r>
+                        <a:rPr lang="en-US" sz="1200" dirty="0"/>
+                        <a:t>81.08%</a:t>
+                      </a:r>
+                    </a:p>
+                  </a:txBody>
+                  <a:tcPr/>
+                </a:tc>
+                <a:extLst>
+                  <a:ext uri="{0D108BD9-81ED-4DB2-BD59-A6C34878D82A}">
+                    <a16:rowId xmlns:a16="http://schemas.microsoft.com/office/drawing/2014/main" val="3998100381"/>
+                  </a:ext>
+                </a:extLst>
+              </a:tr>
+            </a:tbl>
+          </a:graphicData>
+        </a:graphic>
+      </p:graphicFrame>
+      <p:sp>
+        <p:nvSpPr>
+          <p:cNvPr id="40" name="Arrow: Right 39">
+            <a:extLst>
+              <a:ext uri="{FF2B5EF4-FFF2-40B4-BE49-F238E27FC236}">
+                <a16:creationId xmlns:a16="http://schemas.microsoft.com/office/drawing/2014/main" id="{DE470760-77B6-4DA0-BFE4-61CBDABB9866}"/>
+              </a:ext>
+            </a:extLst>
+          </p:cNvPr>
+          <p:cNvSpPr/>
+          <p:nvPr/>
+        </p:nvSpPr>
+        <p:spPr>
+          <a:xfrm>
+            <a:off x="3399183" y="1093302"/>
+            <a:ext cx="291135" cy="168965"/>
+          </a:xfrm>
+          <a:prstGeom prst="rightArrow">
+            <a:avLst/>
+          </a:prstGeom>
+        </p:spPr>
+        <p:style>
+          <a:lnRef idx="2">
+            <a:schemeClr val="accent1">
+              <a:shade val="50000"/>
+            </a:schemeClr>
+          </a:lnRef>
+          <a:fillRef idx="1">
+            <a:schemeClr val="accent1"/>
+          </a:fillRef>
+          <a:effectRef idx="0">
+            <a:schemeClr val="accent1"/>
+          </a:effectRef>
+          <a:fontRef idx="minor">
+            <a:schemeClr val="lt1"/>
+          </a:fontRef>
+        </p:style>
+        <p:txBody>
+          <a:bodyPr rtlCol="0" anchor="ctr"/>
+          <a:lstStyle/>
+          <a:p>
+            <a:pPr algn="ctr"/>
+            <a:endParaRPr lang="en-US"/>
+          </a:p>
+        </p:txBody>
+      </p:sp>
+      <p:sp>
+        <p:nvSpPr>
+          <p:cNvPr id="41" name="Arrow: Right 40">
+            <a:extLst>
+              <a:ext uri="{FF2B5EF4-FFF2-40B4-BE49-F238E27FC236}">
+                <a16:creationId xmlns:a16="http://schemas.microsoft.com/office/drawing/2014/main" id="{D9F80517-458A-487B-98D3-5A87E9DE1DE3}"/>
+              </a:ext>
+            </a:extLst>
+          </p:cNvPr>
+          <p:cNvSpPr/>
+          <p:nvPr/>
+        </p:nvSpPr>
+        <p:spPr>
+          <a:xfrm>
+            <a:off x="6164301" y="1071985"/>
+            <a:ext cx="291135" cy="168965"/>
+          </a:xfrm>
+          <a:prstGeom prst="rightArrow">
+            <a:avLst/>
+          </a:prstGeom>
+        </p:spPr>
+        <p:style>
+          <a:lnRef idx="2">
+            <a:schemeClr val="accent1">
+              <a:shade val="50000"/>
+            </a:schemeClr>
+          </a:lnRef>
+          <a:fillRef idx="1">
+            <a:schemeClr val="accent1"/>
+          </a:fillRef>
+          <a:effectRef idx="0">
+            <a:schemeClr val="accent1"/>
+          </a:effectRef>
+          <a:fontRef idx="minor">
+            <a:schemeClr val="lt1"/>
+          </a:fontRef>
+        </p:style>
+        <p:txBody>
+          <a:bodyPr rtlCol="0" anchor="ctr"/>
+          <a:lstStyle/>
+          <a:p>
+            <a:pPr algn="ctr"/>
+            <a:endParaRPr lang="en-US"/>
+          </a:p>
+        </p:txBody>
+      </p:sp>
+      <p:pic>
+        <p:nvPicPr>
+          <p:cNvPr id="6" name="Picture 5">
+            <a:extLst>
+              <a:ext uri="{FF2B5EF4-FFF2-40B4-BE49-F238E27FC236}">
+                <a16:creationId xmlns:a16="http://schemas.microsoft.com/office/drawing/2014/main" id="{A3F6FCB1-101E-4F84-B2F4-CFE85833AB6A}"/>
+              </a:ext>
+            </a:extLst>
+          </p:cNvPr>
+          <p:cNvPicPr>
+            <a:picLocks noChangeAspect="1"/>
+          </p:cNvPicPr>
+          <p:nvPr/>
+        </p:nvPicPr>
+        <p:blipFill>
+          <a:blip r:embed="rId2">
+            <a:extLst>
+              <a:ext uri="{28A0092B-C50C-407E-A947-70E740481C1C}">
+                <a14:useLocalDpi xmlns:a14="http://schemas.microsoft.com/office/drawing/2010/main" val="0"/>
+              </a:ext>
+            </a:extLst>
+          </a:blip>
+          <a:stretch>
+            <a:fillRect/>
+          </a:stretch>
+        </p:blipFill>
+        <p:spPr>
+          <a:xfrm>
+            <a:off x="2763081" y="4219023"/>
+            <a:ext cx="3904049" cy="2800105"/>
+          </a:xfrm>
+          <a:prstGeom prst="rect">
+            <a:avLst/>
+          </a:prstGeom>
+        </p:spPr>
+      </p:pic>
+    </p:spTree>
+    <p:extLst>
+      <p:ext uri="{BB962C8B-B14F-4D97-AF65-F5344CB8AC3E}">
+        <p14:creationId xmlns:p14="http://schemas.microsoft.com/office/powerpoint/2010/main" val="1142068182"/>
+      </p:ext>
+    </p:extLst>
+  </p:cSld>
+  <p:clrMapOvr>
+    <a:masterClrMapping/>
+  </p:clrMapOvr>
+</p:sld>
+</file>
+
+<file path=ppt/slides/slide7.xml><?xml version="1.0" encoding="utf-8"?>
+<p:sld xmlns:a="http://schemas.openxmlformats.org/drawingml/2006/main" xmlns:r="http://schemas.openxmlformats.org/officeDocument/2006/relationships" xmlns:p="http://schemas.openxmlformats.org/presentationml/2006/main">
+  <p:cSld>
+    <p:spTree>
+      <p:nvGrpSpPr>
+        <p:cNvPr id="1" name=""/>
+        <p:cNvGrpSpPr/>
+        <p:nvPr/>
+      </p:nvGrpSpPr>
+      <p:grpSpPr>
+        <a:xfrm>
+          <a:off x="0" y="0"/>
+          <a:ext cx="0" cy="0"/>
+          <a:chOff x="0" y="0"/>
+          <a:chExt cx="0" cy="0"/>
+        </a:xfrm>
+      </p:grpSpPr>
+    </p:spTree>
+    <p:extLst>
+      <p:ext uri="{BB962C8B-B14F-4D97-AF65-F5344CB8AC3E}">
+        <p14:creationId xmlns:p14="http://schemas.microsoft.com/office/powerpoint/2010/main" val="123469464"/>
+      </p:ext>
+    </p:extLst>
+  </p:cSld>
+  <p:clrMapOvr>
+    <a:masterClrMapping/>
+  </p:clrMapOvr>
+</p:sld>
+</file>
+
 <file path=ppt/theme/theme1.xml><?xml version="1.0" encoding="utf-8"?>
 <a:theme xmlns:a="http://schemas.openxmlformats.org/drawingml/2006/main" name="Facet">
   <a:themeElements>

</xml_diff>

<commit_message>
Changes to presentation slide
</commit_message>
<xml_diff>
--- a/PresentationSlide.pptx
+++ b/PresentationSlide.pptx
@@ -5,13 +5,13 @@
     <p:sldMasterId id="2147483660" r:id="rId1"/>
   </p:sldMasterIdLst>
   <p:sldIdLst>
-    <p:sldId id="256" r:id="rId2"/>
+    <p:sldId id="263" r:id="rId2"/>
     <p:sldId id="257" r:id="rId3"/>
     <p:sldId id="258" r:id="rId4"/>
-    <p:sldId id="259" r:id="rId5"/>
+    <p:sldId id="265" r:id="rId5"/>
     <p:sldId id="260" r:id="rId6"/>
     <p:sldId id="262" r:id="rId7"/>
-    <p:sldId id="261" r:id="rId8"/>
+    <p:sldId id="264" r:id="rId8"/>
   </p:sldIdLst>
   <p:sldSz cx="12192000" cy="6858000"/>
   <p:notesSz cx="6858000" cy="9144000"/>
@@ -5821,14 +5821,6 @@
 <file path=ppt/slides/slide1.xml><?xml version="1.0" encoding="utf-8"?>
 <p:sld xmlns:a="http://schemas.openxmlformats.org/drawingml/2006/main" xmlns:r="http://schemas.openxmlformats.org/officeDocument/2006/relationships" xmlns:p="http://schemas.openxmlformats.org/presentationml/2006/main">
   <p:cSld>
-    <p:bg>
-      <p:bgPr>
-        <a:solidFill>
-          <a:schemeClr val="bg2"/>
-        </a:solidFill>
-        <a:effectLst/>
-      </p:bgPr>
-    </p:bg>
     <p:spTree>
       <p:nvGrpSpPr>
         <p:cNvPr id="1" name=""/>
@@ -5843,827 +5835,21 @@
           <a:chExt cx="0" cy="0"/>
         </a:xfrm>
       </p:grpSpPr>
-      <p:grpSp>
-        <p:nvGrpSpPr>
-          <p:cNvPr id="71" name="Group 70">
+      <p:pic>
+        <p:nvPicPr>
+          <p:cNvPr id="2" name="Picture 1">
             <a:extLst>
               <a:ext uri="{FF2B5EF4-FFF2-40B4-BE49-F238E27FC236}">
-                <a16:creationId xmlns:a16="http://schemas.microsoft.com/office/drawing/2014/main" id="{10BE40E3-5550-4CDD-B4FD-387C33EBF157}"/>
-              </a:ext>
-              <a:ext uri="{C183D7F6-B498-43B3-948B-1728B52AA6E4}">
-                <adec:decorative xmlns:adec="http://schemas.microsoft.com/office/drawing/2017/decorative" val="1"/>
-              </a:ext>
-            </a:extLst>
-          </p:cNvPr>
-          <p:cNvGrpSpPr>
-            <a:grpSpLocks noGrp="1" noUngrp="1" noRot="1" noChangeAspect="1" noMove="1" noResize="1"/>
-          </p:cNvGrpSpPr>
-          <p:nvPr>
-            <p:extLst>
-              <p:ext uri="{386F3935-93C4-4BCD-93E2-E3B085C9AB24}">
-                <p16:designElem xmlns:p16="http://schemas.microsoft.com/office/powerpoint/2015/main" val="1"/>
-              </p:ext>
-            </p:extLst>
-          </p:nvPr>
-        </p:nvGrpSpPr>
-        <p:grpSpPr>
-          <a:xfrm>
-            <a:off x="0" y="-8467"/>
-            <a:ext cx="12192000" cy="6866467"/>
-            <a:chOff x="0" y="-8467"/>
-            <a:chExt cx="12192000" cy="6866467"/>
-          </a:xfrm>
-        </p:grpSpPr>
-        <p:cxnSp>
-          <p:nvCxnSpPr>
-            <p:cNvPr id="72" name="Straight Connector 71">
-              <a:extLst>
-                <a:ext uri="{FF2B5EF4-FFF2-40B4-BE49-F238E27FC236}">
-                  <a16:creationId xmlns:a16="http://schemas.microsoft.com/office/drawing/2014/main" id="{71A6B738-E50C-4653-B343-B9D6A5EA2771}"/>
-                </a:ext>
-                <a:ext uri="{C183D7F6-B498-43B3-948B-1728B52AA6E4}">
-                  <adec:decorative xmlns:adec="http://schemas.microsoft.com/office/drawing/2017/decorative" val="1"/>
-                </a:ext>
-              </a:extLst>
-            </p:cNvPr>
-            <p:cNvCxnSpPr/>
-            <p:nvPr>
-              <p:extLst>
-                <p:ext uri="{386F3935-93C4-4BCD-93E2-E3B085C9AB24}">
-                  <p16:designElem xmlns:p16="http://schemas.microsoft.com/office/powerpoint/2015/main" val="1"/>
-                </p:ext>
-              </p:extLst>
-            </p:nvPr>
-          </p:nvCxnSpPr>
-          <p:spPr>
-            <a:xfrm>
-              <a:off x="9371012" y="0"/>
-              <a:ext cx="1219200" cy="6858000"/>
-            </a:xfrm>
-            <a:prstGeom prst="line">
-              <a:avLst/>
-            </a:prstGeom>
-            <a:ln w="9525">
-              <a:solidFill>
-                <a:schemeClr val="bg1">
-                  <a:lumMod val="75000"/>
-                </a:schemeClr>
-              </a:solidFill>
-            </a:ln>
-          </p:spPr>
-          <p:style>
-            <a:lnRef idx="2">
-              <a:schemeClr val="accent1"/>
-            </a:lnRef>
-            <a:fillRef idx="0">
-              <a:schemeClr val="accent1"/>
-            </a:fillRef>
-            <a:effectRef idx="1">
-              <a:schemeClr val="accent1"/>
-            </a:effectRef>
-            <a:fontRef idx="minor">
-              <a:schemeClr val="tx1"/>
-            </a:fontRef>
-          </p:style>
-        </p:cxnSp>
-        <p:cxnSp>
-          <p:nvCxnSpPr>
-            <p:cNvPr id="73" name="Straight Connector 72">
-              <a:extLst>
-                <a:ext uri="{FF2B5EF4-FFF2-40B4-BE49-F238E27FC236}">
-                  <a16:creationId xmlns:a16="http://schemas.microsoft.com/office/drawing/2014/main" id="{498768D6-B28C-40A3-B381-39306F5816D5}"/>
-                </a:ext>
-                <a:ext uri="{C183D7F6-B498-43B3-948B-1728B52AA6E4}">
-                  <adec:decorative xmlns:adec="http://schemas.microsoft.com/office/drawing/2017/decorative" val="1"/>
-                </a:ext>
-              </a:extLst>
-            </p:cNvPr>
-            <p:cNvCxnSpPr/>
-            <p:nvPr>
-              <p:extLst>
-                <p:ext uri="{386F3935-93C4-4BCD-93E2-E3B085C9AB24}">
-                  <p16:designElem xmlns:p16="http://schemas.microsoft.com/office/powerpoint/2015/main" val="1"/>
-                </p:ext>
-              </p:extLst>
-            </p:nvPr>
-          </p:nvCxnSpPr>
-          <p:spPr>
-            <a:xfrm flipH="1">
-              <a:off x="7425267" y="3681413"/>
-              <a:ext cx="4763558" cy="3176587"/>
-            </a:xfrm>
-            <a:prstGeom prst="line">
-              <a:avLst/>
-            </a:prstGeom>
-            <a:ln w="9525">
-              <a:solidFill>
-                <a:schemeClr val="bg1">
-                  <a:lumMod val="85000"/>
-                </a:schemeClr>
-              </a:solidFill>
-            </a:ln>
-          </p:spPr>
-          <p:style>
-            <a:lnRef idx="2">
-              <a:schemeClr val="accent1"/>
-            </a:lnRef>
-            <a:fillRef idx="0">
-              <a:schemeClr val="accent1"/>
-            </a:fillRef>
-            <a:effectRef idx="1">
-              <a:schemeClr val="accent1"/>
-            </a:effectRef>
-            <a:fontRef idx="minor">
-              <a:schemeClr val="tx1"/>
-            </a:fontRef>
-          </p:style>
-        </p:cxnSp>
-        <p:sp>
-          <p:nvSpPr>
-            <p:cNvPr id="74" name="Rectangle 23">
-              <a:extLst>
-                <a:ext uri="{FF2B5EF4-FFF2-40B4-BE49-F238E27FC236}">
-                  <a16:creationId xmlns:a16="http://schemas.microsoft.com/office/drawing/2014/main" id="{B27C15B9-7795-4321-AB30-DF1DEF65C19E}"/>
-                </a:ext>
-                <a:ext uri="{C183D7F6-B498-43B3-948B-1728B52AA6E4}">
-                  <adec:decorative xmlns:adec="http://schemas.microsoft.com/office/drawing/2017/decorative" val="1"/>
-                </a:ext>
-              </a:extLst>
-            </p:cNvPr>
-            <p:cNvSpPr/>
-            <p:nvPr>
-              <p:extLst>
-                <p:ext uri="{386F3935-93C4-4BCD-93E2-E3B085C9AB24}">
-                  <p16:designElem xmlns:p16="http://schemas.microsoft.com/office/powerpoint/2015/main" val="1"/>
-                </p:ext>
-              </p:extLst>
-            </p:nvPr>
-          </p:nvSpPr>
-          <p:spPr>
-            <a:xfrm>
-              <a:off x="9181476" y="-8467"/>
-              <a:ext cx="3007349" cy="6866467"/>
-            </a:xfrm>
-            <a:custGeom>
-              <a:avLst/>
-              <a:gdLst/>
-              <a:ahLst/>
-              <a:cxnLst/>
-              <a:rect l="l" t="t" r="r" b="b"/>
-              <a:pathLst>
-                <a:path w="3007349" h="6866467">
-                  <a:moveTo>
-                    <a:pt x="2045532" y="0"/>
-                  </a:moveTo>
-                  <a:lnTo>
-                    <a:pt x="3007349" y="0"/>
-                  </a:lnTo>
-                  <a:lnTo>
-                    <a:pt x="3007349" y="6866467"/>
-                  </a:lnTo>
-                  <a:lnTo>
-                    <a:pt x="0" y="6866467"/>
-                  </a:lnTo>
-                  <a:lnTo>
-                    <a:pt x="2045532" y="0"/>
-                  </a:lnTo>
-                  <a:close/>
-                </a:path>
-              </a:pathLst>
-            </a:custGeom>
-            <a:solidFill>
-              <a:schemeClr val="accent1">
-                <a:alpha val="30000"/>
-              </a:schemeClr>
-            </a:solidFill>
-            <a:ln>
-              <a:noFill/>
-            </a:ln>
-            <a:effectLst/>
-          </p:spPr>
-          <p:style>
-            <a:lnRef idx="1">
-              <a:schemeClr val="accent1"/>
-            </a:lnRef>
-            <a:fillRef idx="3">
-              <a:schemeClr val="accent1"/>
-            </a:fillRef>
-            <a:effectRef idx="2">
-              <a:schemeClr val="accent1"/>
-            </a:effectRef>
-            <a:fontRef idx="minor">
-              <a:schemeClr val="lt1"/>
-            </a:fontRef>
-          </p:style>
-        </p:sp>
-        <p:sp>
-          <p:nvSpPr>
-            <p:cNvPr id="75" name="Rectangle 25">
-              <a:extLst>
-                <a:ext uri="{FF2B5EF4-FFF2-40B4-BE49-F238E27FC236}">
-                  <a16:creationId xmlns:a16="http://schemas.microsoft.com/office/drawing/2014/main" id="{578EC957-1F3F-4C00-B023-C8725C2171CB}"/>
-                </a:ext>
-                <a:ext uri="{C183D7F6-B498-43B3-948B-1728B52AA6E4}">
-                  <adec:decorative xmlns:adec="http://schemas.microsoft.com/office/drawing/2017/decorative" val="1"/>
-                </a:ext>
-              </a:extLst>
-            </p:cNvPr>
-            <p:cNvSpPr/>
-            <p:nvPr>
-              <p:extLst>
-                <p:ext uri="{386F3935-93C4-4BCD-93E2-E3B085C9AB24}">
-                  <p16:designElem xmlns:p16="http://schemas.microsoft.com/office/powerpoint/2015/main" val="1"/>
-                </p:ext>
-              </p:extLst>
-            </p:nvPr>
-          </p:nvSpPr>
-          <p:spPr>
-            <a:xfrm>
-              <a:off x="9603442" y="-8467"/>
-              <a:ext cx="2588558" cy="6866467"/>
-            </a:xfrm>
-            <a:custGeom>
-              <a:avLst/>
-              <a:gdLst/>
-              <a:ahLst/>
-              <a:cxnLst/>
-              <a:rect l="l" t="t" r="r" b="b"/>
-              <a:pathLst>
-                <a:path w="2573311" h="6866467">
-                  <a:moveTo>
-                    <a:pt x="0" y="0"/>
-                  </a:moveTo>
-                  <a:lnTo>
-                    <a:pt x="2573311" y="0"/>
-                  </a:lnTo>
-                  <a:lnTo>
-                    <a:pt x="2573311" y="6866467"/>
-                  </a:lnTo>
-                  <a:lnTo>
-                    <a:pt x="1202336" y="6866467"/>
-                  </a:lnTo>
-                  <a:lnTo>
-                    <a:pt x="0" y="0"/>
-                  </a:lnTo>
-                  <a:close/>
-                </a:path>
-              </a:pathLst>
-            </a:custGeom>
-            <a:solidFill>
-              <a:schemeClr val="accent1">
-                <a:alpha val="20000"/>
-              </a:schemeClr>
-            </a:solidFill>
-            <a:ln>
-              <a:noFill/>
-            </a:ln>
-            <a:effectLst/>
-          </p:spPr>
-          <p:style>
-            <a:lnRef idx="1">
-              <a:schemeClr val="accent1"/>
-            </a:lnRef>
-            <a:fillRef idx="3">
-              <a:schemeClr val="accent1"/>
-            </a:fillRef>
-            <a:effectRef idx="2">
-              <a:schemeClr val="accent1"/>
-            </a:effectRef>
-            <a:fontRef idx="minor">
-              <a:schemeClr val="lt1"/>
-            </a:fontRef>
-          </p:style>
-        </p:sp>
-        <p:sp>
-          <p:nvSpPr>
-            <p:cNvPr id="76" name="Isosceles Triangle 75">
-              <a:extLst>
-                <a:ext uri="{FF2B5EF4-FFF2-40B4-BE49-F238E27FC236}">
-                  <a16:creationId xmlns:a16="http://schemas.microsoft.com/office/drawing/2014/main" id="{3D642632-BBD5-46D6-A91D-9B2BF68219B7}"/>
-                </a:ext>
-                <a:ext uri="{C183D7F6-B498-43B3-948B-1728B52AA6E4}">
-                  <adec:decorative xmlns:adec="http://schemas.microsoft.com/office/drawing/2017/decorative" val="1"/>
-                </a:ext>
-              </a:extLst>
-            </p:cNvPr>
-            <p:cNvSpPr/>
-            <p:nvPr>
-              <p:extLst>
-                <p:ext uri="{386F3935-93C4-4BCD-93E2-E3B085C9AB24}">
-                  <p16:designElem xmlns:p16="http://schemas.microsoft.com/office/powerpoint/2015/main" val="1"/>
-                </p:ext>
-              </p:extLst>
-            </p:nvPr>
-          </p:nvSpPr>
-          <p:spPr>
-            <a:xfrm>
-              <a:off x="8932333" y="3048000"/>
-              <a:ext cx="3259667" cy="3810000"/>
-            </a:xfrm>
-            <a:prstGeom prst="triangle">
-              <a:avLst>
-                <a:gd name="adj" fmla="val 100000"/>
-              </a:avLst>
-            </a:prstGeom>
-            <a:solidFill>
-              <a:schemeClr val="accent2">
-                <a:alpha val="72000"/>
-              </a:schemeClr>
-            </a:solidFill>
-            <a:ln>
-              <a:noFill/>
-            </a:ln>
-            <a:effectLst/>
-          </p:spPr>
-          <p:style>
-            <a:lnRef idx="1">
-              <a:schemeClr val="accent1"/>
-            </a:lnRef>
-            <a:fillRef idx="3">
-              <a:schemeClr val="accent1"/>
-            </a:fillRef>
-            <a:effectRef idx="2">
-              <a:schemeClr val="accent1"/>
-            </a:effectRef>
-            <a:fontRef idx="minor">
-              <a:schemeClr val="lt1"/>
-            </a:fontRef>
-          </p:style>
-        </p:sp>
-        <p:sp>
-          <p:nvSpPr>
-            <p:cNvPr id="77" name="Rectangle 27">
-              <a:extLst>
-                <a:ext uri="{FF2B5EF4-FFF2-40B4-BE49-F238E27FC236}">
-                  <a16:creationId xmlns:a16="http://schemas.microsoft.com/office/drawing/2014/main" id="{BF9D518D-AFF5-4DE2-AEE2-0EC15479A9AF}"/>
-                </a:ext>
-                <a:ext uri="{C183D7F6-B498-43B3-948B-1728B52AA6E4}">
-                  <adec:decorative xmlns:adec="http://schemas.microsoft.com/office/drawing/2017/decorative" val="1"/>
-                </a:ext>
-              </a:extLst>
-            </p:cNvPr>
-            <p:cNvSpPr/>
-            <p:nvPr>
-              <p:extLst>
-                <p:ext uri="{386F3935-93C4-4BCD-93E2-E3B085C9AB24}">
-                  <p16:designElem xmlns:p16="http://schemas.microsoft.com/office/powerpoint/2015/main" val="1"/>
-                </p:ext>
-              </p:extLst>
-            </p:nvPr>
-          </p:nvSpPr>
-          <p:spPr>
-            <a:xfrm>
-              <a:off x="9334500" y="-8467"/>
-              <a:ext cx="2854326" cy="6866467"/>
-            </a:xfrm>
-            <a:custGeom>
-              <a:avLst/>
-              <a:gdLst/>
-              <a:ahLst/>
-              <a:cxnLst/>
-              <a:rect l="l" t="t" r="r" b="b"/>
-              <a:pathLst>
-                <a:path w="2858013" h="6866467">
-                  <a:moveTo>
-                    <a:pt x="0" y="0"/>
-                  </a:moveTo>
-                  <a:lnTo>
-                    <a:pt x="2858013" y="0"/>
-                  </a:lnTo>
-                  <a:lnTo>
-                    <a:pt x="2858013" y="6866467"/>
-                  </a:lnTo>
-                  <a:lnTo>
-                    <a:pt x="2473942" y="6866467"/>
-                  </a:lnTo>
-                  <a:lnTo>
-                    <a:pt x="0" y="0"/>
-                  </a:lnTo>
-                  <a:close/>
-                </a:path>
-              </a:pathLst>
-            </a:custGeom>
-            <a:solidFill>
-              <a:schemeClr val="accent2">
-                <a:lumMod val="75000"/>
-                <a:alpha val="70000"/>
-              </a:schemeClr>
-            </a:solidFill>
-            <a:ln>
-              <a:noFill/>
-            </a:ln>
-            <a:effectLst/>
-          </p:spPr>
-          <p:style>
-            <a:lnRef idx="1">
-              <a:schemeClr val="accent1"/>
-            </a:lnRef>
-            <a:fillRef idx="3">
-              <a:schemeClr val="accent1"/>
-            </a:fillRef>
-            <a:effectRef idx="2">
-              <a:schemeClr val="accent1"/>
-            </a:effectRef>
-            <a:fontRef idx="minor">
-              <a:schemeClr val="lt1"/>
-            </a:fontRef>
-          </p:style>
-        </p:sp>
-        <p:sp>
-          <p:nvSpPr>
-            <p:cNvPr id="78" name="Rectangle 28">
-              <a:extLst>
-                <a:ext uri="{FF2B5EF4-FFF2-40B4-BE49-F238E27FC236}">
-                  <a16:creationId xmlns:a16="http://schemas.microsoft.com/office/drawing/2014/main" id="{14EF979B-B00D-460C-BD56-7EEAFB7E0F98}"/>
-                </a:ext>
-                <a:ext uri="{C183D7F6-B498-43B3-948B-1728B52AA6E4}">
-                  <adec:decorative xmlns:adec="http://schemas.microsoft.com/office/drawing/2017/decorative" val="1"/>
-                </a:ext>
-              </a:extLst>
-            </p:cNvPr>
-            <p:cNvSpPr/>
-            <p:nvPr>
-              <p:extLst>
-                <p:ext uri="{386F3935-93C4-4BCD-93E2-E3B085C9AB24}">
-                  <p16:designElem xmlns:p16="http://schemas.microsoft.com/office/powerpoint/2015/main" val="1"/>
-                </p:ext>
-              </p:extLst>
-            </p:nvPr>
-          </p:nvSpPr>
-          <p:spPr>
-            <a:xfrm>
-              <a:off x="10898730" y="-8467"/>
-              <a:ext cx="1290094" cy="6866467"/>
-            </a:xfrm>
-            <a:custGeom>
-              <a:avLst/>
-              <a:gdLst/>
-              <a:ahLst/>
-              <a:cxnLst/>
-              <a:rect l="l" t="t" r="r" b="b"/>
-              <a:pathLst>
-                <a:path w="1290094" h="6858000">
-                  <a:moveTo>
-                    <a:pt x="1019735" y="0"/>
-                  </a:moveTo>
-                  <a:lnTo>
-                    <a:pt x="1290094" y="0"/>
-                  </a:lnTo>
-                  <a:lnTo>
-                    <a:pt x="1290094" y="6858000"/>
-                  </a:lnTo>
-                  <a:lnTo>
-                    <a:pt x="0" y="6858000"/>
-                  </a:lnTo>
-                  <a:lnTo>
-                    <a:pt x="1019735" y="0"/>
-                  </a:lnTo>
-                  <a:close/>
-                </a:path>
-              </a:pathLst>
-            </a:custGeom>
-            <a:solidFill>
-              <a:schemeClr val="accent1">
-                <a:lumMod val="60000"/>
-                <a:lumOff val="40000"/>
-                <a:alpha val="70000"/>
-              </a:schemeClr>
-            </a:solidFill>
-            <a:ln>
-              <a:noFill/>
-            </a:ln>
-            <a:effectLst/>
-          </p:spPr>
-          <p:style>
-            <a:lnRef idx="1">
-              <a:schemeClr val="accent1"/>
-            </a:lnRef>
-            <a:fillRef idx="3">
-              <a:schemeClr val="accent1"/>
-            </a:fillRef>
-            <a:effectRef idx="2">
-              <a:schemeClr val="accent1"/>
-            </a:effectRef>
-            <a:fontRef idx="minor">
-              <a:schemeClr val="lt1"/>
-            </a:fontRef>
-          </p:style>
-        </p:sp>
-        <p:sp>
-          <p:nvSpPr>
-            <p:cNvPr id="79" name="Rectangle 29">
-              <a:extLst>
-                <a:ext uri="{FF2B5EF4-FFF2-40B4-BE49-F238E27FC236}">
-                  <a16:creationId xmlns:a16="http://schemas.microsoft.com/office/drawing/2014/main" id="{3E40F9A1-6B82-400F-9397-26D1D36F1F04}"/>
-                </a:ext>
-                <a:ext uri="{C183D7F6-B498-43B3-948B-1728B52AA6E4}">
-                  <adec:decorative xmlns:adec="http://schemas.microsoft.com/office/drawing/2017/decorative" val="1"/>
-                </a:ext>
-              </a:extLst>
-            </p:cNvPr>
-            <p:cNvSpPr/>
-            <p:nvPr>
-              <p:extLst>
-                <p:ext uri="{386F3935-93C4-4BCD-93E2-E3B085C9AB24}">
-                  <p16:designElem xmlns:p16="http://schemas.microsoft.com/office/powerpoint/2015/main" val="1"/>
-                </p:ext>
-              </p:extLst>
-            </p:nvPr>
-          </p:nvSpPr>
-          <p:spPr>
-            <a:xfrm>
-              <a:off x="10938999" y="-8467"/>
-              <a:ext cx="1249825" cy="6866467"/>
-            </a:xfrm>
-            <a:custGeom>
-              <a:avLst/>
-              <a:gdLst/>
-              <a:ahLst/>
-              <a:cxnLst/>
-              <a:rect l="l" t="t" r="r" b="b"/>
-              <a:pathLst>
-                <a:path w="1249825" h="6858000">
-                  <a:moveTo>
-                    <a:pt x="0" y="0"/>
-                  </a:moveTo>
-                  <a:lnTo>
-                    <a:pt x="1249825" y="0"/>
-                  </a:lnTo>
-                  <a:lnTo>
-                    <a:pt x="1249825" y="6858000"/>
-                  </a:lnTo>
-                  <a:lnTo>
-                    <a:pt x="1109382" y="6858000"/>
-                  </a:lnTo>
-                  <a:lnTo>
-                    <a:pt x="0" y="0"/>
-                  </a:lnTo>
-                  <a:close/>
-                </a:path>
-              </a:pathLst>
-            </a:custGeom>
-            <a:solidFill>
-              <a:schemeClr val="accent1">
-                <a:alpha val="65000"/>
-              </a:schemeClr>
-            </a:solidFill>
-            <a:ln>
-              <a:noFill/>
-            </a:ln>
-            <a:effectLst/>
-          </p:spPr>
-          <p:style>
-            <a:lnRef idx="1">
-              <a:schemeClr val="accent1"/>
-            </a:lnRef>
-            <a:fillRef idx="3">
-              <a:schemeClr val="accent1"/>
-            </a:fillRef>
-            <a:effectRef idx="2">
-              <a:schemeClr val="accent1"/>
-            </a:effectRef>
-            <a:fontRef idx="minor">
-              <a:schemeClr val="lt1"/>
-            </a:fontRef>
-          </p:style>
-        </p:sp>
-        <p:sp>
-          <p:nvSpPr>
-            <p:cNvPr id="80" name="Isosceles Triangle 79">
-              <a:extLst>
-                <a:ext uri="{FF2B5EF4-FFF2-40B4-BE49-F238E27FC236}">
-                  <a16:creationId xmlns:a16="http://schemas.microsoft.com/office/drawing/2014/main" id="{2EF7DDF1-FF86-4CA4-B08B-8939557EBDB3}"/>
-                </a:ext>
-                <a:ext uri="{C183D7F6-B498-43B3-948B-1728B52AA6E4}">
-                  <adec:decorative xmlns:adec="http://schemas.microsoft.com/office/drawing/2017/decorative" val="1"/>
-                </a:ext>
-              </a:extLst>
-            </p:cNvPr>
-            <p:cNvSpPr/>
-            <p:nvPr>
-              <p:extLst>
-                <p:ext uri="{386F3935-93C4-4BCD-93E2-E3B085C9AB24}">
-                  <p16:designElem xmlns:p16="http://schemas.microsoft.com/office/powerpoint/2015/main" val="1"/>
-                </p:ext>
-              </p:extLst>
-            </p:nvPr>
-          </p:nvSpPr>
-          <p:spPr>
-            <a:xfrm>
-              <a:off x="10371666" y="3589867"/>
-              <a:ext cx="1817159" cy="3268133"/>
-            </a:xfrm>
-            <a:prstGeom prst="triangle">
-              <a:avLst>
-                <a:gd name="adj" fmla="val 100000"/>
-              </a:avLst>
-            </a:prstGeom>
-            <a:solidFill>
-              <a:schemeClr val="accent1">
-                <a:alpha val="80000"/>
-              </a:schemeClr>
-            </a:solidFill>
-            <a:ln>
-              <a:noFill/>
-            </a:ln>
-            <a:effectLst/>
-          </p:spPr>
-          <p:style>
-            <a:lnRef idx="1">
-              <a:schemeClr val="accent1"/>
-            </a:lnRef>
-            <a:fillRef idx="3">
-              <a:schemeClr val="accent1"/>
-            </a:fillRef>
-            <a:effectRef idx="2">
-              <a:schemeClr val="accent1"/>
-            </a:effectRef>
-            <a:fontRef idx="minor">
-              <a:schemeClr val="lt1"/>
-            </a:fontRef>
-          </p:style>
-        </p:sp>
-        <p:sp>
-          <p:nvSpPr>
-            <p:cNvPr id="81" name="Isosceles Triangle 80">
-              <a:extLst>
-                <a:ext uri="{FF2B5EF4-FFF2-40B4-BE49-F238E27FC236}">
-                  <a16:creationId xmlns:a16="http://schemas.microsoft.com/office/drawing/2014/main" id="{6D7C1F89-72B2-4FDC-B9E2-04F52D5C504C}"/>
-                </a:ext>
-                <a:ext uri="{C183D7F6-B498-43B3-948B-1728B52AA6E4}">
-                  <adec:decorative xmlns:adec="http://schemas.microsoft.com/office/drawing/2017/decorative" val="1"/>
-                </a:ext>
-              </a:extLst>
-            </p:cNvPr>
-            <p:cNvSpPr/>
-            <p:nvPr>
-              <p:extLst>
-                <p:ext uri="{386F3935-93C4-4BCD-93E2-E3B085C9AB24}">
-                  <p16:designElem xmlns:p16="http://schemas.microsoft.com/office/powerpoint/2015/main" val="1"/>
-                </p:ext>
-              </p:extLst>
-            </p:nvPr>
-          </p:nvSpPr>
-          <p:spPr>
-            <a:xfrm>
-              <a:off x="0" y="4013200"/>
-              <a:ext cx="448733" cy="2844800"/>
-            </a:xfrm>
-            <a:prstGeom prst="triangle">
-              <a:avLst>
-                <a:gd name="adj" fmla="val 0"/>
-              </a:avLst>
-            </a:prstGeom>
-            <a:solidFill>
-              <a:schemeClr val="accent1">
-                <a:alpha val="85000"/>
-              </a:schemeClr>
-            </a:solidFill>
-            <a:ln>
-              <a:noFill/>
-            </a:ln>
-            <a:effectLst/>
-          </p:spPr>
-          <p:style>
-            <a:lnRef idx="1">
-              <a:schemeClr val="accent1"/>
-            </a:lnRef>
-            <a:fillRef idx="3">
-              <a:schemeClr val="accent1"/>
-            </a:fillRef>
-            <a:effectRef idx="2">
-              <a:schemeClr val="accent1"/>
-            </a:effectRef>
-            <a:fontRef idx="minor">
-              <a:schemeClr val="lt1"/>
-            </a:fontRef>
-          </p:style>
-        </p:sp>
-      </p:grpSp>
-      <p:sp>
-        <p:nvSpPr>
-          <p:cNvPr id="2" name="Title 1">
-            <a:extLst>
-              <a:ext uri="{FF2B5EF4-FFF2-40B4-BE49-F238E27FC236}">
-                <a16:creationId xmlns:a16="http://schemas.microsoft.com/office/drawing/2014/main" id="{502F5AF9-EFCF-40FB-93EA-25378BF42EC4}"/>
-              </a:ext>
-            </a:extLst>
-          </p:cNvPr>
-          <p:cNvSpPr>
-            <a:spLocks noGrp="1"/>
-          </p:cNvSpPr>
-          <p:nvPr>
-            <p:ph type="ctrTitle"/>
-          </p:nvPr>
-        </p:nvSpPr>
-        <p:spPr>
-          <a:xfrm>
-            <a:off x="5489853" y="683550"/>
-            <a:ext cx="3737268" cy="1320800"/>
-          </a:xfrm>
-        </p:spPr>
-        <p:txBody>
-          <a:bodyPr vert="horz" lIns="91440" tIns="45720" rIns="91440" bIns="45720" rtlCol="0" anchor="t">
-            <a:normAutofit/>
-          </a:bodyPr>
-          <a:lstStyle/>
-          <a:p>
-            <a:pPr algn="l"/>
-            <a:r>
-              <a:rPr lang="en-US" sz="3600" dirty="0"/>
-              <a:t> Energy</a:t>
-            </a:r>
-            <a:br>
-              <a:rPr lang="en-US" sz="3600" dirty="0"/>
-            </a:br>
-            <a:r>
-              <a:rPr lang="en-US" sz="3600" dirty="0"/>
-              <a:t>Consumption</a:t>
-            </a:r>
-          </a:p>
-        </p:txBody>
-      </p:sp>
-      <p:sp>
-        <p:nvSpPr>
-          <p:cNvPr id="3" name="Subtitle 2">
-            <a:extLst>
-              <a:ext uri="{FF2B5EF4-FFF2-40B4-BE49-F238E27FC236}">
-                <a16:creationId xmlns:a16="http://schemas.microsoft.com/office/drawing/2014/main" id="{8BA0946D-E2A2-4473-A210-21BEEBB1C0A6}"/>
-              </a:ext>
-            </a:extLst>
-          </p:cNvPr>
-          <p:cNvSpPr>
-            <a:spLocks noGrp="1"/>
-          </p:cNvSpPr>
-          <p:nvPr>
-            <p:ph type="subTitle" idx="1"/>
-          </p:nvPr>
-        </p:nvSpPr>
-        <p:spPr>
-          <a:xfrm>
-            <a:off x="5209563" y="2160589"/>
-            <a:ext cx="4064439" cy="3880773"/>
-          </a:xfrm>
-        </p:spPr>
-        <p:txBody>
-          <a:bodyPr vert="horz" lIns="91440" tIns="45720" rIns="91440" bIns="45720" rtlCol="0">
-            <a:normAutofit lnSpcReduction="10000"/>
-          </a:bodyPr>
-          <a:lstStyle/>
-          <a:p>
-            <a:pPr algn="l">
-              <a:lnSpc>
-                <a:spcPct val="90000"/>
-              </a:lnSpc>
-              <a:buFont typeface="Wingdings 3" charset="2"/>
-              <a:buChar char=""/>
-            </a:pPr>
-            <a:r>
-              <a:rPr lang="en-US" dirty="0"/>
-              <a:t>Pulled in the data from 1999, 2001, 2009, 2015. We then matched all corresponding column names across these collection of years. We dropped the 1999  set of data as the majority of the columns did not align with the other sets. After our data cleaning, we merged into one CSV file the remaining years’ worth of data. We were then able to run Machine Learning tools such as </a:t>
-            </a:r>
-            <a:r>
-              <a:rPr lang="en-US" b="1" dirty="0"/>
-              <a:t>Feature Selector </a:t>
-            </a:r>
-            <a:r>
-              <a:rPr lang="en-US" dirty="0"/>
-              <a:t>and </a:t>
-            </a:r>
-            <a:r>
-              <a:rPr lang="en-US" b="1" dirty="0"/>
-              <a:t>PCA</a:t>
-            </a:r>
-            <a:r>
-              <a:rPr lang="en-US" dirty="0"/>
-              <a:t> to determine the amount of columns(features) necessary to predict how much of the gathered data is required for accurate model predicting. </a:t>
-            </a:r>
-            <a:endParaRPr lang="en-US" dirty="0">
-              <a:solidFill>
-                <a:schemeClr val="tx1">
-                  <a:lumMod val="75000"/>
-                  <a:lumOff val="25000"/>
-                </a:schemeClr>
-              </a:solidFill>
-            </a:endParaRPr>
-          </a:p>
-        </p:txBody>
-      </p:sp>
-      <p:pic>
-        <p:nvPicPr>
-          <p:cNvPr id="1026" name="Picture 2" descr="https://documents.lucidchart.com/documents/233a536f-648e-41e8-9e00-43553d57ef06/pages/0_0?a=1803&amp;x=305&amp;y=-43&amp;w=1210&amp;h=1386&amp;store=1&amp;accept=image%2F*&amp;auth=LCA%20fbe0311f437ef8228f2731f26026571b8c1bbea9-ts%3D1557696390">
-            <a:extLst>
-              <a:ext uri="{FF2B5EF4-FFF2-40B4-BE49-F238E27FC236}">
-                <a16:creationId xmlns:a16="http://schemas.microsoft.com/office/drawing/2014/main" id="{C5DAD888-C0BD-4B1B-A550-02819760D63D}"/>
+                <a16:creationId xmlns:a16="http://schemas.microsoft.com/office/drawing/2014/main" id="{8D17CDFF-85EB-484F-8EC8-4896704D22CF}"/>
               </a:ext>
             </a:extLst>
           </p:cNvPr>
           <p:cNvPicPr>
-            <a:picLocks noChangeAspect="1" noChangeArrowheads="1"/>
+            <a:picLocks noChangeAspect="1"/>
           </p:cNvPicPr>
           <p:nvPr/>
         </p:nvPicPr>
-        <p:blipFill rotWithShape="1">
+        <p:blipFill>
           <a:blip r:embed="rId2">
             <a:extLst>
               <a:ext uri="{28A0092B-C50C-407E-A947-70E740481C1C}">
@@ -6671,153 +5857,448 @@
               </a:ext>
             </a:extLst>
           </a:blip>
-          <a:srcRect l="1899" r="7992" b="-1"/>
-          <a:stretch/>
+          <a:stretch>
+            <a:fillRect/>
+          </a:stretch>
         </p:blipFill>
-        <p:spPr bwMode="auto">
+        <p:spPr>
           <a:xfrm>
-            <a:off x="-12465" y="0"/>
-            <a:ext cx="5394940" cy="6858001"/>
+            <a:off x="214745" y="29103"/>
+            <a:ext cx="4686300" cy="6791325"/>
           </a:xfrm>
-          <a:custGeom>
+          <a:prstGeom prst="rect">
             <a:avLst/>
-            <a:gdLst>
-              <a:gd name="connsiteX0" fmla="*/ 842596 w 5394960"/>
-              <a:gd name="connsiteY0" fmla="*/ 0 h 6858000"/>
-              <a:gd name="connsiteX1" fmla="*/ 5394960 w 5394960"/>
-              <a:gd name="connsiteY1" fmla="*/ 0 h 6858000"/>
-              <a:gd name="connsiteX2" fmla="*/ 5394960 w 5394960"/>
-              <a:gd name="connsiteY2" fmla="*/ 21851 h 6858000"/>
-              <a:gd name="connsiteX3" fmla="*/ 4365943 w 5394960"/>
-              <a:gd name="connsiteY3" fmla="*/ 6858000 h 6858000"/>
-              <a:gd name="connsiteX4" fmla="*/ 0 w 5394960"/>
-              <a:gd name="connsiteY4" fmla="*/ 6858000 h 6858000"/>
-              <a:gd name="connsiteX5" fmla="*/ 0 w 5394960"/>
-              <a:gd name="connsiteY5" fmla="*/ 5666154 h 6858000"/>
-            </a:gdLst>
-            <a:ahLst/>
-            <a:cxnLst>
-              <a:cxn ang="0">
-                <a:pos x="connsiteX0" y="connsiteY0"/>
-              </a:cxn>
-              <a:cxn ang="0">
-                <a:pos x="connsiteX1" y="connsiteY1"/>
-              </a:cxn>
-              <a:cxn ang="0">
-                <a:pos x="connsiteX2" y="connsiteY2"/>
-              </a:cxn>
-              <a:cxn ang="0">
-                <a:pos x="connsiteX3" y="connsiteY3"/>
-              </a:cxn>
-              <a:cxn ang="0">
-                <a:pos x="connsiteX4" y="connsiteY4"/>
-              </a:cxn>
-              <a:cxn ang="0">
-                <a:pos x="connsiteX5" y="connsiteY5"/>
-              </a:cxn>
-            </a:cxnLst>
-            <a:rect l="l" t="t" r="r" b="b"/>
-            <a:pathLst>
-              <a:path w="5394960" h="6858000">
-                <a:moveTo>
-                  <a:pt x="842596" y="0"/>
-                </a:moveTo>
-                <a:lnTo>
-                  <a:pt x="5394960" y="0"/>
-                </a:lnTo>
-                <a:lnTo>
-                  <a:pt x="5394960" y="21851"/>
-                </a:lnTo>
-                <a:lnTo>
-                  <a:pt x="4365943" y="6858000"/>
-                </a:lnTo>
-                <a:lnTo>
-                  <a:pt x="0" y="6858000"/>
-                </a:lnTo>
-                <a:lnTo>
-                  <a:pt x="0" y="5666154"/>
-                </a:lnTo>
-                <a:close/>
-              </a:path>
-            </a:pathLst>
-          </a:custGeom>
-          <a:noFill/>
-          <a:extLst>
-            <a:ext uri="{909E8E84-426E-40DD-AFC4-6F175D3DCCD1}">
-              <a14:hiddenFill xmlns:a14="http://schemas.microsoft.com/office/drawing/2010/main">
-                <a:solidFill>
-                  <a:srgbClr val="FFFFFF"/>
-                </a:solidFill>
-              </a14:hiddenFill>
-            </a:ext>
-          </a:extLst>
+          </a:prstGeom>
         </p:spPr>
       </p:pic>
       <p:sp>
         <p:nvSpPr>
-          <p:cNvPr id="83" name="Isosceles Triangle 82">
+          <p:cNvPr id="3" name="Title 1">
             <a:extLst>
               <a:ext uri="{FF2B5EF4-FFF2-40B4-BE49-F238E27FC236}">
-                <a16:creationId xmlns:a16="http://schemas.microsoft.com/office/drawing/2014/main" id="{3BCB5F6A-9EB0-40B0-9D13-3023E9A20508}"/>
-              </a:ext>
-              <a:ext uri="{C183D7F6-B498-43B3-948B-1728B52AA6E4}">
-                <adec:decorative xmlns:adec="http://schemas.microsoft.com/office/drawing/2017/decorative" val="1"/>
+                <a16:creationId xmlns:a16="http://schemas.microsoft.com/office/drawing/2014/main" id="{7B333C10-4148-4A0F-B9AC-02E6D045B0FA}"/>
               </a:ext>
             </a:extLst>
           </p:cNvPr>
-          <p:cNvSpPr>
-            <a:spLocks noGrp="1" noRot="1" noChangeAspect="1" noMove="1" noResize="1" noEditPoints="1" noAdjustHandles="1" noChangeArrowheads="1" noChangeShapeType="1" noTextEdit="1"/>
+          <p:cNvSpPr txBox="1">
+            <a:spLocks/>
           </p:cNvSpPr>
-          <p:nvPr>
-            <p:extLst>
-              <p:ext uri="{386F3935-93C4-4BCD-93E2-E3B085C9AB24}">
-                <p16:designElem xmlns:p16="http://schemas.microsoft.com/office/powerpoint/2015/main" val="1"/>
-              </p:ext>
-            </p:extLst>
-          </p:nvPr>
+          <p:nvPr/>
         </p:nvSpPr>
         <p:spPr>
-          <a:xfrm rot="10800000">
-            <a:off x="0" y="0"/>
-            <a:ext cx="842596" cy="5666154"/>
+          <a:xfrm>
+            <a:off x="5672069" y="574882"/>
+            <a:ext cx="3736975" cy="1320800"/>
           </a:xfrm>
-          <a:prstGeom prst="triangle">
-            <a:avLst>
-              <a:gd name="adj" fmla="val 100000"/>
-            </a:avLst>
+          <a:prstGeom prst="rect">
+            <a:avLst/>
           </a:prstGeom>
-          <a:solidFill>
-            <a:schemeClr val="accent1"/>
-          </a:solidFill>
-          <a:ln>
-            <a:noFill/>
-          </a:ln>
-          <a:effectLst/>
         </p:spPr>
-        <p:style>
-          <a:lnRef idx="1">
-            <a:schemeClr val="accent1"/>
-          </a:lnRef>
-          <a:fillRef idx="3">
-            <a:schemeClr val="accent1"/>
-          </a:fillRef>
-          <a:effectRef idx="2">
-            <a:schemeClr val="accent1"/>
-          </a:effectRef>
-          <a:fontRef idx="minor">
-            <a:schemeClr val="lt1"/>
-          </a:fontRef>
-        </p:style>
+        <p:txBody>
+          <a:bodyPr vert="horz" lIns="91440" tIns="45720" rIns="91440" bIns="45720" rtlCol="0" anchor="t">
+            <a:normAutofit fontScale="92500"/>
+          </a:bodyPr>
+          <a:lstStyle>
+            <a:lvl1pPr algn="l" defTabSz="457200" rtl="0" eaLnBrk="1" latinLnBrk="0" hangingPunct="1">
+              <a:spcBef>
+                <a:spcPct val="0"/>
+              </a:spcBef>
+              <a:buNone/>
+              <a:defRPr sz="3600" kern="1200">
+                <a:solidFill>
+                  <a:schemeClr val="accent1"/>
+                </a:solidFill>
+                <a:latin typeface="+mj-lt"/>
+                <a:ea typeface="+mj-ea"/>
+                <a:cs typeface="+mj-cs"/>
+              </a:defRPr>
+            </a:lvl1pPr>
+            <a:lvl2pPr eaLnBrk="1" hangingPunct="1">
+              <a:defRPr>
+                <a:solidFill>
+                  <a:schemeClr val="tx2"/>
+                </a:solidFill>
+              </a:defRPr>
+            </a:lvl2pPr>
+            <a:lvl3pPr eaLnBrk="1" hangingPunct="1">
+              <a:defRPr>
+                <a:solidFill>
+                  <a:schemeClr val="tx2"/>
+                </a:solidFill>
+              </a:defRPr>
+            </a:lvl3pPr>
+            <a:lvl4pPr eaLnBrk="1" hangingPunct="1">
+              <a:defRPr>
+                <a:solidFill>
+                  <a:schemeClr val="tx2"/>
+                </a:solidFill>
+              </a:defRPr>
+            </a:lvl4pPr>
+            <a:lvl5pPr eaLnBrk="1" hangingPunct="1">
+              <a:defRPr>
+                <a:solidFill>
+                  <a:schemeClr val="tx2"/>
+                </a:solidFill>
+              </a:defRPr>
+            </a:lvl5pPr>
+            <a:lvl6pPr eaLnBrk="1" hangingPunct="1">
+              <a:defRPr>
+                <a:solidFill>
+                  <a:schemeClr val="tx2"/>
+                </a:solidFill>
+              </a:defRPr>
+            </a:lvl6pPr>
+            <a:lvl7pPr eaLnBrk="1" hangingPunct="1">
+              <a:defRPr>
+                <a:solidFill>
+                  <a:schemeClr val="tx2"/>
+                </a:solidFill>
+              </a:defRPr>
+            </a:lvl7pPr>
+            <a:lvl8pPr eaLnBrk="1" hangingPunct="1">
+              <a:defRPr>
+                <a:solidFill>
+                  <a:schemeClr val="tx2"/>
+                </a:solidFill>
+              </a:defRPr>
+            </a:lvl8pPr>
+            <a:lvl9pPr eaLnBrk="1" hangingPunct="1">
+              <a:defRPr>
+                <a:solidFill>
+                  <a:schemeClr val="tx2"/>
+                </a:solidFill>
+              </a:defRPr>
+            </a:lvl9pPr>
+          </a:lstStyle>
+          <a:p>
+            <a:r>
+              <a:rPr lang="en-US" dirty="0"/>
+              <a:t>Predicting Energy</a:t>
+            </a:r>
+            <a:br>
+              <a:rPr lang="en-US" dirty="0"/>
+            </a:br>
+            <a:r>
+              <a:rPr lang="en-US" dirty="0"/>
+              <a:t>Consumption</a:t>
+            </a:r>
+          </a:p>
+        </p:txBody>
+      </p:sp>
+      <p:sp>
+        <p:nvSpPr>
+          <p:cNvPr id="4" name="Subtitle 2">
+            <a:extLst>
+              <a:ext uri="{FF2B5EF4-FFF2-40B4-BE49-F238E27FC236}">
+                <a16:creationId xmlns:a16="http://schemas.microsoft.com/office/drawing/2014/main" id="{8D801B9F-6875-4D6A-B2C6-FCBBD6E14DFA}"/>
+              </a:ext>
+            </a:extLst>
+          </p:cNvPr>
+          <p:cNvSpPr txBox="1">
+            <a:spLocks/>
+          </p:cNvSpPr>
+          <p:nvPr/>
+        </p:nvSpPr>
+        <p:spPr>
+          <a:xfrm>
+            <a:off x="5345044" y="2051257"/>
+            <a:ext cx="4064000" cy="3881437"/>
+          </a:xfrm>
+          <a:prstGeom prst="rect">
+            <a:avLst/>
+          </a:prstGeom>
+        </p:spPr>
+        <p:txBody>
+          <a:bodyPr vert="horz" lIns="91440" tIns="45720" rIns="91440" bIns="45720" rtlCol="0">
+            <a:normAutofit fontScale="92500" lnSpcReduction="20000"/>
+          </a:bodyPr>
+          <a:lstStyle>
+            <a:lvl1pPr marL="342900" indent="-342900" algn="l" defTabSz="457200" rtl="0" eaLnBrk="1" latinLnBrk="0" hangingPunct="1">
+              <a:spcBef>
+                <a:spcPts val="1000"/>
+              </a:spcBef>
+              <a:spcAft>
+                <a:spcPts val="0"/>
+              </a:spcAft>
+              <a:buClr>
+                <a:schemeClr val="accent1"/>
+              </a:buClr>
+              <a:buSzPct val="80000"/>
+              <a:buFont typeface="Wingdings 3" charset="2"/>
+              <a:buChar char=""/>
+              <a:defRPr sz="1800" kern="1200">
+                <a:solidFill>
+                  <a:schemeClr val="tx1">
+                    <a:lumMod val="75000"/>
+                    <a:lumOff val="25000"/>
+                  </a:schemeClr>
+                </a:solidFill>
+                <a:latin typeface="+mn-lt"/>
+                <a:ea typeface="+mn-ea"/>
+                <a:cs typeface="+mn-cs"/>
+              </a:defRPr>
+            </a:lvl1pPr>
+            <a:lvl2pPr marL="742950" indent="-285750" algn="l" defTabSz="457200" rtl="0" eaLnBrk="1" latinLnBrk="0" hangingPunct="1">
+              <a:spcBef>
+                <a:spcPts val="1000"/>
+              </a:spcBef>
+              <a:spcAft>
+                <a:spcPts val="0"/>
+              </a:spcAft>
+              <a:buClr>
+                <a:schemeClr val="accent1"/>
+              </a:buClr>
+              <a:buSzPct val="80000"/>
+              <a:buFont typeface="Wingdings 3" charset="2"/>
+              <a:buChar char=""/>
+              <a:defRPr sz="1600" kern="1200">
+                <a:solidFill>
+                  <a:schemeClr val="tx1">
+                    <a:lumMod val="75000"/>
+                    <a:lumOff val="25000"/>
+                  </a:schemeClr>
+                </a:solidFill>
+                <a:latin typeface="+mn-lt"/>
+                <a:ea typeface="+mn-ea"/>
+                <a:cs typeface="+mn-cs"/>
+              </a:defRPr>
+            </a:lvl2pPr>
+            <a:lvl3pPr marL="1143000" indent="-228600" algn="l" defTabSz="457200" rtl="0" eaLnBrk="1" latinLnBrk="0" hangingPunct="1">
+              <a:spcBef>
+                <a:spcPts val="1000"/>
+              </a:spcBef>
+              <a:spcAft>
+                <a:spcPts val="0"/>
+              </a:spcAft>
+              <a:buClr>
+                <a:schemeClr val="accent1"/>
+              </a:buClr>
+              <a:buSzPct val="80000"/>
+              <a:buFont typeface="Wingdings 3" charset="2"/>
+              <a:buChar char=""/>
+              <a:defRPr sz="1400" kern="1200">
+                <a:solidFill>
+                  <a:schemeClr val="tx1">
+                    <a:lumMod val="75000"/>
+                    <a:lumOff val="25000"/>
+                  </a:schemeClr>
+                </a:solidFill>
+                <a:latin typeface="+mn-lt"/>
+                <a:ea typeface="+mn-ea"/>
+                <a:cs typeface="+mn-cs"/>
+              </a:defRPr>
+            </a:lvl3pPr>
+            <a:lvl4pPr marL="1600200" indent="-228600" algn="l" defTabSz="457200" rtl="0" eaLnBrk="1" latinLnBrk="0" hangingPunct="1">
+              <a:spcBef>
+                <a:spcPts val="1000"/>
+              </a:spcBef>
+              <a:spcAft>
+                <a:spcPts val="0"/>
+              </a:spcAft>
+              <a:buClr>
+                <a:schemeClr val="accent1"/>
+              </a:buClr>
+              <a:buSzPct val="80000"/>
+              <a:buFont typeface="Wingdings 3" charset="2"/>
+              <a:buChar char=""/>
+              <a:defRPr sz="1200" kern="1200">
+                <a:solidFill>
+                  <a:schemeClr val="tx1">
+                    <a:lumMod val="75000"/>
+                    <a:lumOff val="25000"/>
+                  </a:schemeClr>
+                </a:solidFill>
+                <a:latin typeface="+mn-lt"/>
+                <a:ea typeface="+mn-ea"/>
+                <a:cs typeface="+mn-cs"/>
+              </a:defRPr>
+            </a:lvl4pPr>
+            <a:lvl5pPr marL="2057400" indent="-228600" algn="l" defTabSz="457200" rtl="0" eaLnBrk="1" latinLnBrk="0" hangingPunct="1">
+              <a:spcBef>
+                <a:spcPts val="1000"/>
+              </a:spcBef>
+              <a:spcAft>
+                <a:spcPts val="0"/>
+              </a:spcAft>
+              <a:buClr>
+                <a:schemeClr val="accent1"/>
+              </a:buClr>
+              <a:buSzPct val="80000"/>
+              <a:buFont typeface="Wingdings 3" charset="2"/>
+              <a:buChar char=""/>
+              <a:defRPr sz="1200" kern="1200">
+                <a:solidFill>
+                  <a:schemeClr val="tx1">
+                    <a:lumMod val="75000"/>
+                    <a:lumOff val="25000"/>
+                  </a:schemeClr>
+                </a:solidFill>
+                <a:latin typeface="+mn-lt"/>
+                <a:ea typeface="+mn-ea"/>
+                <a:cs typeface="+mn-cs"/>
+              </a:defRPr>
+            </a:lvl5pPr>
+            <a:lvl6pPr marL="2514600" indent="-228600" algn="l" defTabSz="457200" rtl="0" eaLnBrk="1" latinLnBrk="0" hangingPunct="1">
+              <a:spcBef>
+                <a:spcPts val="1000"/>
+              </a:spcBef>
+              <a:spcAft>
+                <a:spcPts val="0"/>
+              </a:spcAft>
+              <a:buClr>
+                <a:schemeClr val="accent1"/>
+              </a:buClr>
+              <a:buSzPct val="80000"/>
+              <a:buFont typeface="Wingdings 3" charset="2"/>
+              <a:buChar char=""/>
+              <a:defRPr sz="1200" kern="1200">
+                <a:solidFill>
+                  <a:schemeClr val="tx1">
+                    <a:lumMod val="75000"/>
+                    <a:lumOff val="25000"/>
+                  </a:schemeClr>
+                </a:solidFill>
+                <a:latin typeface="+mn-lt"/>
+                <a:ea typeface="+mn-ea"/>
+                <a:cs typeface="+mn-cs"/>
+              </a:defRPr>
+            </a:lvl6pPr>
+            <a:lvl7pPr marL="2971800" indent="-228600" algn="l" defTabSz="457200" rtl="0" eaLnBrk="1" latinLnBrk="0" hangingPunct="1">
+              <a:spcBef>
+                <a:spcPts val="1000"/>
+              </a:spcBef>
+              <a:spcAft>
+                <a:spcPts val="0"/>
+              </a:spcAft>
+              <a:buClr>
+                <a:schemeClr val="accent1"/>
+              </a:buClr>
+              <a:buSzPct val="80000"/>
+              <a:buFont typeface="Wingdings 3" charset="2"/>
+              <a:buChar char=""/>
+              <a:defRPr sz="1200" kern="1200">
+                <a:solidFill>
+                  <a:schemeClr val="tx1">
+                    <a:lumMod val="75000"/>
+                    <a:lumOff val="25000"/>
+                  </a:schemeClr>
+                </a:solidFill>
+                <a:latin typeface="+mn-lt"/>
+                <a:ea typeface="+mn-ea"/>
+                <a:cs typeface="+mn-cs"/>
+              </a:defRPr>
+            </a:lvl7pPr>
+            <a:lvl8pPr marL="3429000" indent="-228600" algn="l" defTabSz="457200" rtl="0" eaLnBrk="1" latinLnBrk="0" hangingPunct="1">
+              <a:spcBef>
+                <a:spcPts val="1000"/>
+              </a:spcBef>
+              <a:spcAft>
+                <a:spcPts val="0"/>
+              </a:spcAft>
+              <a:buClr>
+                <a:schemeClr val="accent1"/>
+              </a:buClr>
+              <a:buSzPct val="80000"/>
+              <a:buFont typeface="Wingdings 3" charset="2"/>
+              <a:buChar char=""/>
+              <a:defRPr sz="1200" kern="1200">
+                <a:solidFill>
+                  <a:schemeClr val="tx1">
+                    <a:lumMod val="75000"/>
+                    <a:lumOff val="25000"/>
+                  </a:schemeClr>
+                </a:solidFill>
+                <a:latin typeface="+mn-lt"/>
+                <a:ea typeface="+mn-ea"/>
+                <a:cs typeface="+mn-cs"/>
+              </a:defRPr>
+            </a:lvl8pPr>
+            <a:lvl9pPr marL="3886200" indent="-228600" algn="l" defTabSz="457200" rtl="0" eaLnBrk="1" latinLnBrk="0" hangingPunct="1">
+              <a:spcBef>
+                <a:spcPts val="1000"/>
+              </a:spcBef>
+              <a:spcAft>
+                <a:spcPts val="0"/>
+              </a:spcAft>
+              <a:buClr>
+                <a:schemeClr val="accent1"/>
+              </a:buClr>
+              <a:buSzPct val="80000"/>
+              <a:buFont typeface="Wingdings 3" charset="2"/>
+              <a:buChar char=""/>
+              <a:defRPr sz="1200" kern="1200">
+                <a:solidFill>
+                  <a:schemeClr val="tx1">
+                    <a:lumMod val="75000"/>
+                    <a:lumOff val="25000"/>
+                  </a:schemeClr>
+                </a:solidFill>
+                <a:latin typeface="+mn-lt"/>
+                <a:ea typeface="+mn-ea"/>
+                <a:cs typeface="+mn-cs"/>
+              </a:defRPr>
+            </a:lvl9pPr>
+          </a:lstStyle>
+          <a:p>
+            <a:pPr>
+              <a:lnSpc>
+                <a:spcPct val="90000"/>
+              </a:lnSpc>
+            </a:pPr>
+            <a:r>
+              <a:rPr lang="en-US" dirty="0"/>
+              <a:t>We are visualizing and predicting the usage of energy across the US. Our resource used was from the Residential Energy Consumption Survey(RECS).</a:t>
+            </a:r>
+          </a:p>
+          <a:p>
+            <a:pPr>
+              <a:lnSpc>
+                <a:spcPct val="90000"/>
+              </a:lnSpc>
+            </a:pPr>
+            <a:r>
+              <a:rPr lang="en-US" dirty="0"/>
+              <a:t>Pulled in the data from 1997, 2001, 2009, 2015. We then matched all corresponding column names across these collection of years. </a:t>
+            </a:r>
+          </a:p>
+          <a:p>
+            <a:pPr>
+              <a:lnSpc>
+                <a:spcPct val="90000"/>
+              </a:lnSpc>
+            </a:pPr>
+            <a:r>
+              <a:rPr lang="en-US" dirty="0"/>
+              <a:t>After our data cleaning, we merged into one CSV file the remaining years’ worth of data. We were then able to run Feature Engineering tools such as </a:t>
+            </a:r>
+            <a:r>
+              <a:rPr lang="en-US" b="1" dirty="0"/>
+              <a:t>Feature Selector </a:t>
+            </a:r>
+            <a:r>
+              <a:rPr lang="en-US" dirty="0"/>
+              <a:t>and </a:t>
+            </a:r>
+            <a:r>
+              <a:rPr lang="en-US" b="1" dirty="0"/>
+              <a:t>PCA</a:t>
+            </a:r>
+            <a:r>
+              <a:rPr lang="en-US" dirty="0"/>
+              <a:t> to determine the amount of columns(features) necessary to predict how much of the gathered data is required for accurate model predicting. </a:t>
+            </a:r>
+          </a:p>
+        </p:txBody>
       </p:sp>
     </p:spTree>
     <p:extLst>
       <p:ext uri="{BB962C8B-B14F-4D97-AF65-F5344CB8AC3E}">
-        <p14:creationId xmlns:p14="http://schemas.microsoft.com/office/powerpoint/2010/main" val="717377500"/>
+        <p14:creationId xmlns:p14="http://schemas.microsoft.com/office/powerpoint/2010/main" val="2587640500"/>
       </p:ext>
     </p:extLst>
   </p:cSld>
   <p:clrMapOvr>
-    <a:overrideClrMapping bg1="dk1" tx1="lt1" bg2="dk2" tx2="lt2" accent1="accent1" accent2="accent2" accent3="accent3" accent4="accent4" accent5="accent5" accent6="accent6" hlink="hlink" folHlink="folHlink"/>
+    <a:masterClrMapping/>
   </p:clrMapOvr>
 </p:sld>
 </file>
@@ -7557,7 +7038,7 @@
           <a:p>
             <a:r>
               <a:rPr lang="en-US" dirty="0"/>
-              <a:t>Principle Component Analysis (PCA) is a dimension-reduction tool. Plugging in the data from the combined set through PCA an elbow curve is created to show how many features can be used to predict model accuracy. Creating a scree plot of the results shows which components has a higher percentage of explained variance. The columns names from the RESC plot are represented as PC1, PC2, etc. A comparison can then be made between two components to further analyze the relationship between their data.</a:t>
+              <a:t>Principle Component Analysis (PCA) is a dimension-reduction tool. Plugging in the data from the combined set through PCA an elbow curve is created to show how many features can be used to predict model accuracy. Creating a scree plot of the results shows which components has a higher percentage of explained variance. The columns names from the RESC plot are represented as PC1, PC2, etc. A comparison can then be made between two components to further analyze the relationship between their data and the other features.</a:t>
             </a:r>
           </a:p>
           <a:p>
@@ -7640,7 +7121,7 @@
     </p:spTree>
     <p:extLst>
       <p:ext uri="{BB962C8B-B14F-4D97-AF65-F5344CB8AC3E}">
-        <p14:creationId xmlns:p14="http://schemas.microsoft.com/office/powerpoint/2010/main" val="2416016220"/>
+        <p14:creationId xmlns:p14="http://schemas.microsoft.com/office/powerpoint/2010/main" val="1494858421"/>
       </p:ext>
     </p:extLst>
   </p:cSld>
@@ -9826,10 +9307,40 @@
           <a:chExt cx="0" cy="0"/>
         </a:xfrm>
       </p:grpSpPr>
+      <p:pic>
+        <p:nvPicPr>
+          <p:cNvPr id="3" name="Picture 2">
+            <a:extLst>
+              <a:ext uri="{FF2B5EF4-FFF2-40B4-BE49-F238E27FC236}">
+                <a16:creationId xmlns:a16="http://schemas.microsoft.com/office/drawing/2014/main" id="{90911EFC-3AE3-4608-A219-167918256801}"/>
+              </a:ext>
+            </a:extLst>
+          </p:cNvPr>
+          <p:cNvPicPr>
+            <a:picLocks noChangeAspect="1"/>
+          </p:cNvPicPr>
+          <p:nvPr/>
+        </p:nvPicPr>
+        <p:blipFill>
+          <a:blip r:embed="rId2"/>
+          <a:stretch>
+            <a:fillRect/>
+          </a:stretch>
+        </p:blipFill>
+        <p:spPr>
+          <a:xfrm>
+            <a:off x="130036" y="162133"/>
+            <a:ext cx="8284462" cy="4499320"/>
+          </a:xfrm>
+          <a:prstGeom prst="rect">
+            <a:avLst/>
+          </a:prstGeom>
+        </p:spPr>
+      </p:pic>
     </p:spTree>
     <p:extLst>
       <p:ext uri="{BB962C8B-B14F-4D97-AF65-F5344CB8AC3E}">
-        <p14:creationId xmlns:p14="http://schemas.microsoft.com/office/powerpoint/2010/main" val="123469464"/>
+        <p14:creationId xmlns:p14="http://schemas.microsoft.com/office/powerpoint/2010/main" val="235030899"/>
       </p:ext>
     </p:extLst>
   </p:cSld>

</xml_diff>

<commit_message>
Updated presentation slides and Tableau
</commit_message>
<xml_diff>
--- a/PresentationSlide.pptx
+++ b/PresentationSlide.pptx
@@ -4,14 +4,19 @@
   <p:sldMasterIdLst>
     <p:sldMasterId id="2147483660" r:id="rId1"/>
   </p:sldMasterIdLst>
+  <p:notesMasterIdLst>
+    <p:notesMasterId r:id="rId11"/>
+  </p:notesMasterIdLst>
   <p:sldIdLst>
     <p:sldId id="263" r:id="rId2"/>
     <p:sldId id="257" r:id="rId3"/>
     <p:sldId id="258" r:id="rId4"/>
     <p:sldId id="265" r:id="rId5"/>
-    <p:sldId id="260" r:id="rId6"/>
+    <p:sldId id="266" r:id="rId6"/>
     <p:sldId id="262" r:id="rId7"/>
-    <p:sldId id="264" r:id="rId8"/>
+    <p:sldId id="267" r:id="rId8"/>
+    <p:sldId id="260" r:id="rId9"/>
+    <p:sldId id="264" r:id="rId10"/>
   </p:sldIdLst>
   <p:sldSz cx="12192000" cy="6858000"/>
   <p:notesSz cx="6858000" cy="9144000"/>
@@ -116,6 +121,663 @@
     </p:ext>
   </p:extLst>
 </p:presentation>
+</file>
+
+<file path=ppt/notesMasters/notesMaster1.xml><?xml version="1.0" encoding="utf-8"?>
+<p:notesMaster xmlns:a="http://schemas.openxmlformats.org/drawingml/2006/main" xmlns:r="http://schemas.openxmlformats.org/officeDocument/2006/relationships" xmlns:p="http://schemas.openxmlformats.org/presentationml/2006/main">
+  <p:cSld>
+    <p:bg>
+      <p:bgRef idx="1001">
+        <a:schemeClr val="bg1"/>
+      </p:bgRef>
+    </p:bg>
+    <p:spTree>
+      <p:nvGrpSpPr>
+        <p:cNvPr id="1" name=""/>
+        <p:cNvGrpSpPr/>
+        <p:nvPr/>
+      </p:nvGrpSpPr>
+      <p:grpSpPr>
+        <a:xfrm>
+          <a:off x="0" y="0"/>
+          <a:ext cx="0" cy="0"/>
+          <a:chOff x="0" y="0"/>
+          <a:chExt cx="0" cy="0"/>
+        </a:xfrm>
+      </p:grpSpPr>
+      <p:sp>
+        <p:nvSpPr>
+          <p:cNvPr id="2" name="Header Placeholder 1"/>
+          <p:cNvSpPr>
+            <a:spLocks noGrp="1"/>
+          </p:cNvSpPr>
+          <p:nvPr>
+            <p:ph type="hdr" sz="quarter"/>
+          </p:nvPr>
+        </p:nvSpPr>
+        <p:spPr>
+          <a:xfrm>
+            <a:off x="0" y="0"/>
+            <a:ext cx="2971800" cy="458788"/>
+          </a:xfrm>
+          <a:prstGeom prst="rect">
+            <a:avLst/>
+          </a:prstGeom>
+        </p:spPr>
+        <p:txBody>
+          <a:bodyPr vert="horz" lIns="91440" tIns="45720" rIns="91440" bIns="45720" rtlCol="0"/>
+          <a:lstStyle>
+            <a:lvl1pPr algn="l">
+              <a:defRPr sz="1200"/>
+            </a:lvl1pPr>
+          </a:lstStyle>
+          <a:p>
+            <a:endParaRPr lang="en-US"/>
+          </a:p>
+        </p:txBody>
+      </p:sp>
+      <p:sp>
+        <p:nvSpPr>
+          <p:cNvPr id="3" name="Date Placeholder 2"/>
+          <p:cNvSpPr>
+            <a:spLocks noGrp="1"/>
+          </p:cNvSpPr>
+          <p:nvPr>
+            <p:ph type="dt" idx="1"/>
+          </p:nvPr>
+        </p:nvSpPr>
+        <p:spPr>
+          <a:xfrm>
+            <a:off x="3884613" y="0"/>
+            <a:ext cx="2971800" cy="458788"/>
+          </a:xfrm>
+          <a:prstGeom prst="rect">
+            <a:avLst/>
+          </a:prstGeom>
+        </p:spPr>
+        <p:txBody>
+          <a:bodyPr vert="horz" lIns="91440" tIns="45720" rIns="91440" bIns="45720" rtlCol="0"/>
+          <a:lstStyle>
+            <a:lvl1pPr algn="r">
+              <a:defRPr sz="1200"/>
+            </a:lvl1pPr>
+          </a:lstStyle>
+          <a:p>
+            <a:fld id="{56736620-B21F-45EF-A4D5-5E8A85A3D184}" type="datetimeFigureOut">
+              <a:rPr lang="en-US" smtClean="0"/>
+              <a:t>5/15/2019</a:t>
+            </a:fld>
+            <a:endParaRPr lang="en-US"/>
+          </a:p>
+        </p:txBody>
+      </p:sp>
+      <p:sp>
+        <p:nvSpPr>
+          <p:cNvPr id="4" name="Slide Image Placeholder 3"/>
+          <p:cNvSpPr>
+            <a:spLocks noGrp="1" noRot="1" noChangeAspect="1"/>
+          </p:cNvSpPr>
+          <p:nvPr>
+            <p:ph type="sldImg" idx="2"/>
+          </p:nvPr>
+        </p:nvSpPr>
+        <p:spPr>
+          <a:xfrm>
+            <a:off x="685800" y="1143000"/>
+            <a:ext cx="5486400" cy="3086100"/>
+          </a:xfrm>
+          <a:prstGeom prst="rect">
+            <a:avLst/>
+          </a:prstGeom>
+          <a:noFill/>
+          <a:ln w="12700">
+            <a:solidFill>
+              <a:prstClr val="black"/>
+            </a:solidFill>
+          </a:ln>
+        </p:spPr>
+        <p:txBody>
+          <a:bodyPr vert="horz" lIns="91440" tIns="45720" rIns="91440" bIns="45720" rtlCol="0" anchor="ctr"/>
+          <a:lstStyle/>
+          <a:p>
+            <a:endParaRPr lang="en-US"/>
+          </a:p>
+        </p:txBody>
+      </p:sp>
+      <p:sp>
+        <p:nvSpPr>
+          <p:cNvPr id="5" name="Notes Placeholder 4"/>
+          <p:cNvSpPr>
+            <a:spLocks noGrp="1"/>
+          </p:cNvSpPr>
+          <p:nvPr>
+            <p:ph type="body" sz="quarter" idx="3"/>
+          </p:nvPr>
+        </p:nvSpPr>
+        <p:spPr>
+          <a:xfrm>
+            <a:off x="685800" y="4400550"/>
+            <a:ext cx="5486400" cy="3600450"/>
+          </a:xfrm>
+          <a:prstGeom prst="rect">
+            <a:avLst/>
+          </a:prstGeom>
+        </p:spPr>
+        <p:txBody>
+          <a:bodyPr vert="horz" lIns="91440" tIns="45720" rIns="91440" bIns="45720" rtlCol="0"/>
+          <a:lstStyle/>
+          <a:p>
+            <a:pPr lvl="0"/>
+            <a:r>
+              <a:rPr lang="en-US"/>
+              <a:t>Edit Master text styles</a:t>
+            </a:r>
+          </a:p>
+          <a:p>
+            <a:pPr lvl="1"/>
+            <a:r>
+              <a:rPr lang="en-US"/>
+              <a:t>Second level</a:t>
+            </a:r>
+          </a:p>
+          <a:p>
+            <a:pPr lvl="2"/>
+            <a:r>
+              <a:rPr lang="en-US"/>
+              <a:t>Third level</a:t>
+            </a:r>
+          </a:p>
+          <a:p>
+            <a:pPr lvl="3"/>
+            <a:r>
+              <a:rPr lang="en-US"/>
+              <a:t>Fourth level</a:t>
+            </a:r>
+          </a:p>
+          <a:p>
+            <a:pPr lvl="4"/>
+            <a:r>
+              <a:rPr lang="en-US"/>
+              <a:t>Fifth level</a:t>
+            </a:r>
+          </a:p>
+        </p:txBody>
+      </p:sp>
+      <p:sp>
+        <p:nvSpPr>
+          <p:cNvPr id="6" name="Footer Placeholder 5"/>
+          <p:cNvSpPr>
+            <a:spLocks noGrp="1"/>
+          </p:cNvSpPr>
+          <p:nvPr>
+            <p:ph type="ftr" sz="quarter" idx="4"/>
+          </p:nvPr>
+        </p:nvSpPr>
+        <p:spPr>
+          <a:xfrm>
+            <a:off x="0" y="8685213"/>
+            <a:ext cx="2971800" cy="458787"/>
+          </a:xfrm>
+          <a:prstGeom prst="rect">
+            <a:avLst/>
+          </a:prstGeom>
+        </p:spPr>
+        <p:txBody>
+          <a:bodyPr vert="horz" lIns="91440" tIns="45720" rIns="91440" bIns="45720" rtlCol="0" anchor="b"/>
+          <a:lstStyle>
+            <a:lvl1pPr algn="l">
+              <a:defRPr sz="1200"/>
+            </a:lvl1pPr>
+          </a:lstStyle>
+          <a:p>
+            <a:endParaRPr lang="en-US"/>
+          </a:p>
+        </p:txBody>
+      </p:sp>
+      <p:sp>
+        <p:nvSpPr>
+          <p:cNvPr id="7" name="Slide Number Placeholder 6"/>
+          <p:cNvSpPr>
+            <a:spLocks noGrp="1"/>
+          </p:cNvSpPr>
+          <p:nvPr>
+            <p:ph type="sldNum" sz="quarter" idx="5"/>
+          </p:nvPr>
+        </p:nvSpPr>
+        <p:spPr>
+          <a:xfrm>
+            <a:off x="3884613" y="8685213"/>
+            <a:ext cx="2971800" cy="458787"/>
+          </a:xfrm>
+          <a:prstGeom prst="rect">
+            <a:avLst/>
+          </a:prstGeom>
+        </p:spPr>
+        <p:txBody>
+          <a:bodyPr vert="horz" lIns="91440" tIns="45720" rIns="91440" bIns="45720" rtlCol="0" anchor="b"/>
+          <a:lstStyle>
+            <a:lvl1pPr algn="r">
+              <a:defRPr sz="1200"/>
+            </a:lvl1pPr>
+          </a:lstStyle>
+          <a:p>
+            <a:fld id="{647D67D4-9345-437C-A2F3-DBD4484A41A7}" type="slidenum">
+              <a:rPr lang="en-US" smtClean="0"/>
+              <a:t>‹#›</a:t>
+            </a:fld>
+            <a:endParaRPr lang="en-US"/>
+          </a:p>
+        </p:txBody>
+      </p:sp>
+    </p:spTree>
+    <p:extLst>
+      <p:ext uri="{BB962C8B-B14F-4D97-AF65-F5344CB8AC3E}">
+        <p14:creationId xmlns:p14="http://schemas.microsoft.com/office/powerpoint/2010/main" val="942088895"/>
+      </p:ext>
+    </p:extLst>
+  </p:cSld>
+  <p:clrMap bg1="lt1" tx1="dk1" bg2="lt2" tx2="dk2" accent1="accent1" accent2="accent2" accent3="accent3" accent4="accent4" accent5="accent5" accent6="accent6" hlink="hlink" folHlink="folHlink"/>
+  <p:notesStyle>
+    <a:lvl1pPr marL="0" algn="l" defTabSz="914400" rtl="0" eaLnBrk="1" latinLnBrk="0" hangingPunct="1">
+      <a:defRPr sz="1200" kern="1200">
+        <a:solidFill>
+          <a:schemeClr val="tx1"/>
+        </a:solidFill>
+        <a:latin typeface="+mn-lt"/>
+        <a:ea typeface="+mn-ea"/>
+        <a:cs typeface="+mn-cs"/>
+      </a:defRPr>
+    </a:lvl1pPr>
+    <a:lvl2pPr marL="457200" algn="l" defTabSz="914400" rtl="0" eaLnBrk="1" latinLnBrk="0" hangingPunct="1">
+      <a:defRPr sz="1200" kern="1200">
+        <a:solidFill>
+          <a:schemeClr val="tx1"/>
+        </a:solidFill>
+        <a:latin typeface="+mn-lt"/>
+        <a:ea typeface="+mn-ea"/>
+        <a:cs typeface="+mn-cs"/>
+      </a:defRPr>
+    </a:lvl2pPr>
+    <a:lvl3pPr marL="914400" algn="l" defTabSz="914400" rtl="0" eaLnBrk="1" latinLnBrk="0" hangingPunct="1">
+      <a:defRPr sz="1200" kern="1200">
+        <a:solidFill>
+          <a:schemeClr val="tx1"/>
+        </a:solidFill>
+        <a:latin typeface="+mn-lt"/>
+        <a:ea typeface="+mn-ea"/>
+        <a:cs typeface="+mn-cs"/>
+      </a:defRPr>
+    </a:lvl3pPr>
+    <a:lvl4pPr marL="1371600" algn="l" defTabSz="914400" rtl="0" eaLnBrk="1" latinLnBrk="0" hangingPunct="1">
+      <a:defRPr sz="1200" kern="1200">
+        <a:solidFill>
+          <a:schemeClr val="tx1"/>
+        </a:solidFill>
+        <a:latin typeface="+mn-lt"/>
+        <a:ea typeface="+mn-ea"/>
+        <a:cs typeface="+mn-cs"/>
+      </a:defRPr>
+    </a:lvl4pPr>
+    <a:lvl5pPr marL="1828800" algn="l" defTabSz="914400" rtl="0" eaLnBrk="1" latinLnBrk="0" hangingPunct="1">
+      <a:defRPr sz="1200" kern="1200">
+        <a:solidFill>
+          <a:schemeClr val="tx1"/>
+        </a:solidFill>
+        <a:latin typeface="+mn-lt"/>
+        <a:ea typeface="+mn-ea"/>
+        <a:cs typeface="+mn-cs"/>
+      </a:defRPr>
+    </a:lvl5pPr>
+    <a:lvl6pPr marL="2286000" algn="l" defTabSz="914400" rtl="0" eaLnBrk="1" latinLnBrk="0" hangingPunct="1">
+      <a:defRPr sz="1200" kern="1200">
+        <a:solidFill>
+          <a:schemeClr val="tx1"/>
+        </a:solidFill>
+        <a:latin typeface="+mn-lt"/>
+        <a:ea typeface="+mn-ea"/>
+        <a:cs typeface="+mn-cs"/>
+      </a:defRPr>
+    </a:lvl6pPr>
+    <a:lvl7pPr marL="2743200" algn="l" defTabSz="914400" rtl="0" eaLnBrk="1" latinLnBrk="0" hangingPunct="1">
+      <a:defRPr sz="1200" kern="1200">
+        <a:solidFill>
+          <a:schemeClr val="tx1"/>
+        </a:solidFill>
+        <a:latin typeface="+mn-lt"/>
+        <a:ea typeface="+mn-ea"/>
+        <a:cs typeface="+mn-cs"/>
+      </a:defRPr>
+    </a:lvl7pPr>
+    <a:lvl8pPr marL="3200400" algn="l" defTabSz="914400" rtl="0" eaLnBrk="1" latinLnBrk="0" hangingPunct="1">
+      <a:defRPr sz="1200" kern="1200">
+        <a:solidFill>
+          <a:schemeClr val="tx1"/>
+        </a:solidFill>
+        <a:latin typeface="+mn-lt"/>
+        <a:ea typeface="+mn-ea"/>
+        <a:cs typeface="+mn-cs"/>
+      </a:defRPr>
+    </a:lvl8pPr>
+    <a:lvl9pPr marL="3657600" algn="l" defTabSz="914400" rtl="0" eaLnBrk="1" latinLnBrk="0" hangingPunct="1">
+      <a:defRPr sz="1200" kern="1200">
+        <a:solidFill>
+          <a:schemeClr val="tx1"/>
+        </a:solidFill>
+        <a:latin typeface="+mn-lt"/>
+        <a:ea typeface="+mn-ea"/>
+        <a:cs typeface="+mn-cs"/>
+      </a:defRPr>
+    </a:lvl9pPr>
+  </p:notesStyle>
+</p:notesMaster>
+</file>
+
+<file path=ppt/notesSlides/notesSlide1.xml><?xml version="1.0" encoding="utf-8"?>
+<p:notes xmlns:a="http://schemas.openxmlformats.org/drawingml/2006/main" xmlns:r="http://schemas.openxmlformats.org/officeDocument/2006/relationships" xmlns:p="http://schemas.openxmlformats.org/presentationml/2006/main">
+  <p:cSld>
+    <p:spTree>
+      <p:nvGrpSpPr>
+        <p:cNvPr id="1" name=""/>
+        <p:cNvGrpSpPr/>
+        <p:nvPr/>
+      </p:nvGrpSpPr>
+      <p:grpSpPr>
+        <a:xfrm>
+          <a:off x="0" y="0"/>
+          <a:ext cx="0" cy="0"/>
+          <a:chOff x="0" y="0"/>
+          <a:chExt cx="0" cy="0"/>
+        </a:xfrm>
+      </p:grpSpPr>
+      <p:sp>
+        <p:nvSpPr>
+          <p:cNvPr id="2" name="Slide Image Placeholder 1"/>
+          <p:cNvSpPr>
+            <a:spLocks noGrp="1" noRot="1" noChangeAspect="1"/>
+          </p:cNvSpPr>
+          <p:nvPr>
+            <p:ph type="sldImg"/>
+          </p:nvPr>
+        </p:nvSpPr>
+        <p:spPr/>
+      </p:sp>
+      <p:sp>
+        <p:nvSpPr>
+          <p:cNvPr id="3" name="Notes Placeholder 2"/>
+          <p:cNvSpPr>
+            <a:spLocks noGrp="1"/>
+          </p:cNvSpPr>
+          <p:nvPr>
+            <p:ph type="body" idx="1"/>
+          </p:nvPr>
+        </p:nvSpPr>
+        <p:spPr/>
+        <p:txBody>
+          <a:bodyPr/>
+          <a:lstStyle/>
+          <a:p>
+            <a:r>
+              <a:rPr lang="en-US" sz="1200" kern="1200" dirty="0">
+                <a:solidFill>
+                  <a:schemeClr val="tx1"/>
+                </a:solidFill>
+                <a:effectLst/>
+                <a:latin typeface="+mn-lt"/>
+                <a:ea typeface="+mn-ea"/>
+                <a:cs typeface="+mn-cs"/>
+              </a:rPr>
+              <a:t>Random Forest method is used to classify into classes and predict the mean (regression) of the individual tree.</a:t>
+            </a:r>
+          </a:p>
+          <a:p>
+            <a:r>
+              <a:rPr lang="en-US" sz="1200" kern="1200" dirty="0">
+                <a:solidFill>
+                  <a:schemeClr val="tx1"/>
+                </a:solidFill>
+                <a:effectLst/>
+                <a:latin typeface="+mn-lt"/>
+                <a:ea typeface="+mn-ea"/>
+                <a:cs typeface="+mn-cs"/>
+              </a:rPr>
+              <a:t>Random forest corrects for decision tree habit of overfitting to the training data. </a:t>
+            </a:r>
+          </a:p>
+          <a:p>
+            <a:r>
+              <a:rPr lang="en-US" sz="1200" kern="1200" dirty="0">
+                <a:solidFill>
+                  <a:schemeClr val="tx1"/>
+                </a:solidFill>
+                <a:effectLst/>
+                <a:latin typeface="+mn-lt"/>
+                <a:ea typeface="+mn-ea"/>
+                <a:cs typeface="+mn-cs"/>
+              </a:rPr>
+              <a:t>We started with Base/Default model. The following steps were taken to create a final model.</a:t>
+            </a:r>
+          </a:p>
+          <a:p>
+            <a:pPr lvl="0"/>
+            <a:r>
+              <a:rPr lang="en-US" sz="1200" kern="1200" dirty="0">
+                <a:solidFill>
+                  <a:schemeClr val="tx1"/>
+                </a:solidFill>
+                <a:effectLst/>
+                <a:latin typeface="+mn-lt"/>
+                <a:ea typeface="+mn-ea"/>
+                <a:cs typeface="+mn-cs"/>
+              </a:rPr>
+              <a:t>The first step was to divide data into 'attributes' and 'label' sets. </a:t>
+            </a:r>
+          </a:p>
+          <a:p>
+            <a:pPr lvl="0"/>
+            <a:r>
+              <a:rPr lang="en-US" sz="1200" kern="1200" dirty="0">
+                <a:solidFill>
+                  <a:schemeClr val="tx1"/>
+                </a:solidFill>
+                <a:effectLst/>
+                <a:latin typeface="+mn-lt"/>
+                <a:ea typeface="+mn-ea"/>
+                <a:cs typeface="+mn-cs"/>
+              </a:rPr>
+              <a:t>The output data is then divided into training and test sets.</a:t>
+            </a:r>
+          </a:p>
+          <a:p>
+            <a:r>
+              <a:rPr lang="en-US" sz="1200" kern="1200" dirty="0">
+                <a:solidFill>
+                  <a:schemeClr val="tx1"/>
+                </a:solidFill>
+                <a:effectLst/>
+                <a:latin typeface="+mn-lt"/>
+                <a:ea typeface="+mn-ea"/>
+                <a:cs typeface="+mn-cs"/>
+              </a:rPr>
+              <a:t> Step 2: Tuning and train algorithm to solve regression problems via random forest</a:t>
+            </a:r>
+          </a:p>
+          <a:p>
+            <a:pPr lvl="0"/>
+            <a:r>
+              <a:rPr lang="en-US" sz="1200" kern="1200" dirty="0">
+                <a:solidFill>
+                  <a:schemeClr val="tx1"/>
+                </a:solidFill>
+                <a:effectLst/>
+                <a:latin typeface="+mn-lt"/>
+                <a:ea typeface="+mn-ea"/>
+                <a:cs typeface="+mn-cs"/>
+              </a:rPr>
+              <a:t>Tuned the model using the </a:t>
+            </a:r>
+            <a:r>
+              <a:rPr lang="en-US" sz="1200" kern="1200" dirty="0" err="1">
+                <a:solidFill>
+                  <a:schemeClr val="tx1"/>
+                </a:solidFill>
+                <a:effectLst/>
+                <a:latin typeface="+mn-lt"/>
+                <a:ea typeface="+mn-ea"/>
+                <a:cs typeface="+mn-cs"/>
+              </a:rPr>
+              <a:t>RandomForestRegressor</a:t>
+            </a:r>
+            <a:r>
+              <a:rPr lang="en-US" sz="1200" kern="1200" dirty="0">
+                <a:solidFill>
+                  <a:schemeClr val="tx1"/>
+                </a:solidFill>
+                <a:effectLst/>
+                <a:latin typeface="+mn-lt"/>
+                <a:ea typeface="+mn-ea"/>
+                <a:cs typeface="+mn-cs"/>
+              </a:rPr>
+              <a:t> class by adjusted </a:t>
+            </a:r>
+            <a:r>
+              <a:rPr lang="en-US" sz="1200" kern="1200" dirty="0" err="1">
+                <a:solidFill>
+                  <a:schemeClr val="tx1"/>
+                </a:solidFill>
+                <a:effectLst/>
+                <a:latin typeface="+mn-lt"/>
+                <a:ea typeface="+mn-ea"/>
+                <a:cs typeface="+mn-cs"/>
+              </a:rPr>
+              <a:t>n_estimators</a:t>
+            </a:r>
+            <a:r>
+              <a:rPr lang="en-US" sz="1200" kern="1200" dirty="0">
+                <a:solidFill>
+                  <a:schemeClr val="tx1"/>
+                </a:solidFill>
+                <a:effectLst/>
+                <a:latin typeface="+mn-lt"/>
+                <a:ea typeface="+mn-ea"/>
+                <a:cs typeface="+mn-cs"/>
+              </a:rPr>
+              <a:t> parameter.</a:t>
+            </a:r>
+          </a:p>
+          <a:p>
+            <a:pPr lvl="0"/>
+            <a:r>
+              <a:rPr lang="en-US" sz="1200" kern="1200" dirty="0">
+                <a:solidFill>
+                  <a:schemeClr val="tx1"/>
+                </a:solidFill>
+                <a:effectLst/>
+                <a:latin typeface="+mn-lt"/>
+                <a:ea typeface="+mn-ea"/>
+                <a:cs typeface="+mn-cs"/>
+              </a:rPr>
+              <a:t>This parameter defines the number of trees in the random forest. </a:t>
+            </a:r>
+          </a:p>
+          <a:p>
+            <a:r>
+              <a:rPr lang="en-US" sz="1200" kern="1200" dirty="0">
+                <a:solidFill>
+                  <a:schemeClr val="tx1"/>
+                </a:solidFill>
+                <a:effectLst/>
+                <a:latin typeface="+mn-lt"/>
+                <a:ea typeface="+mn-ea"/>
+                <a:cs typeface="+mn-cs"/>
+              </a:rPr>
+              <a:t>We started with </a:t>
+            </a:r>
+            <a:r>
+              <a:rPr lang="en-US" sz="1200" kern="1200" dirty="0" err="1">
+                <a:solidFill>
+                  <a:schemeClr val="tx1"/>
+                </a:solidFill>
+                <a:effectLst/>
+                <a:latin typeface="+mn-lt"/>
+                <a:ea typeface="+mn-ea"/>
+                <a:cs typeface="+mn-cs"/>
+              </a:rPr>
+              <a:t>n_estimator</a:t>
+            </a:r>
+            <a:r>
+              <a:rPr lang="en-US" sz="1200" kern="1200" dirty="0">
+                <a:solidFill>
+                  <a:schemeClr val="tx1"/>
+                </a:solidFill>
+                <a:effectLst/>
+                <a:latin typeface="+mn-lt"/>
+                <a:ea typeface="+mn-ea"/>
+                <a:cs typeface="+mn-cs"/>
+              </a:rPr>
+              <a:t>=20 and end up to </a:t>
+            </a:r>
+            <a:r>
+              <a:rPr lang="en-US" sz="1200" kern="1200" dirty="0" err="1">
+                <a:solidFill>
+                  <a:schemeClr val="tx1"/>
+                </a:solidFill>
+                <a:effectLst/>
+                <a:latin typeface="+mn-lt"/>
+                <a:ea typeface="+mn-ea"/>
+                <a:cs typeface="+mn-cs"/>
+              </a:rPr>
+              <a:t>n_estimator</a:t>
+            </a:r>
+            <a:r>
+              <a:rPr lang="en-US" sz="1200" kern="1200" dirty="0">
+                <a:solidFill>
+                  <a:schemeClr val="tx1"/>
+                </a:solidFill>
+                <a:effectLst/>
+                <a:latin typeface="+mn-lt"/>
+                <a:ea typeface="+mn-ea"/>
+                <a:cs typeface="+mn-cs"/>
+              </a:rPr>
+              <a:t>=50  to see how our algorithm performs</a:t>
+            </a:r>
+            <a:endParaRPr lang="en-US" dirty="0"/>
+          </a:p>
+        </p:txBody>
+      </p:sp>
+      <p:sp>
+        <p:nvSpPr>
+          <p:cNvPr id="4" name="Slide Number Placeholder 3"/>
+          <p:cNvSpPr>
+            <a:spLocks noGrp="1"/>
+          </p:cNvSpPr>
+          <p:nvPr>
+            <p:ph type="sldNum" sz="quarter" idx="5"/>
+          </p:nvPr>
+        </p:nvSpPr>
+        <p:spPr/>
+        <p:txBody>
+          <a:bodyPr/>
+          <a:lstStyle/>
+          <a:p>
+            <a:fld id="{411C63C0-2ADB-44D4-A4AA-D8C1D40839B4}" type="slidenum">
+              <a:rPr lang="en-US" smtClean="0"/>
+              <a:t>7</a:t>
+            </a:fld>
+            <a:endParaRPr lang="en-US"/>
+          </a:p>
+        </p:txBody>
+      </p:sp>
+    </p:spTree>
+    <p:extLst>
+      <p:ext uri="{BB962C8B-B14F-4D97-AF65-F5344CB8AC3E}">
+        <p14:creationId xmlns:p14="http://schemas.microsoft.com/office/powerpoint/2010/main" val="2067897496"/>
+      </p:ext>
+    </p:extLst>
+  </p:cSld>
+  <p:clrMapOvr>
+    <a:masterClrMapping/>
+  </p:clrMapOvr>
+</p:notes>
 </file>
 
 <file path=ppt/slideLayouts/slideLayout1.xml><?xml version="1.0" encoding="utf-8"?>
@@ -840,7 +1502,7 @@
           <a:p>
             <a:fld id="{7A82A0F7-BB1D-413C-A3FC-04CC3F8F42C9}" type="datetimeFigureOut">
               <a:rPr lang="en-US" smtClean="0"/>
-              <a:t>5/14/2019</a:t>
+              <a:t>5/15/2019</a:t>
             </a:fld>
             <a:endParaRPr lang="en-US"/>
           </a:p>
@@ -1091,7 +1753,7 @@
           <a:p>
             <a:fld id="{7A82A0F7-BB1D-413C-A3FC-04CC3F8F42C9}" type="datetimeFigureOut">
               <a:rPr lang="en-US" smtClean="0"/>
-              <a:t>5/14/2019</a:t>
+              <a:t>5/15/2019</a:t>
             </a:fld>
             <a:endParaRPr lang="en-US"/>
           </a:p>
@@ -1405,7 +2067,7 @@
           <a:p>
             <a:fld id="{7A82A0F7-BB1D-413C-A3FC-04CC3F8F42C9}" type="datetimeFigureOut">
               <a:rPr lang="en-US" smtClean="0"/>
-              <a:t>5/14/2019</a:t>
+              <a:t>5/15/2019</a:t>
             </a:fld>
             <a:endParaRPr lang="en-US"/>
           </a:p>
@@ -1746,7 +2408,7 @@
           <a:p>
             <a:fld id="{7A82A0F7-BB1D-413C-A3FC-04CC3F8F42C9}" type="datetimeFigureOut">
               <a:rPr lang="en-US" smtClean="0"/>
-              <a:t>5/14/2019</a:t>
+              <a:t>5/15/2019</a:t>
             </a:fld>
             <a:endParaRPr lang="en-US"/>
           </a:p>
@@ -2060,7 +2722,7 @@
           <a:p>
             <a:fld id="{7A82A0F7-BB1D-413C-A3FC-04CC3F8F42C9}" type="datetimeFigureOut">
               <a:rPr lang="en-US" smtClean="0"/>
-              <a:t>5/14/2019</a:t>
+              <a:t>5/15/2019</a:t>
             </a:fld>
             <a:endParaRPr lang="en-US"/>
           </a:p>
@@ -2453,7 +3115,7 @@
           <a:p>
             <a:fld id="{7A82A0F7-BB1D-413C-A3FC-04CC3F8F42C9}" type="datetimeFigureOut">
               <a:rPr lang="en-US" smtClean="0"/>
-              <a:t>5/14/2019</a:t>
+              <a:t>5/15/2019</a:t>
             </a:fld>
             <a:endParaRPr lang="en-US"/>
           </a:p>
@@ -2623,7 +3285,7 @@
           <a:p>
             <a:fld id="{7A82A0F7-BB1D-413C-A3FC-04CC3F8F42C9}" type="datetimeFigureOut">
               <a:rPr lang="en-US" smtClean="0"/>
-              <a:t>5/14/2019</a:t>
+              <a:t>5/15/2019</a:t>
             </a:fld>
             <a:endParaRPr lang="en-US"/>
           </a:p>
@@ -2803,7 +3465,7 @@
           <a:p>
             <a:fld id="{7A82A0F7-BB1D-413C-A3FC-04CC3F8F42C9}" type="datetimeFigureOut">
               <a:rPr lang="en-US" smtClean="0"/>
-              <a:t>5/14/2019</a:t>
+              <a:t>5/15/2019</a:t>
             </a:fld>
             <a:endParaRPr lang="en-US"/>
           </a:p>
@@ -2979,7 +3641,7 @@
           <a:p>
             <a:fld id="{7A82A0F7-BB1D-413C-A3FC-04CC3F8F42C9}" type="datetimeFigureOut">
               <a:rPr lang="en-US" smtClean="0"/>
-              <a:t>5/14/2019</a:t>
+              <a:t>5/15/2019</a:t>
             </a:fld>
             <a:endParaRPr lang="en-US"/>
           </a:p>
@@ -3226,7 +3888,7 @@
           <a:p>
             <a:fld id="{7A82A0F7-BB1D-413C-A3FC-04CC3F8F42C9}" type="datetimeFigureOut">
               <a:rPr lang="en-US" smtClean="0"/>
-              <a:t>5/14/2019</a:t>
+              <a:t>5/15/2019</a:t>
             </a:fld>
             <a:endParaRPr lang="en-US"/>
           </a:p>
@@ -3458,7 +4120,7 @@
           <a:p>
             <a:fld id="{7A82A0F7-BB1D-413C-A3FC-04CC3F8F42C9}" type="datetimeFigureOut">
               <a:rPr lang="en-US" smtClean="0"/>
-              <a:t>5/14/2019</a:t>
+              <a:t>5/15/2019</a:t>
             </a:fld>
             <a:endParaRPr lang="en-US"/>
           </a:p>
@@ -3832,7 +4494,7 @@
           <a:p>
             <a:fld id="{7A82A0F7-BB1D-413C-A3FC-04CC3F8F42C9}" type="datetimeFigureOut">
               <a:rPr lang="en-US" smtClean="0"/>
-              <a:t>5/14/2019</a:t>
+              <a:t>5/15/2019</a:t>
             </a:fld>
             <a:endParaRPr lang="en-US"/>
           </a:p>
@@ -3955,7 +4617,7 @@
           <a:p>
             <a:fld id="{7A82A0F7-BB1D-413C-A3FC-04CC3F8F42C9}" type="datetimeFigureOut">
               <a:rPr lang="en-US" smtClean="0"/>
-              <a:t>5/14/2019</a:t>
+              <a:t>5/15/2019</a:t>
             </a:fld>
             <a:endParaRPr lang="en-US"/>
           </a:p>
@@ -4050,7 +4712,7 @@
           <a:p>
             <a:fld id="{7A82A0F7-BB1D-413C-A3FC-04CC3F8F42C9}" type="datetimeFigureOut">
               <a:rPr lang="en-US" smtClean="0"/>
-              <a:t>5/14/2019</a:t>
+              <a:t>5/15/2019</a:t>
             </a:fld>
             <a:endParaRPr lang="en-US"/>
           </a:p>
@@ -4305,7 +4967,7 @@
           <a:p>
             <a:fld id="{7A82A0F7-BB1D-413C-A3FC-04CC3F8F42C9}" type="datetimeFigureOut">
               <a:rPr lang="en-US" smtClean="0"/>
-              <a:t>5/14/2019</a:t>
+              <a:t>5/15/2019</a:t>
             </a:fld>
             <a:endParaRPr lang="en-US"/>
           </a:p>
@@ -4568,7 +5230,7 @@
           <a:p>
             <a:fld id="{7A82A0F7-BB1D-413C-A3FC-04CC3F8F42C9}" type="datetimeFigureOut">
               <a:rPr lang="en-US" smtClean="0"/>
-              <a:t>5/14/2019</a:t>
+              <a:t>5/15/2019</a:t>
             </a:fld>
             <a:endParaRPr lang="en-US"/>
           </a:p>
@@ -5311,7 +5973,7 @@
           <a:p>
             <a:fld id="{7A82A0F7-BB1D-413C-A3FC-04CC3F8F42C9}" type="datetimeFigureOut">
               <a:rPr lang="en-US" smtClean="0"/>
-              <a:t>5/14/2019</a:t>
+              <a:t>5/15/2019</a:t>
             </a:fld>
             <a:endParaRPr lang="en-US"/>
           </a:p>
@@ -7032,13 +7694,37 @@
         </p:spPr>
         <p:txBody>
           <a:bodyPr>
-            <a:normAutofit fontScale="92500"/>
+            <a:normAutofit fontScale="92500" lnSpcReduction="20000"/>
           </a:bodyPr>
           <a:lstStyle/>
           <a:p>
+            <a:pPr marL="285750" indent="-285750">
+              <a:buFont typeface="Wingdings" panose="05000000000000000000" pitchFamily="2" charset="2"/>
+              <a:buChar char="Ø"/>
+            </a:pPr>
             <a:r>
               <a:rPr lang="en-US" dirty="0"/>
-              <a:t>Principle Component Analysis (PCA) is a dimension-reduction tool. Plugging in the data from the combined set through PCA an elbow curve is created to show how many features can be used to predict model accuracy. Creating a scree plot of the results shows which components has a higher percentage of explained variance. The columns names from the RESC plot are represented as PC1, PC2, etc. A comparison can then be made between two components to further analyze the relationship between their data and the other features.</a:t>
+              <a:t>Principle Component Analysis (PCA) is a dimension-reduction tool. Plugging in the data from the combined set through PCA an elbow curve is created to show how many features can be used to predict model accuracy. </a:t>
+            </a:r>
+          </a:p>
+          <a:p>
+            <a:pPr marL="285750" indent="-285750">
+              <a:buFont typeface="Wingdings" panose="05000000000000000000" pitchFamily="2" charset="2"/>
+              <a:buChar char="Ø"/>
+            </a:pPr>
+            <a:r>
+              <a:rPr lang="en-US" dirty="0"/>
+              <a:t>Creating a scree plot of the results shows which components has a higher percentage of explained variance. </a:t>
+            </a:r>
+          </a:p>
+          <a:p>
+            <a:pPr marL="285750" indent="-285750">
+              <a:buFont typeface="Wingdings" panose="05000000000000000000" pitchFamily="2" charset="2"/>
+              <a:buChar char="Ø"/>
+            </a:pPr>
+            <a:r>
+              <a:rPr lang="en-US" dirty="0"/>
+              <a:t>The columns names from the RESC plot are represented as PC1, PC2, etc. A comparison can then be made between two components to further analyze the relationship between their data and the other features.</a:t>
             </a:r>
           </a:p>
           <a:p>
@@ -7132,6 +7818,2507 @@
 </file>
 
 <file path=ppt/slides/slide5.xml><?xml version="1.0" encoding="utf-8"?>
+<p:sld xmlns:a="http://schemas.openxmlformats.org/drawingml/2006/main" xmlns:r="http://schemas.openxmlformats.org/officeDocument/2006/relationships" xmlns:p="http://schemas.openxmlformats.org/presentationml/2006/main">
+  <p:cSld>
+    <p:spTree>
+      <p:nvGrpSpPr>
+        <p:cNvPr id="1" name=""/>
+        <p:cNvGrpSpPr/>
+        <p:nvPr/>
+      </p:nvGrpSpPr>
+      <p:grpSpPr>
+        <a:xfrm>
+          <a:off x="0" y="0"/>
+          <a:ext cx="0" cy="0"/>
+          <a:chOff x="0" y="0"/>
+          <a:chExt cx="0" cy="0"/>
+        </a:xfrm>
+      </p:grpSpPr>
+      <p:sp>
+        <p:nvSpPr>
+          <p:cNvPr id="2" name="Title 1">
+            <a:extLst>
+              <a:ext uri="{FF2B5EF4-FFF2-40B4-BE49-F238E27FC236}">
+                <a16:creationId xmlns:a16="http://schemas.microsoft.com/office/drawing/2014/main" id="{7F615C70-C301-4F7E-9CEF-A247EEEA29F8}"/>
+              </a:ext>
+            </a:extLst>
+          </p:cNvPr>
+          <p:cNvSpPr>
+            <a:spLocks noGrp="1"/>
+          </p:cNvSpPr>
+          <p:nvPr>
+            <p:ph type="title"/>
+          </p:nvPr>
+        </p:nvSpPr>
+        <p:spPr>
+          <a:xfrm>
+            <a:off x="607484" y="514924"/>
+            <a:ext cx="3854528" cy="323846"/>
+          </a:xfrm>
+        </p:spPr>
+        <p:txBody>
+          <a:bodyPr>
+            <a:normAutofit fontScale="90000"/>
+          </a:bodyPr>
+          <a:lstStyle/>
+          <a:p>
+            <a:r>
+              <a:rPr lang="en-US" dirty="0" err="1"/>
+              <a:t>KMeans</a:t>
+            </a:r>
+            <a:r>
+              <a:rPr lang="en-US" dirty="0"/>
+              <a:t> with PCA components</a:t>
+            </a:r>
+          </a:p>
+        </p:txBody>
+      </p:sp>
+      <p:pic>
+        <p:nvPicPr>
+          <p:cNvPr id="6" name="Content Placeholder 5">
+            <a:extLst>
+              <a:ext uri="{FF2B5EF4-FFF2-40B4-BE49-F238E27FC236}">
+                <a16:creationId xmlns:a16="http://schemas.microsoft.com/office/drawing/2014/main" id="{E44139E4-D5DE-45E0-B83B-41CC47879082}"/>
+              </a:ext>
+            </a:extLst>
+          </p:cNvPr>
+          <p:cNvPicPr>
+            <a:picLocks noGrp="1" noChangeAspect="1"/>
+          </p:cNvPicPr>
+          <p:nvPr>
+            <p:ph idx="1"/>
+          </p:nvPr>
+        </p:nvPicPr>
+        <p:blipFill>
+          <a:blip r:embed="rId2">
+            <a:extLst>
+              <a:ext uri="{28A0092B-C50C-407E-A947-70E740481C1C}">
+                <a14:useLocalDpi xmlns:a14="http://schemas.microsoft.com/office/drawing/2010/main" val="0"/>
+              </a:ext>
+            </a:extLst>
+          </a:blip>
+          <a:stretch>
+            <a:fillRect/>
+          </a:stretch>
+        </p:blipFill>
+        <p:spPr>
+          <a:xfrm>
+            <a:off x="4843209" y="514924"/>
+            <a:ext cx="4035615" cy="2690410"/>
+          </a:xfrm>
+        </p:spPr>
+      </p:pic>
+      <p:sp>
+        <p:nvSpPr>
+          <p:cNvPr id="4" name="Text Placeholder 3">
+            <a:extLst>
+              <a:ext uri="{FF2B5EF4-FFF2-40B4-BE49-F238E27FC236}">
+                <a16:creationId xmlns:a16="http://schemas.microsoft.com/office/drawing/2014/main" id="{F671B5A6-CD41-4CF7-89A2-808CA8593432}"/>
+              </a:ext>
+            </a:extLst>
+          </p:cNvPr>
+          <p:cNvSpPr>
+            <a:spLocks noGrp="1"/>
+          </p:cNvSpPr>
+          <p:nvPr>
+            <p:ph type="body" sz="half" idx="2"/>
+          </p:nvPr>
+        </p:nvSpPr>
+        <p:spPr>
+          <a:xfrm>
+            <a:off x="607484" y="1049869"/>
+            <a:ext cx="3854528" cy="2584449"/>
+          </a:xfrm>
+        </p:spPr>
+        <p:txBody>
+          <a:bodyPr>
+            <a:normAutofit fontScale="77500" lnSpcReduction="20000"/>
+          </a:bodyPr>
+          <a:lstStyle/>
+          <a:p>
+            <a:pPr marL="285750" indent="-285750">
+              <a:buFont typeface="Wingdings" panose="05000000000000000000" pitchFamily="2" charset="2"/>
+              <a:buChar char="Ø"/>
+            </a:pPr>
+            <a:r>
+              <a:rPr lang="en-US" dirty="0"/>
+              <a:t>After exporting the PCA components, we reimport the new CSV to use for </a:t>
+            </a:r>
+            <a:r>
+              <a:rPr lang="en-US" dirty="0" err="1"/>
+              <a:t>KMeans</a:t>
+            </a:r>
+            <a:r>
+              <a:rPr lang="en-US" dirty="0"/>
+              <a:t> Clustering. </a:t>
+            </a:r>
+            <a:r>
+              <a:rPr lang="en-US" dirty="0" err="1"/>
+              <a:t>KMeans</a:t>
+            </a:r>
+            <a:r>
+              <a:rPr lang="en-US" dirty="0"/>
+              <a:t> can be used to determine clusters of data and make decisions based off the clusters which values you can exclude to increase accuracy. </a:t>
+            </a:r>
+          </a:p>
+          <a:p>
+            <a:pPr marL="285750" indent="-285750">
+              <a:buFont typeface="Wingdings" panose="05000000000000000000" pitchFamily="2" charset="2"/>
+              <a:buChar char="Ø"/>
+            </a:pPr>
+            <a:r>
+              <a:rPr lang="en-US" dirty="0"/>
+              <a:t>Using the variable REGIONC and TOTALBTU, the </a:t>
+            </a:r>
+            <a:r>
+              <a:rPr lang="en-US" dirty="0" err="1"/>
+              <a:t>KMeans</a:t>
+            </a:r>
+            <a:r>
+              <a:rPr lang="en-US" dirty="0"/>
+              <a:t> elbow curve shows the clusters needed to group the data is between 8 and 10, when the curve flattens at 0 score value.</a:t>
+            </a:r>
+          </a:p>
+          <a:p>
+            <a:pPr marL="285750" indent="-285750">
+              <a:buFont typeface="Wingdings" panose="05000000000000000000" pitchFamily="2" charset="2"/>
+              <a:buChar char="Ø"/>
+            </a:pPr>
+            <a:r>
+              <a:rPr lang="en-US" dirty="0"/>
+              <a:t>Creating a scatter plot of 10 clusters with the PCA transformed x and y plots (REGIONC and TOTALBTU), the graph shows </a:t>
+            </a:r>
+            <a:r>
+              <a:rPr lang="en-US" dirty="0" err="1"/>
+              <a:t>alot</a:t>
+            </a:r>
+            <a:r>
+              <a:rPr lang="en-US" dirty="0"/>
+              <a:t> of the data in general correlates to predicting the values of x and y, with another cluster that does not correlate and can be reduced from the data set.</a:t>
+            </a:r>
+          </a:p>
+        </p:txBody>
+      </p:sp>
+      <p:pic>
+        <p:nvPicPr>
+          <p:cNvPr id="8" name="Picture 7">
+            <a:extLst>
+              <a:ext uri="{FF2B5EF4-FFF2-40B4-BE49-F238E27FC236}">
+                <a16:creationId xmlns:a16="http://schemas.microsoft.com/office/drawing/2014/main" id="{152BFD3F-B88C-4822-AEA7-354B3C04DE96}"/>
+              </a:ext>
+            </a:extLst>
+          </p:cNvPr>
+          <p:cNvPicPr>
+            <a:picLocks noChangeAspect="1"/>
+          </p:cNvPicPr>
+          <p:nvPr/>
+        </p:nvPicPr>
+        <p:blipFill>
+          <a:blip r:embed="rId3">
+            <a:extLst>
+              <a:ext uri="{28A0092B-C50C-407E-A947-70E740481C1C}">
+                <a14:useLocalDpi xmlns:a14="http://schemas.microsoft.com/office/drawing/2010/main" val="0"/>
+              </a:ext>
+            </a:extLst>
+          </a:blip>
+          <a:stretch>
+            <a:fillRect/>
+          </a:stretch>
+        </p:blipFill>
+        <p:spPr>
+          <a:xfrm>
+            <a:off x="4843208" y="3205334"/>
+            <a:ext cx="4035615" cy="2690410"/>
+          </a:xfrm>
+          <a:prstGeom prst="rect">
+            <a:avLst/>
+          </a:prstGeom>
+        </p:spPr>
+      </p:pic>
+    </p:spTree>
+    <p:extLst>
+      <p:ext uri="{BB962C8B-B14F-4D97-AF65-F5344CB8AC3E}">
+        <p14:creationId xmlns:p14="http://schemas.microsoft.com/office/powerpoint/2010/main" val="2179490816"/>
+      </p:ext>
+    </p:extLst>
+  </p:cSld>
+  <p:clrMapOvr>
+    <a:masterClrMapping/>
+  </p:clrMapOvr>
+</p:sld>
+</file>
+
+<file path=ppt/slides/slide6.xml><?xml version="1.0" encoding="utf-8"?>
+<p:sld xmlns:a="http://schemas.openxmlformats.org/drawingml/2006/main" xmlns:r="http://schemas.openxmlformats.org/officeDocument/2006/relationships" xmlns:p="http://schemas.openxmlformats.org/presentationml/2006/main">
+  <p:cSld>
+    <p:spTree>
+      <p:nvGrpSpPr>
+        <p:cNvPr id="1" name=""/>
+        <p:cNvGrpSpPr/>
+        <p:nvPr/>
+      </p:nvGrpSpPr>
+      <p:grpSpPr>
+        <a:xfrm>
+          <a:off x="0" y="0"/>
+          <a:ext cx="0" cy="0"/>
+          <a:chOff x="0" y="0"/>
+          <a:chExt cx="0" cy="0"/>
+        </a:xfrm>
+      </p:grpSpPr>
+      <p:sp>
+        <p:nvSpPr>
+          <p:cNvPr id="5" name="TextBox 4">
+            <a:extLst>
+              <a:ext uri="{FF2B5EF4-FFF2-40B4-BE49-F238E27FC236}">
+                <a16:creationId xmlns:a16="http://schemas.microsoft.com/office/drawing/2014/main" id="{E618A879-07CD-4346-87B2-78C6583069E6}"/>
+              </a:ext>
+            </a:extLst>
+          </p:cNvPr>
+          <p:cNvSpPr txBox="1"/>
+          <p:nvPr/>
+        </p:nvSpPr>
+        <p:spPr>
+          <a:xfrm>
+            <a:off x="228601" y="188844"/>
+            <a:ext cx="10396329" cy="338554"/>
+          </a:xfrm>
+          <a:prstGeom prst="rect">
+            <a:avLst/>
+          </a:prstGeom>
+          <a:noFill/>
+        </p:spPr>
+        <p:txBody>
+          <a:bodyPr wrap="square" rtlCol="0">
+            <a:spAutoFit/>
+          </a:bodyPr>
+          <a:lstStyle/>
+          <a:p>
+            <a:r>
+              <a:rPr lang="en-US" sz="1600" dirty="0"/>
+              <a:t>Linear Regression Models : </a:t>
+            </a:r>
+          </a:p>
+        </p:txBody>
+      </p:sp>
+      <p:sp>
+        <p:nvSpPr>
+          <p:cNvPr id="27" name="Freeform: Shape 26">
+            <a:extLst>
+              <a:ext uri="{FF2B5EF4-FFF2-40B4-BE49-F238E27FC236}">
+                <a16:creationId xmlns:a16="http://schemas.microsoft.com/office/drawing/2014/main" id="{08A6CB71-224C-4627-9A69-EB399C26D260}"/>
+              </a:ext>
+            </a:extLst>
+          </p:cNvPr>
+          <p:cNvSpPr/>
+          <p:nvPr/>
+        </p:nvSpPr>
+        <p:spPr>
+          <a:xfrm>
+            <a:off x="727970" y="723461"/>
+            <a:ext cx="2671213" cy="930102"/>
+          </a:xfrm>
+          <a:custGeom>
+            <a:avLst/>
+            <a:gdLst>
+              <a:gd name="connsiteX0" fmla="*/ 0 w 2357070"/>
+              <a:gd name="connsiteY0" fmla="*/ 275034 h 1649872"/>
+              <a:gd name="connsiteX1" fmla="*/ 275034 w 2357070"/>
+              <a:gd name="connsiteY1" fmla="*/ 0 h 1649872"/>
+              <a:gd name="connsiteX2" fmla="*/ 2082036 w 2357070"/>
+              <a:gd name="connsiteY2" fmla="*/ 0 h 1649872"/>
+              <a:gd name="connsiteX3" fmla="*/ 2357070 w 2357070"/>
+              <a:gd name="connsiteY3" fmla="*/ 275034 h 1649872"/>
+              <a:gd name="connsiteX4" fmla="*/ 2357070 w 2357070"/>
+              <a:gd name="connsiteY4" fmla="*/ 1374838 h 1649872"/>
+              <a:gd name="connsiteX5" fmla="*/ 2082036 w 2357070"/>
+              <a:gd name="connsiteY5" fmla="*/ 1649872 h 1649872"/>
+              <a:gd name="connsiteX6" fmla="*/ 275034 w 2357070"/>
+              <a:gd name="connsiteY6" fmla="*/ 1649872 h 1649872"/>
+              <a:gd name="connsiteX7" fmla="*/ 0 w 2357070"/>
+              <a:gd name="connsiteY7" fmla="*/ 1374838 h 1649872"/>
+              <a:gd name="connsiteX8" fmla="*/ 0 w 2357070"/>
+              <a:gd name="connsiteY8" fmla="*/ 275034 h 1649872"/>
+            </a:gdLst>
+            <a:ahLst/>
+            <a:cxnLst>
+              <a:cxn ang="0">
+                <a:pos x="connsiteX0" y="connsiteY0"/>
+              </a:cxn>
+              <a:cxn ang="0">
+                <a:pos x="connsiteX1" y="connsiteY1"/>
+              </a:cxn>
+              <a:cxn ang="0">
+                <a:pos x="connsiteX2" y="connsiteY2"/>
+              </a:cxn>
+              <a:cxn ang="0">
+                <a:pos x="connsiteX3" y="connsiteY3"/>
+              </a:cxn>
+              <a:cxn ang="0">
+                <a:pos x="connsiteX4" y="connsiteY4"/>
+              </a:cxn>
+              <a:cxn ang="0">
+                <a:pos x="connsiteX5" y="connsiteY5"/>
+              </a:cxn>
+              <a:cxn ang="0">
+                <a:pos x="connsiteX6" y="connsiteY6"/>
+              </a:cxn>
+              <a:cxn ang="0">
+                <a:pos x="connsiteX7" y="connsiteY7"/>
+              </a:cxn>
+              <a:cxn ang="0">
+                <a:pos x="connsiteX8" y="connsiteY8"/>
+              </a:cxn>
+            </a:cxnLst>
+            <a:rect l="l" t="t" r="r" b="b"/>
+            <a:pathLst>
+              <a:path w="2357070" h="1649872">
+                <a:moveTo>
+                  <a:pt x="0" y="275034"/>
+                </a:moveTo>
+                <a:cubicBezTo>
+                  <a:pt x="0" y="123137"/>
+                  <a:pt x="123137" y="0"/>
+                  <a:pt x="275034" y="0"/>
+                </a:cubicBezTo>
+                <a:lnTo>
+                  <a:pt x="2082036" y="0"/>
+                </a:lnTo>
+                <a:cubicBezTo>
+                  <a:pt x="2233933" y="0"/>
+                  <a:pt x="2357070" y="123137"/>
+                  <a:pt x="2357070" y="275034"/>
+                </a:cubicBezTo>
+                <a:lnTo>
+                  <a:pt x="2357070" y="1374838"/>
+                </a:lnTo>
+                <a:cubicBezTo>
+                  <a:pt x="2357070" y="1526735"/>
+                  <a:pt x="2233933" y="1649872"/>
+                  <a:pt x="2082036" y="1649872"/>
+                </a:cubicBezTo>
+                <a:lnTo>
+                  <a:pt x="275034" y="1649872"/>
+                </a:lnTo>
+                <a:cubicBezTo>
+                  <a:pt x="123137" y="1649872"/>
+                  <a:pt x="0" y="1526735"/>
+                  <a:pt x="0" y="1374838"/>
+                </a:cubicBezTo>
+                <a:lnTo>
+                  <a:pt x="0" y="275034"/>
+                </a:lnTo>
+                <a:close/>
+              </a:path>
+            </a:pathLst>
+          </a:custGeom>
+          <a:noFill/>
+          <a:ln>
+            <a:solidFill>
+              <a:schemeClr val="accent1"/>
+            </a:solidFill>
+          </a:ln>
+        </p:spPr>
+        <p:style>
+          <a:lnRef idx="2">
+            <a:schemeClr val="lt1">
+              <a:hueOff val="0"/>
+              <a:satOff val="0"/>
+              <a:lumOff val="0"/>
+              <a:alphaOff val="0"/>
+            </a:schemeClr>
+          </a:lnRef>
+          <a:fillRef idx="1">
+            <a:schemeClr val="accent1">
+              <a:hueOff val="0"/>
+              <a:satOff val="0"/>
+              <a:lumOff val="0"/>
+              <a:alphaOff val="0"/>
+            </a:schemeClr>
+          </a:fillRef>
+          <a:effectRef idx="0">
+            <a:schemeClr val="accent1">
+              <a:hueOff val="0"/>
+              <a:satOff val="0"/>
+              <a:lumOff val="0"/>
+              <a:alphaOff val="0"/>
+            </a:schemeClr>
+          </a:effectRef>
+          <a:fontRef idx="minor">
+            <a:schemeClr val="lt1"/>
+          </a:fontRef>
+        </p:style>
+        <p:txBody>
+          <a:bodyPr spcFirstLastPara="0" vert="horz" wrap="square" lIns="133895" tIns="133895" rIns="133895" bIns="133895" numCol="1" spcCol="1270" anchor="ctr" anchorCtr="0">
+            <a:noAutofit/>
+          </a:bodyPr>
+          <a:lstStyle/>
+          <a:p>
+            <a:pPr marL="0" lvl="0" indent="0" algn="l" defTabSz="622300">
+              <a:lnSpc>
+                <a:spcPct val="90000"/>
+              </a:lnSpc>
+              <a:spcBef>
+                <a:spcPct val="0"/>
+              </a:spcBef>
+              <a:spcAft>
+                <a:spcPct val="35000"/>
+              </a:spcAft>
+              <a:buNone/>
+            </a:pPr>
+            <a:r>
+              <a:rPr lang="en-US" sz="1200" b="1" kern="1200" dirty="0">
+                <a:solidFill>
+                  <a:schemeClr val="tx1"/>
+                </a:solidFill>
+              </a:rPr>
+              <a:t>Step 1</a:t>
+            </a:r>
+            <a:r>
+              <a:rPr lang="en-US" sz="1200" kern="1200" dirty="0">
+                <a:solidFill>
+                  <a:schemeClr val="tx1"/>
+                </a:solidFill>
+              </a:rPr>
+              <a:t> – Creating base Model for Linear Regression </a:t>
+            </a:r>
+          </a:p>
+          <a:p>
+            <a:pPr marL="0" lvl="0" indent="0" algn="l" defTabSz="622300">
+              <a:lnSpc>
+                <a:spcPct val="90000"/>
+              </a:lnSpc>
+              <a:spcBef>
+                <a:spcPct val="0"/>
+              </a:spcBef>
+              <a:spcAft>
+                <a:spcPct val="35000"/>
+              </a:spcAft>
+              <a:buNone/>
+            </a:pPr>
+            <a:r>
+              <a:rPr lang="en-US" sz="1200" dirty="0">
+                <a:solidFill>
+                  <a:schemeClr val="tx1"/>
+                </a:solidFill>
+              </a:rPr>
+              <a:t>(Linear, Lasso , ElasticNet)</a:t>
+            </a:r>
+            <a:endParaRPr lang="en-US" sz="1200" kern="1200" dirty="0">
+              <a:solidFill>
+                <a:schemeClr val="tx1"/>
+              </a:solidFill>
+            </a:endParaRPr>
+          </a:p>
+        </p:txBody>
+      </p:sp>
+      <p:sp>
+        <p:nvSpPr>
+          <p:cNvPr id="29" name="Freeform: Shape 28">
+            <a:extLst>
+              <a:ext uri="{FF2B5EF4-FFF2-40B4-BE49-F238E27FC236}">
+                <a16:creationId xmlns:a16="http://schemas.microsoft.com/office/drawing/2014/main" id="{CC082855-0F08-43EA-B263-25A0DB88F36C}"/>
+              </a:ext>
+            </a:extLst>
+          </p:cNvPr>
+          <p:cNvSpPr/>
+          <p:nvPr/>
+        </p:nvSpPr>
+        <p:spPr>
+          <a:xfrm>
+            <a:off x="3690318" y="665826"/>
+            <a:ext cx="2473983" cy="987758"/>
+          </a:xfrm>
+          <a:custGeom>
+            <a:avLst/>
+            <a:gdLst>
+              <a:gd name="connsiteX0" fmla="*/ 0 w 2357070"/>
+              <a:gd name="connsiteY0" fmla="*/ 275034 h 1649872"/>
+              <a:gd name="connsiteX1" fmla="*/ 275034 w 2357070"/>
+              <a:gd name="connsiteY1" fmla="*/ 0 h 1649872"/>
+              <a:gd name="connsiteX2" fmla="*/ 2082036 w 2357070"/>
+              <a:gd name="connsiteY2" fmla="*/ 0 h 1649872"/>
+              <a:gd name="connsiteX3" fmla="*/ 2357070 w 2357070"/>
+              <a:gd name="connsiteY3" fmla="*/ 275034 h 1649872"/>
+              <a:gd name="connsiteX4" fmla="*/ 2357070 w 2357070"/>
+              <a:gd name="connsiteY4" fmla="*/ 1374838 h 1649872"/>
+              <a:gd name="connsiteX5" fmla="*/ 2082036 w 2357070"/>
+              <a:gd name="connsiteY5" fmla="*/ 1649872 h 1649872"/>
+              <a:gd name="connsiteX6" fmla="*/ 275034 w 2357070"/>
+              <a:gd name="connsiteY6" fmla="*/ 1649872 h 1649872"/>
+              <a:gd name="connsiteX7" fmla="*/ 0 w 2357070"/>
+              <a:gd name="connsiteY7" fmla="*/ 1374838 h 1649872"/>
+              <a:gd name="connsiteX8" fmla="*/ 0 w 2357070"/>
+              <a:gd name="connsiteY8" fmla="*/ 275034 h 1649872"/>
+            </a:gdLst>
+            <a:ahLst/>
+            <a:cxnLst>
+              <a:cxn ang="0">
+                <a:pos x="connsiteX0" y="connsiteY0"/>
+              </a:cxn>
+              <a:cxn ang="0">
+                <a:pos x="connsiteX1" y="connsiteY1"/>
+              </a:cxn>
+              <a:cxn ang="0">
+                <a:pos x="connsiteX2" y="connsiteY2"/>
+              </a:cxn>
+              <a:cxn ang="0">
+                <a:pos x="connsiteX3" y="connsiteY3"/>
+              </a:cxn>
+              <a:cxn ang="0">
+                <a:pos x="connsiteX4" y="connsiteY4"/>
+              </a:cxn>
+              <a:cxn ang="0">
+                <a:pos x="connsiteX5" y="connsiteY5"/>
+              </a:cxn>
+              <a:cxn ang="0">
+                <a:pos x="connsiteX6" y="connsiteY6"/>
+              </a:cxn>
+              <a:cxn ang="0">
+                <a:pos x="connsiteX7" y="connsiteY7"/>
+              </a:cxn>
+              <a:cxn ang="0">
+                <a:pos x="connsiteX8" y="connsiteY8"/>
+              </a:cxn>
+            </a:cxnLst>
+            <a:rect l="l" t="t" r="r" b="b"/>
+            <a:pathLst>
+              <a:path w="2357070" h="1649872">
+                <a:moveTo>
+                  <a:pt x="0" y="275034"/>
+                </a:moveTo>
+                <a:cubicBezTo>
+                  <a:pt x="0" y="123137"/>
+                  <a:pt x="123137" y="0"/>
+                  <a:pt x="275034" y="0"/>
+                </a:cubicBezTo>
+                <a:lnTo>
+                  <a:pt x="2082036" y="0"/>
+                </a:lnTo>
+                <a:cubicBezTo>
+                  <a:pt x="2233933" y="0"/>
+                  <a:pt x="2357070" y="123137"/>
+                  <a:pt x="2357070" y="275034"/>
+                </a:cubicBezTo>
+                <a:lnTo>
+                  <a:pt x="2357070" y="1374838"/>
+                </a:lnTo>
+                <a:cubicBezTo>
+                  <a:pt x="2357070" y="1526735"/>
+                  <a:pt x="2233933" y="1649872"/>
+                  <a:pt x="2082036" y="1649872"/>
+                </a:cubicBezTo>
+                <a:lnTo>
+                  <a:pt x="275034" y="1649872"/>
+                </a:lnTo>
+                <a:cubicBezTo>
+                  <a:pt x="123137" y="1649872"/>
+                  <a:pt x="0" y="1526735"/>
+                  <a:pt x="0" y="1374838"/>
+                </a:cubicBezTo>
+                <a:lnTo>
+                  <a:pt x="0" y="275034"/>
+                </a:lnTo>
+                <a:close/>
+              </a:path>
+            </a:pathLst>
+          </a:custGeom>
+          <a:noFill/>
+          <a:ln>
+            <a:solidFill>
+              <a:schemeClr val="accent1"/>
+            </a:solidFill>
+          </a:ln>
+        </p:spPr>
+        <p:style>
+          <a:lnRef idx="2">
+            <a:schemeClr val="lt1">
+              <a:hueOff val="0"/>
+              <a:satOff val="0"/>
+              <a:lumOff val="0"/>
+              <a:alphaOff val="0"/>
+            </a:schemeClr>
+          </a:lnRef>
+          <a:fillRef idx="1">
+            <a:schemeClr val="accent1">
+              <a:hueOff val="0"/>
+              <a:satOff val="0"/>
+              <a:lumOff val="0"/>
+              <a:alphaOff val="0"/>
+            </a:schemeClr>
+          </a:fillRef>
+          <a:effectRef idx="0">
+            <a:schemeClr val="accent1">
+              <a:hueOff val="0"/>
+              <a:satOff val="0"/>
+              <a:lumOff val="0"/>
+              <a:alphaOff val="0"/>
+            </a:schemeClr>
+          </a:effectRef>
+          <a:fontRef idx="minor">
+            <a:schemeClr val="lt1"/>
+          </a:fontRef>
+        </p:style>
+        <p:txBody>
+          <a:bodyPr spcFirstLastPara="0" vert="horz" wrap="square" lIns="133895" tIns="133895" rIns="133895" bIns="133895" numCol="1" spcCol="1270" anchor="ctr" anchorCtr="0">
+            <a:noAutofit/>
+          </a:bodyPr>
+          <a:lstStyle/>
+          <a:p>
+            <a:pPr defTabSz="622300">
+              <a:lnSpc>
+                <a:spcPct val="90000"/>
+              </a:lnSpc>
+              <a:spcBef>
+                <a:spcPct val="0"/>
+              </a:spcBef>
+              <a:spcAft>
+                <a:spcPct val="35000"/>
+              </a:spcAft>
+            </a:pPr>
+            <a:r>
+              <a:rPr lang="en-US" sz="1200" b="1" dirty="0">
+                <a:solidFill>
+                  <a:schemeClr val="tx1"/>
+                </a:solidFill>
+              </a:rPr>
+              <a:t>Step2</a:t>
+            </a:r>
+            <a:r>
+              <a:rPr lang="en-US" sz="1200" dirty="0">
+                <a:solidFill>
+                  <a:schemeClr val="tx1"/>
+                </a:solidFill>
+              </a:rPr>
+              <a:t> – Fine Tune model using LassoCV ( for Lasso Model) and determining the best alpha, and performing GridsearchCV for ElasticNet for range of alphas</a:t>
+            </a:r>
+          </a:p>
+        </p:txBody>
+      </p:sp>
+      <p:sp>
+        <p:nvSpPr>
+          <p:cNvPr id="31" name="Freeform: Shape 30">
+            <a:extLst>
+              <a:ext uri="{FF2B5EF4-FFF2-40B4-BE49-F238E27FC236}">
+                <a16:creationId xmlns:a16="http://schemas.microsoft.com/office/drawing/2014/main" id="{3F86357A-FC59-4E64-A550-D98A57AF9CF9}"/>
+              </a:ext>
+            </a:extLst>
+          </p:cNvPr>
+          <p:cNvSpPr/>
+          <p:nvPr/>
+        </p:nvSpPr>
+        <p:spPr>
+          <a:xfrm>
+            <a:off x="6535334" y="723460"/>
+            <a:ext cx="2582033" cy="930103"/>
+          </a:xfrm>
+          <a:custGeom>
+            <a:avLst/>
+            <a:gdLst>
+              <a:gd name="connsiteX0" fmla="*/ 0 w 2357070"/>
+              <a:gd name="connsiteY0" fmla="*/ 275034 h 1649872"/>
+              <a:gd name="connsiteX1" fmla="*/ 275034 w 2357070"/>
+              <a:gd name="connsiteY1" fmla="*/ 0 h 1649872"/>
+              <a:gd name="connsiteX2" fmla="*/ 2082036 w 2357070"/>
+              <a:gd name="connsiteY2" fmla="*/ 0 h 1649872"/>
+              <a:gd name="connsiteX3" fmla="*/ 2357070 w 2357070"/>
+              <a:gd name="connsiteY3" fmla="*/ 275034 h 1649872"/>
+              <a:gd name="connsiteX4" fmla="*/ 2357070 w 2357070"/>
+              <a:gd name="connsiteY4" fmla="*/ 1374838 h 1649872"/>
+              <a:gd name="connsiteX5" fmla="*/ 2082036 w 2357070"/>
+              <a:gd name="connsiteY5" fmla="*/ 1649872 h 1649872"/>
+              <a:gd name="connsiteX6" fmla="*/ 275034 w 2357070"/>
+              <a:gd name="connsiteY6" fmla="*/ 1649872 h 1649872"/>
+              <a:gd name="connsiteX7" fmla="*/ 0 w 2357070"/>
+              <a:gd name="connsiteY7" fmla="*/ 1374838 h 1649872"/>
+              <a:gd name="connsiteX8" fmla="*/ 0 w 2357070"/>
+              <a:gd name="connsiteY8" fmla="*/ 275034 h 1649872"/>
+            </a:gdLst>
+            <a:ahLst/>
+            <a:cxnLst>
+              <a:cxn ang="0">
+                <a:pos x="connsiteX0" y="connsiteY0"/>
+              </a:cxn>
+              <a:cxn ang="0">
+                <a:pos x="connsiteX1" y="connsiteY1"/>
+              </a:cxn>
+              <a:cxn ang="0">
+                <a:pos x="connsiteX2" y="connsiteY2"/>
+              </a:cxn>
+              <a:cxn ang="0">
+                <a:pos x="connsiteX3" y="connsiteY3"/>
+              </a:cxn>
+              <a:cxn ang="0">
+                <a:pos x="connsiteX4" y="connsiteY4"/>
+              </a:cxn>
+              <a:cxn ang="0">
+                <a:pos x="connsiteX5" y="connsiteY5"/>
+              </a:cxn>
+              <a:cxn ang="0">
+                <a:pos x="connsiteX6" y="connsiteY6"/>
+              </a:cxn>
+              <a:cxn ang="0">
+                <a:pos x="connsiteX7" y="connsiteY7"/>
+              </a:cxn>
+              <a:cxn ang="0">
+                <a:pos x="connsiteX8" y="connsiteY8"/>
+              </a:cxn>
+            </a:cxnLst>
+            <a:rect l="l" t="t" r="r" b="b"/>
+            <a:pathLst>
+              <a:path w="2357070" h="1649872">
+                <a:moveTo>
+                  <a:pt x="0" y="275034"/>
+                </a:moveTo>
+                <a:cubicBezTo>
+                  <a:pt x="0" y="123137"/>
+                  <a:pt x="123137" y="0"/>
+                  <a:pt x="275034" y="0"/>
+                </a:cubicBezTo>
+                <a:lnTo>
+                  <a:pt x="2082036" y="0"/>
+                </a:lnTo>
+                <a:cubicBezTo>
+                  <a:pt x="2233933" y="0"/>
+                  <a:pt x="2357070" y="123137"/>
+                  <a:pt x="2357070" y="275034"/>
+                </a:cubicBezTo>
+                <a:lnTo>
+                  <a:pt x="2357070" y="1374838"/>
+                </a:lnTo>
+                <a:cubicBezTo>
+                  <a:pt x="2357070" y="1526735"/>
+                  <a:pt x="2233933" y="1649872"/>
+                  <a:pt x="2082036" y="1649872"/>
+                </a:cubicBezTo>
+                <a:lnTo>
+                  <a:pt x="275034" y="1649872"/>
+                </a:lnTo>
+                <a:cubicBezTo>
+                  <a:pt x="123137" y="1649872"/>
+                  <a:pt x="0" y="1526735"/>
+                  <a:pt x="0" y="1374838"/>
+                </a:cubicBezTo>
+                <a:lnTo>
+                  <a:pt x="0" y="275034"/>
+                </a:lnTo>
+                <a:close/>
+              </a:path>
+            </a:pathLst>
+          </a:custGeom>
+          <a:noFill/>
+          <a:ln>
+            <a:solidFill>
+              <a:schemeClr val="accent1"/>
+            </a:solidFill>
+          </a:ln>
+        </p:spPr>
+        <p:style>
+          <a:lnRef idx="2">
+            <a:schemeClr val="lt1">
+              <a:hueOff val="0"/>
+              <a:satOff val="0"/>
+              <a:lumOff val="0"/>
+              <a:alphaOff val="0"/>
+            </a:schemeClr>
+          </a:lnRef>
+          <a:fillRef idx="1">
+            <a:schemeClr val="accent1">
+              <a:hueOff val="0"/>
+              <a:satOff val="0"/>
+              <a:lumOff val="0"/>
+              <a:alphaOff val="0"/>
+            </a:schemeClr>
+          </a:fillRef>
+          <a:effectRef idx="0">
+            <a:schemeClr val="accent1">
+              <a:hueOff val="0"/>
+              <a:satOff val="0"/>
+              <a:lumOff val="0"/>
+              <a:alphaOff val="0"/>
+            </a:schemeClr>
+          </a:effectRef>
+          <a:fontRef idx="minor">
+            <a:schemeClr val="lt1"/>
+          </a:fontRef>
+        </p:style>
+        <p:txBody>
+          <a:bodyPr spcFirstLastPara="0" vert="horz" wrap="square" lIns="133895" tIns="133895" rIns="133895" bIns="133895" numCol="1" spcCol="1270" anchor="ctr" anchorCtr="0">
+            <a:noAutofit/>
+          </a:bodyPr>
+          <a:lstStyle/>
+          <a:p>
+            <a:pPr marL="0" lvl="0" indent="0" algn="l" defTabSz="622300">
+              <a:lnSpc>
+                <a:spcPct val="90000"/>
+              </a:lnSpc>
+              <a:spcBef>
+                <a:spcPct val="0"/>
+              </a:spcBef>
+              <a:spcAft>
+                <a:spcPct val="35000"/>
+              </a:spcAft>
+              <a:buNone/>
+            </a:pPr>
+            <a:r>
+              <a:rPr lang="en-US" sz="1200" b="1" kern="1200" dirty="0">
+                <a:solidFill>
+                  <a:schemeClr val="tx1"/>
+                </a:solidFill>
+              </a:rPr>
+              <a:t>Step3</a:t>
+            </a:r>
+            <a:r>
+              <a:rPr lang="en-US" sz="1200" kern="1200" dirty="0">
+                <a:solidFill>
+                  <a:schemeClr val="tx1"/>
+                </a:solidFill>
+              </a:rPr>
+              <a:t> – Compare different models for accuracy</a:t>
+            </a:r>
+          </a:p>
+        </p:txBody>
+      </p:sp>
+      <p:graphicFrame>
+        <p:nvGraphicFramePr>
+          <p:cNvPr id="37" name="Table 36">
+            <a:extLst>
+              <a:ext uri="{FF2B5EF4-FFF2-40B4-BE49-F238E27FC236}">
+                <a16:creationId xmlns:a16="http://schemas.microsoft.com/office/drawing/2014/main" id="{A8BDD122-C0F0-4FDB-8714-C90A322FF873}"/>
+              </a:ext>
+            </a:extLst>
+          </p:cNvPr>
+          <p:cNvGraphicFramePr>
+            <a:graphicFrameLocks noGrp="1"/>
+          </p:cNvGraphicFramePr>
+          <p:nvPr>
+            <p:extLst>
+              <p:ext uri="{D42A27DB-BD31-4B8C-83A1-F6EECF244321}">
+                <p14:modId xmlns:p14="http://schemas.microsoft.com/office/powerpoint/2010/main" val="3921586709"/>
+              </p:ext>
+            </p:extLst>
+          </p:nvPr>
+        </p:nvGraphicFramePr>
+        <p:xfrm>
+          <a:off x="2063575" y="2023403"/>
+          <a:ext cx="5873062" cy="1971549"/>
+        </p:xfrm>
+        <a:graphic>
+          <a:graphicData uri="http://schemas.openxmlformats.org/drawingml/2006/table">
+            <a:tbl>
+              <a:tblPr firstRow="1" bandRow="1">
+                <a:tableStyleId>{3B4B98B0-60AC-42C2-AFA5-B58CD77FA1E5}</a:tableStyleId>
+              </a:tblPr>
+              <a:tblGrid>
+                <a:gridCol w="1130445">
+                  <a:extLst>
+                    <a:ext uri="{9D8B030D-6E8A-4147-A177-3AD203B41FA5}">
+                      <a16:colId xmlns:a16="http://schemas.microsoft.com/office/drawing/2014/main" val="1628376606"/>
+                    </a:ext>
+                  </a:extLst>
+                </a:gridCol>
+                <a:gridCol w="1561076">
+                  <a:extLst>
+                    <a:ext uri="{9D8B030D-6E8A-4147-A177-3AD203B41FA5}">
+                      <a16:colId xmlns:a16="http://schemas.microsoft.com/office/drawing/2014/main" val="3537171461"/>
+                    </a:ext>
+                  </a:extLst>
+                </a:gridCol>
+                <a:gridCol w="1307487">
+                  <a:extLst>
+                    <a:ext uri="{9D8B030D-6E8A-4147-A177-3AD203B41FA5}">
+                      <a16:colId xmlns:a16="http://schemas.microsoft.com/office/drawing/2014/main" val="2534363247"/>
+                    </a:ext>
+                  </a:extLst>
+                </a:gridCol>
+                <a:gridCol w="1874054">
+                  <a:extLst>
+                    <a:ext uri="{9D8B030D-6E8A-4147-A177-3AD203B41FA5}">
+                      <a16:colId xmlns:a16="http://schemas.microsoft.com/office/drawing/2014/main" val="3554354182"/>
+                    </a:ext>
+                  </a:extLst>
+                </a:gridCol>
+              </a:tblGrid>
+              <a:tr h="1081138">
+                <a:tc>
+                  <a:txBody>
+                    <a:bodyPr/>
+                    <a:lstStyle/>
+                    <a:p>
+                      <a:r>
+                        <a:rPr lang="en-US" sz="1600" dirty="0"/>
+                        <a:t>RESULTS for $</a:t>
+                      </a:r>
+                      <a:endParaRPr lang="en-US" sz="1600" dirty="0">
+                        <a:solidFill>
+                          <a:schemeClr val="tx1"/>
+                        </a:solidFill>
+                      </a:endParaRPr>
+                    </a:p>
+                  </a:txBody>
+                  <a:tcPr/>
+                </a:tc>
+                <a:tc>
+                  <a:txBody>
+                    <a:bodyPr/>
+                    <a:lstStyle/>
+                    <a:p>
+                      <a:r>
+                        <a:rPr lang="en-US" sz="1200" dirty="0"/>
+                        <a:t>Linear</a:t>
+                      </a:r>
+                    </a:p>
+                  </a:txBody>
+                  <a:tcPr>
+                    <a:solidFill>
+                      <a:schemeClr val="bg2"/>
+                    </a:solidFill>
+                  </a:tcPr>
+                </a:tc>
+                <a:tc>
+                  <a:txBody>
+                    <a:bodyPr/>
+                    <a:lstStyle/>
+                    <a:p>
+                      <a:r>
+                        <a:rPr lang="en-US" sz="1200" dirty="0"/>
+                        <a:t>LassoCV</a:t>
+                      </a:r>
+                    </a:p>
+                  </a:txBody>
+                  <a:tcPr>
+                    <a:solidFill>
+                      <a:schemeClr val="bg2"/>
+                    </a:solidFill>
+                  </a:tcPr>
+                </a:tc>
+                <a:tc>
+                  <a:txBody>
+                    <a:bodyPr/>
+                    <a:lstStyle/>
+                    <a:p>
+                      <a:r>
+                        <a:rPr lang="en-US" sz="1200" dirty="0"/>
+                        <a:t>Elastic Net</a:t>
+                      </a:r>
+                    </a:p>
+                  </a:txBody>
+                  <a:tcPr>
+                    <a:solidFill>
+                      <a:schemeClr val="bg2"/>
+                    </a:solidFill>
+                  </a:tcPr>
+                </a:tc>
+                <a:extLst>
+                  <a:ext uri="{0D108BD9-81ED-4DB2-BD59-A6C34878D82A}">
+                    <a16:rowId xmlns:a16="http://schemas.microsoft.com/office/drawing/2014/main" val="1637909296"/>
+                  </a:ext>
+                </a:extLst>
+              </a:tr>
+              <a:tr h="530032">
+                <a:tc>
+                  <a:txBody>
+                    <a:bodyPr/>
+                    <a:lstStyle/>
+                    <a:p>
+                      <a:r>
+                        <a:rPr lang="en-US" sz="1200" dirty="0"/>
+                        <a:t>Test RMSE</a:t>
+                      </a:r>
+                    </a:p>
+                  </a:txBody>
+                  <a:tcPr/>
+                </a:tc>
+                <a:tc>
+                  <a:txBody>
+                    <a:bodyPr/>
+                    <a:lstStyle/>
+                    <a:p>
+                      <a:r>
+                        <a:rPr lang="en-US" sz="1200" dirty="0"/>
+                        <a:t>346.4495</a:t>
+                      </a:r>
+                    </a:p>
+                  </a:txBody>
+                  <a:tcPr/>
+                </a:tc>
+                <a:tc>
+                  <a:txBody>
+                    <a:bodyPr/>
+                    <a:lstStyle/>
+                    <a:p>
+                      <a:r>
+                        <a:rPr lang="en-US" sz="1200" dirty="0"/>
+                        <a:t>346.2505</a:t>
+                      </a:r>
+                    </a:p>
+                  </a:txBody>
+                  <a:tcPr/>
+                </a:tc>
+                <a:tc>
+                  <a:txBody>
+                    <a:bodyPr/>
+                    <a:lstStyle/>
+                    <a:p>
+                      <a:r>
+                        <a:rPr lang="en-US" sz="1200" dirty="0"/>
+                        <a:t>346.4526</a:t>
+                      </a:r>
+                    </a:p>
+                  </a:txBody>
+                  <a:tcPr/>
+                </a:tc>
+                <a:extLst>
+                  <a:ext uri="{0D108BD9-81ED-4DB2-BD59-A6C34878D82A}">
+                    <a16:rowId xmlns:a16="http://schemas.microsoft.com/office/drawing/2014/main" val="3035129995"/>
+                  </a:ext>
+                </a:extLst>
+              </a:tr>
+              <a:tr h="360379">
+                <a:tc>
+                  <a:txBody>
+                    <a:bodyPr/>
+                    <a:lstStyle/>
+                    <a:p>
+                      <a:r>
+                        <a:rPr lang="en-US" sz="1200" dirty="0"/>
+                        <a:t>Test r</a:t>
+                      </a:r>
+                      <a:r>
+                        <a:rPr lang="en-US" sz="1200" baseline="30000" dirty="0"/>
+                        <a:t>2</a:t>
+                      </a:r>
+                    </a:p>
+                  </a:txBody>
+                  <a:tcPr/>
+                </a:tc>
+                <a:tc>
+                  <a:txBody>
+                    <a:bodyPr/>
+                    <a:lstStyle/>
+                    <a:p>
+                      <a:r>
+                        <a:rPr lang="en-US" sz="1200" dirty="0"/>
+                        <a:t>81.08%</a:t>
+                      </a:r>
+                    </a:p>
+                  </a:txBody>
+                  <a:tcPr/>
+                </a:tc>
+                <a:tc>
+                  <a:txBody>
+                    <a:bodyPr/>
+                    <a:lstStyle/>
+                    <a:p>
+                      <a:r>
+                        <a:rPr lang="en-US" sz="1200" dirty="0"/>
+                        <a:t>81.11%</a:t>
+                      </a:r>
+                    </a:p>
+                  </a:txBody>
+                  <a:tcPr/>
+                </a:tc>
+                <a:tc>
+                  <a:txBody>
+                    <a:bodyPr/>
+                    <a:lstStyle/>
+                    <a:p>
+                      <a:r>
+                        <a:rPr lang="en-US" sz="1200" dirty="0"/>
+                        <a:t>81.08%</a:t>
+                      </a:r>
+                    </a:p>
+                  </a:txBody>
+                  <a:tcPr/>
+                </a:tc>
+                <a:extLst>
+                  <a:ext uri="{0D108BD9-81ED-4DB2-BD59-A6C34878D82A}">
+                    <a16:rowId xmlns:a16="http://schemas.microsoft.com/office/drawing/2014/main" val="3998100381"/>
+                  </a:ext>
+                </a:extLst>
+              </a:tr>
+            </a:tbl>
+          </a:graphicData>
+        </a:graphic>
+      </p:graphicFrame>
+      <p:sp>
+        <p:nvSpPr>
+          <p:cNvPr id="40" name="Arrow: Right 39">
+            <a:extLst>
+              <a:ext uri="{FF2B5EF4-FFF2-40B4-BE49-F238E27FC236}">
+                <a16:creationId xmlns:a16="http://schemas.microsoft.com/office/drawing/2014/main" id="{DE470760-77B6-4DA0-BFE4-61CBDABB9866}"/>
+              </a:ext>
+            </a:extLst>
+          </p:cNvPr>
+          <p:cNvSpPr/>
+          <p:nvPr/>
+        </p:nvSpPr>
+        <p:spPr>
+          <a:xfrm>
+            <a:off x="3399183" y="1093302"/>
+            <a:ext cx="291135" cy="168965"/>
+          </a:xfrm>
+          <a:prstGeom prst="rightArrow">
+            <a:avLst/>
+          </a:prstGeom>
+        </p:spPr>
+        <p:style>
+          <a:lnRef idx="2">
+            <a:schemeClr val="accent1">
+              <a:shade val="50000"/>
+            </a:schemeClr>
+          </a:lnRef>
+          <a:fillRef idx="1">
+            <a:schemeClr val="accent1"/>
+          </a:fillRef>
+          <a:effectRef idx="0">
+            <a:schemeClr val="accent1"/>
+          </a:effectRef>
+          <a:fontRef idx="minor">
+            <a:schemeClr val="lt1"/>
+          </a:fontRef>
+        </p:style>
+        <p:txBody>
+          <a:bodyPr rtlCol="0" anchor="ctr"/>
+          <a:lstStyle/>
+          <a:p>
+            <a:pPr algn="ctr"/>
+            <a:endParaRPr lang="en-US"/>
+          </a:p>
+        </p:txBody>
+      </p:sp>
+      <p:sp>
+        <p:nvSpPr>
+          <p:cNvPr id="41" name="Arrow: Right 40">
+            <a:extLst>
+              <a:ext uri="{FF2B5EF4-FFF2-40B4-BE49-F238E27FC236}">
+                <a16:creationId xmlns:a16="http://schemas.microsoft.com/office/drawing/2014/main" id="{D9F80517-458A-487B-98D3-5A87E9DE1DE3}"/>
+              </a:ext>
+            </a:extLst>
+          </p:cNvPr>
+          <p:cNvSpPr/>
+          <p:nvPr/>
+        </p:nvSpPr>
+        <p:spPr>
+          <a:xfrm>
+            <a:off x="6164301" y="1071985"/>
+            <a:ext cx="291135" cy="168965"/>
+          </a:xfrm>
+          <a:prstGeom prst="rightArrow">
+            <a:avLst/>
+          </a:prstGeom>
+        </p:spPr>
+        <p:style>
+          <a:lnRef idx="2">
+            <a:schemeClr val="accent1">
+              <a:shade val="50000"/>
+            </a:schemeClr>
+          </a:lnRef>
+          <a:fillRef idx="1">
+            <a:schemeClr val="accent1"/>
+          </a:fillRef>
+          <a:effectRef idx="0">
+            <a:schemeClr val="accent1"/>
+          </a:effectRef>
+          <a:fontRef idx="minor">
+            <a:schemeClr val="lt1"/>
+          </a:fontRef>
+        </p:style>
+        <p:txBody>
+          <a:bodyPr rtlCol="0" anchor="ctr"/>
+          <a:lstStyle/>
+          <a:p>
+            <a:pPr algn="ctr"/>
+            <a:endParaRPr lang="en-US"/>
+          </a:p>
+        </p:txBody>
+      </p:sp>
+      <p:pic>
+        <p:nvPicPr>
+          <p:cNvPr id="6" name="Picture 5">
+            <a:extLst>
+              <a:ext uri="{FF2B5EF4-FFF2-40B4-BE49-F238E27FC236}">
+                <a16:creationId xmlns:a16="http://schemas.microsoft.com/office/drawing/2014/main" id="{A3F6FCB1-101E-4F84-B2F4-CFE85833AB6A}"/>
+              </a:ext>
+            </a:extLst>
+          </p:cNvPr>
+          <p:cNvPicPr>
+            <a:picLocks noChangeAspect="1"/>
+          </p:cNvPicPr>
+          <p:nvPr/>
+        </p:nvPicPr>
+        <p:blipFill>
+          <a:blip r:embed="rId2">
+            <a:extLst>
+              <a:ext uri="{28A0092B-C50C-407E-A947-70E740481C1C}">
+                <a14:useLocalDpi xmlns:a14="http://schemas.microsoft.com/office/drawing/2010/main" val="0"/>
+              </a:ext>
+            </a:extLst>
+          </a:blip>
+          <a:stretch>
+            <a:fillRect/>
+          </a:stretch>
+        </p:blipFill>
+        <p:spPr>
+          <a:xfrm>
+            <a:off x="2763081" y="4219023"/>
+            <a:ext cx="3904049" cy="2800105"/>
+          </a:xfrm>
+          <a:prstGeom prst="rect">
+            <a:avLst/>
+          </a:prstGeom>
+        </p:spPr>
+      </p:pic>
+    </p:spTree>
+    <p:extLst>
+      <p:ext uri="{BB962C8B-B14F-4D97-AF65-F5344CB8AC3E}">
+        <p14:creationId xmlns:p14="http://schemas.microsoft.com/office/powerpoint/2010/main" val="1142068182"/>
+      </p:ext>
+    </p:extLst>
+  </p:cSld>
+  <p:clrMapOvr>
+    <a:masterClrMapping/>
+  </p:clrMapOvr>
+</p:sld>
+</file>
+
+<file path=ppt/slides/slide7.xml><?xml version="1.0" encoding="utf-8"?>
+<p:sld xmlns:a="http://schemas.openxmlformats.org/drawingml/2006/main" xmlns:r="http://schemas.openxmlformats.org/officeDocument/2006/relationships" xmlns:p="http://schemas.openxmlformats.org/presentationml/2006/main">
+  <p:cSld>
+    <p:spTree>
+      <p:nvGrpSpPr>
+        <p:cNvPr id="1" name=""/>
+        <p:cNvGrpSpPr/>
+        <p:nvPr/>
+      </p:nvGrpSpPr>
+      <p:grpSpPr>
+        <a:xfrm>
+          <a:off x="0" y="0"/>
+          <a:ext cx="0" cy="0"/>
+          <a:chOff x="0" y="0"/>
+          <a:chExt cx="0" cy="0"/>
+        </a:xfrm>
+      </p:grpSpPr>
+      <p:sp>
+        <p:nvSpPr>
+          <p:cNvPr id="5" name="TextBox 4">
+            <a:extLst>
+              <a:ext uri="{FF2B5EF4-FFF2-40B4-BE49-F238E27FC236}">
+                <a16:creationId xmlns:a16="http://schemas.microsoft.com/office/drawing/2014/main" id="{E618A879-07CD-4346-87B2-78C6583069E6}"/>
+              </a:ext>
+            </a:extLst>
+          </p:cNvPr>
+          <p:cNvSpPr txBox="1"/>
+          <p:nvPr/>
+        </p:nvSpPr>
+        <p:spPr>
+          <a:xfrm>
+            <a:off x="228601" y="188844"/>
+            <a:ext cx="11587578" cy="523220"/>
+          </a:xfrm>
+          <a:prstGeom prst="rect">
+            <a:avLst/>
+          </a:prstGeom>
+          <a:noFill/>
+        </p:spPr>
+        <p:txBody>
+          <a:bodyPr wrap="square" rtlCol="0">
+            <a:spAutoFit/>
+          </a:bodyPr>
+          <a:lstStyle/>
+          <a:p>
+            <a:r>
+              <a:rPr lang="en-US" altLang="en-US" sz="1400" dirty="0">
+                <a:latin typeface="Arial" panose="020B0604020202020204" pitchFamily="34" charset="0"/>
+                <a:ea typeface="Times New Roman" panose="02020603050405020304" pitchFamily="18" charset="0"/>
+              </a:rPr>
+              <a:t>Random Forest method is used to classify the data into classes and predict the mean (regression) of the forest trees to predict </a:t>
+            </a:r>
+            <a:r>
+              <a:rPr lang="en-US" sz="1400" dirty="0"/>
+              <a:t>Total BTU and Dollar</a:t>
+            </a:r>
+          </a:p>
+        </p:txBody>
+      </p:sp>
+      <p:sp>
+        <p:nvSpPr>
+          <p:cNvPr id="27" name="Freeform: Shape 26">
+            <a:extLst>
+              <a:ext uri="{FF2B5EF4-FFF2-40B4-BE49-F238E27FC236}">
+                <a16:creationId xmlns:a16="http://schemas.microsoft.com/office/drawing/2014/main" id="{08A6CB71-224C-4627-9A69-EB399C26D260}"/>
+              </a:ext>
+            </a:extLst>
+          </p:cNvPr>
+          <p:cNvSpPr/>
+          <p:nvPr/>
+        </p:nvSpPr>
+        <p:spPr>
+          <a:xfrm>
+            <a:off x="845333" y="760599"/>
+            <a:ext cx="2433443" cy="979309"/>
+          </a:xfrm>
+          <a:custGeom>
+            <a:avLst/>
+            <a:gdLst>
+              <a:gd name="connsiteX0" fmla="*/ 0 w 2357070"/>
+              <a:gd name="connsiteY0" fmla="*/ 275034 h 1649872"/>
+              <a:gd name="connsiteX1" fmla="*/ 275034 w 2357070"/>
+              <a:gd name="connsiteY1" fmla="*/ 0 h 1649872"/>
+              <a:gd name="connsiteX2" fmla="*/ 2082036 w 2357070"/>
+              <a:gd name="connsiteY2" fmla="*/ 0 h 1649872"/>
+              <a:gd name="connsiteX3" fmla="*/ 2357070 w 2357070"/>
+              <a:gd name="connsiteY3" fmla="*/ 275034 h 1649872"/>
+              <a:gd name="connsiteX4" fmla="*/ 2357070 w 2357070"/>
+              <a:gd name="connsiteY4" fmla="*/ 1374838 h 1649872"/>
+              <a:gd name="connsiteX5" fmla="*/ 2082036 w 2357070"/>
+              <a:gd name="connsiteY5" fmla="*/ 1649872 h 1649872"/>
+              <a:gd name="connsiteX6" fmla="*/ 275034 w 2357070"/>
+              <a:gd name="connsiteY6" fmla="*/ 1649872 h 1649872"/>
+              <a:gd name="connsiteX7" fmla="*/ 0 w 2357070"/>
+              <a:gd name="connsiteY7" fmla="*/ 1374838 h 1649872"/>
+              <a:gd name="connsiteX8" fmla="*/ 0 w 2357070"/>
+              <a:gd name="connsiteY8" fmla="*/ 275034 h 1649872"/>
+            </a:gdLst>
+            <a:ahLst/>
+            <a:cxnLst>
+              <a:cxn ang="0">
+                <a:pos x="connsiteX0" y="connsiteY0"/>
+              </a:cxn>
+              <a:cxn ang="0">
+                <a:pos x="connsiteX1" y="connsiteY1"/>
+              </a:cxn>
+              <a:cxn ang="0">
+                <a:pos x="connsiteX2" y="connsiteY2"/>
+              </a:cxn>
+              <a:cxn ang="0">
+                <a:pos x="connsiteX3" y="connsiteY3"/>
+              </a:cxn>
+              <a:cxn ang="0">
+                <a:pos x="connsiteX4" y="connsiteY4"/>
+              </a:cxn>
+              <a:cxn ang="0">
+                <a:pos x="connsiteX5" y="connsiteY5"/>
+              </a:cxn>
+              <a:cxn ang="0">
+                <a:pos x="connsiteX6" y="connsiteY6"/>
+              </a:cxn>
+              <a:cxn ang="0">
+                <a:pos x="connsiteX7" y="connsiteY7"/>
+              </a:cxn>
+              <a:cxn ang="0">
+                <a:pos x="connsiteX8" y="connsiteY8"/>
+              </a:cxn>
+            </a:cxnLst>
+            <a:rect l="l" t="t" r="r" b="b"/>
+            <a:pathLst>
+              <a:path w="2357070" h="1649872">
+                <a:moveTo>
+                  <a:pt x="0" y="275034"/>
+                </a:moveTo>
+                <a:cubicBezTo>
+                  <a:pt x="0" y="123137"/>
+                  <a:pt x="123137" y="0"/>
+                  <a:pt x="275034" y="0"/>
+                </a:cubicBezTo>
+                <a:lnTo>
+                  <a:pt x="2082036" y="0"/>
+                </a:lnTo>
+                <a:cubicBezTo>
+                  <a:pt x="2233933" y="0"/>
+                  <a:pt x="2357070" y="123137"/>
+                  <a:pt x="2357070" y="275034"/>
+                </a:cubicBezTo>
+                <a:lnTo>
+                  <a:pt x="2357070" y="1374838"/>
+                </a:lnTo>
+                <a:cubicBezTo>
+                  <a:pt x="2357070" y="1526735"/>
+                  <a:pt x="2233933" y="1649872"/>
+                  <a:pt x="2082036" y="1649872"/>
+                </a:cubicBezTo>
+                <a:lnTo>
+                  <a:pt x="275034" y="1649872"/>
+                </a:lnTo>
+                <a:cubicBezTo>
+                  <a:pt x="123137" y="1649872"/>
+                  <a:pt x="0" y="1526735"/>
+                  <a:pt x="0" y="1374838"/>
+                </a:cubicBezTo>
+                <a:lnTo>
+                  <a:pt x="0" y="275034"/>
+                </a:lnTo>
+                <a:close/>
+              </a:path>
+            </a:pathLst>
+          </a:custGeom>
+          <a:noFill/>
+          <a:ln>
+            <a:solidFill>
+              <a:schemeClr val="accent1"/>
+            </a:solidFill>
+          </a:ln>
+        </p:spPr>
+        <p:style>
+          <a:lnRef idx="2">
+            <a:schemeClr val="lt1">
+              <a:hueOff val="0"/>
+              <a:satOff val="0"/>
+              <a:lumOff val="0"/>
+              <a:alphaOff val="0"/>
+            </a:schemeClr>
+          </a:lnRef>
+          <a:fillRef idx="1">
+            <a:schemeClr val="accent1">
+              <a:hueOff val="0"/>
+              <a:satOff val="0"/>
+              <a:lumOff val="0"/>
+              <a:alphaOff val="0"/>
+            </a:schemeClr>
+          </a:fillRef>
+          <a:effectRef idx="0">
+            <a:schemeClr val="accent1">
+              <a:hueOff val="0"/>
+              <a:satOff val="0"/>
+              <a:lumOff val="0"/>
+              <a:alphaOff val="0"/>
+            </a:schemeClr>
+          </a:effectRef>
+          <a:fontRef idx="minor">
+            <a:schemeClr val="lt1"/>
+          </a:fontRef>
+        </p:style>
+        <p:txBody>
+          <a:bodyPr spcFirstLastPara="0" vert="horz" wrap="square" lIns="133895" tIns="133895" rIns="133895" bIns="133895" numCol="1" spcCol="1270" anchor="ctr" anchorCtr="0">
+            <a:noAutofit/>
+          </a:bodyPr>
+          <a:lstStyle/>
+          <a:p>
+            <a:pPr marL="0" lvl="0" indent="0" algn="l" defTabSz="622300">
+              <a:lnSpc>
+                <a:spcPct val="90000"/>
+              </a:lnSpc>
+              <a:spcBef>
+                <a:spcPct val="0"/>
+              </a:spcBef>
+              <a:spcAft>
+                <a:spcPct val="35000"/>
+              </a:spcAft>
+              <a:buNone/>
+            </a:pPr>
+            <a:r>
+              <a:rPr lang="en-US" sz="1200" b="1" kern="1200" dirty="0">
+                <a:solidFill>
+                  <a:schemeClr val="tx1"/>
+                </a:solidFill>
+              </a:rPr>
+              <a:t>Step 1</a:t>
+            </a:r>
+            <a:r>
+              <a:rPr lang="en-US" sz="1200" kern="1200" dirty="0">
+                <a:solidFill>
+                  <a:schemeClr val="tx1"/>
+                </a:solidFill>
+              </a:rPr>
+              <a:t> – Creating a based Random Forest model and predict Y. </a:t>
+            </a:r>
+          </a:p>
+          <a:p>
+            <a:pPr marL="0" lvl="0" indent="0" algn="l" defTabSz="622300">
+              <a:lnSpc>
+                <a:spcPct val="90000"/>
+              </a:lnSpc>
+              <a:spcBef>
+                <a:spcPct val="0"/>
+              </a:spcBef>
+              <a:spcAft>
+                <a:spcPct val="35000"/>
+              </a:spcAft>
+              <a:buNone/>
+            </a:pPr>
+            <a:endParaRPr lang="en-US" sz="1200" kern="1200" dirty="0">
+              <a:solidFill>
+                <a:schemeClr val="tx1"/>
+              </a:solidFill>
+            </a:endParaRPr>
+          </a:p>
+        </p:txBody>
+      </p:sp>
+      <p:sp>
+        <p:nvSpPr>
+          <p:cNvPr id="29" name="Freeform: Shape 28">
+            <a:extLst>
+              <a:ext uri="{FF2B5EF4-FFF2-40B4-BE49-F238E27FC236}">
+                <a16:creationId xmlns:a16="http://schemas.microsoft.com/office/drawing/2014/main" id="{CC082855-0F08-43EA-B263-25A0DB88F36C}"/>
+              </a:ext>
+            </a:extLst>
+          </p:cNvPr>
+          <p:cNvSpPr/>
+          <p:nvPr/>
+        </p:nvSpPr>
+        <p:spPr>
+          <a:xfrm>
+            <a:off x="3690318" y="760600"/>
+            <a:ext cx="2493310" cy="892983"/>
+          </a:xfrm>
+          <a:custGeom>
+            <a:avLst/>
+            <a:gdLst>
+              <a:gd name="connsiteX0" fmla="*/ 0 w 2357070"/>
+              <a:gd name="connsiteY0" fmla="*/ 275034 h 1649872"/>
+              <a:gd name="connsiteX1" fmla="*/ 275034 w 2357070"/>
+              <a:gd name="connsiteY1" fmla="*/ 0 h 1649872"/>
+              <a:gd name="connsiteX2" fmla="*/ 2082036 w 2357070"/>
+              <a:gd name="connsiteY2" fmla="*/ 0 h 1649872"/>
+              <a:gd name="connsiteX3" fmla="*/ 2357070 w 2357070"/>
+              <a:gd name="connsiteY3" fmla="*/ 275034 h 1649872"/>
+              <a:gd name="connsiteX4" fmla="*/ 2357070 w 2357070"/>
+              <a:gd name="connsiteY4" fmla="*/ 1374838 h 1649872"/>
+              <a:gd name="connsiteX5" fmla="*/ 2082036 w 2357070"/>
+              <a:gd name="connsiteY5" fmla="*/ 1649872 h 1649872"/>
+              <a:gd name="connsiteX6" fmla="*/ 275034 w 2357070"/>
+              <a:gd name="connsiteY6" fmla="*/ 1649872 h 1649872"/>
+              <a:gd name="connsiteX7" fmla="*/ 0 w 2357070"/>
+              <a:gd name="connsiteY7" fmla="*/ 1374838 h 1649872"/>
+              <a:gd name="connsiteX8" fmla="*/ 0 w 2357070"/>
+              <a:gd name="connsiteY8" fmla="*/ 275034 h 1649872"/>
+            </a:gdLst>
+            <a:ahLst/>
+            <a:cxnLst>
+              <a:cxn ang="0">
+                <a:pos x="connsiteX0" y="connsiteY0"/>
+              </a:cxn>
+              <a:cxn ang="0">
+                <a:pos x="connsiteX1" y="connsiteY1"/>
+              </a:cxn>
+              <a:cxn ang="0">
+                <a:pos x="connsiteX2" y="connsiteY2"/>
+              </a:cxn>
+              <a:cxn ang="0">
+                <a:pos x="connsiteX3" y="connsiteY3"/>
+              </a:cxn>
+              <a:cxn ang="0">
+                <a:pos x="connsiteX4" y="connsiteY4"/>
+              </a:cxn>
+              <a:cxn ang="0">
+                <a:pos x="connsiteX5" y="connsiteY5"/>
+              </a:cxn>
+              <a:cxn ang="0">
+                <a:pos x="connsiteX6" y="connsiteY6"/>
+              </a:cxn>
+              <a:cxn ang="0">
+                <a:pos x="connsiteX7" y="connsiteY7"/>
+              </a:cxn>
+              <a:cxn ang="0">
+                <a:pos x="connsiteX8" y="connsiteY8"/>
+              </a:cxn>
+            </a:cxnLst>
+            <a:rect l="l" t="t" r="r" b="b"/>
+            <a:pathLst>
+              <a:path w="2357070" h="1649872">
+                <a:moveTo>
+                  <a:pt x="0" y="275034"/>
+                </a:moveTo>
+                <a:cubicBezTo>
+                  <a:pt x="0" y="123137"/>
+                  <a:pt x="123137" y="0"/>
+                  <a:pt x="275034" y="0"/>
+                </a:cubicBezTo>
+                <a:lnTo>
+                  <a:pt x="2082036" y="0"/>
+                </a:lnTo>
+                <a:cubicBezTo>
+                  <a:pt x="2233933" y="0"/>
+                  <a:pt x="2357070" y="123137"/>
+                  <a:pt x="2357070" y="275034"/>
+                </a:cubicBezTo>
+                <a:lnTo>
+                  <a:pt x="2357070" y="1374838"/>
+                </a:lnTo>
+                <a:cubicBezTo>
+                  <a:pt x="2357070" y="1526735"/>
+                  <a:pt x="2233933" y="1649872"/>
+                  <a:pt x="2082036" y="1649872"/>
+                </a:cubicBezTo>
+                <a:lnTo>
+                  <a:pt x="275034" y="1649872"/>
+                </a:lnTo>
+                <a:cubicBezTo>
+                  <a:pt x="123137" y="1649872"/>
+                  <a:pt x="0" y="1526735"/>
+                  <a:pt x="0" y="1374838"/>
+                </a:cubicBezTo>
+                <a:lnTo>
+                  <a:pt x="0" y="275034"/>
+                </a:lnTo>
+                <a:close/>
+              </a:path>
+            </a:pathLst>
+          </a:custGeom>
+          <a:noFill/>
+          <a:ln>
+            <a:solidFill>
+              <a:schemeClr val="accent1"/>
+            </a:solidFill>
+          </a:ln>
+        </p:spPr>
+        <p:style>
+          <a:lnRef idx="2">
+            <a:schemeClr val="lt1">
+              <a:hueOff val="0"/>
+              <a:satOff val="0"/>
+              <a:lumOff val="0"/>
+              <a:alphaOff val="0"/>
+            </a:schemeClr>
+          </a:lnRef>
+          <a:fillRef idx="1">
+            <a:schemeClr val="accent1">
+              <a:hueOff val="0"/>
+              <a:satOff val="0"/>
+              <a:lumOff val="0"/>
+              <a:alphaOff val="0"/>
+            </a:schemeClr>
+          </a:fillRef>
+          <a:effectRef idx="0">
+            <a:schemeClr val="accent1">
+              <a:hueOff val="0"/>
+              <a:satOff val="0"/>
+              <a:lumOff val="0"/>
+              <a:alphaOff val="0"/>
+            </a:schemeClr>
+          </a:effectRef>
+          <a:fontRef idx="minor">
+            <a:schemeClr val="lt1"/>
+          </a:fontRef>
+        </p:style>
+        <p:txBody>
+          <a:bodyPr spcFirstLastPara="0" vert="horz" wrap="square" lIns="133895" tIns="133895" rIns="133895" bIns="133895" numCol="1" spcCol="1270" anchor="ctr" anchorCtr="0">
+            <a:noAutofit/>
+          </a:bodyPr>
+          <a:lstStyle/>
+          <a:p>
+            <a:pPr defTabSz="622300">
+              <a:lnSpc>
+                <a:spcPct val="90000"/>
+              </a:lnSpc>
+              <a:spcBef>
+                <a:spcPct val="0"/>
+              </a:spcBef>
+              <a:spcAft>
+                <a:spcPct val="35000"/>
+              </a:spcAft>
+            </a:pPr>
+            <a:r>
+              <a:rPr lang="en-US" sz="1200" b="1" dirty="0">
+                <a:solidFill>
+                  <a:schemeClr val="tx1"/>
+                </a:solidFill>
+              </a:rPr>
+              <a:t>Step2</a:t>
+            </a:r>
+            <a:r>
+              <a:rPr lang="en-US" sz="1200" dirty="0">
+                <a:solidFill>
+                  <a:schemeClr val="tx1"/>
+                </a:solidFill>
+              </a:rPr>
+              <a:t> – Fine Tune model using </a:t>
+            </a:r>
+            <a:r>
+              <a:rPr lang="en-US" sz="1200" dirty="0" err="1">
+                <a:solidFill>
+                  <a:schemeClr val="tx1"/>
+                </a:solidFill>
+              </a:rPr>
+              <a:t>RandomForestRegressor</a:t>
+            </a:r>
+            <a:r>
+              <a:rPr lang="en-US" sz="1200" dirty="0">
+                <a:solidFill>
+                  <a:schemeClr val="tx1"/>
+                </a:solidFill>
+              </a:rPr>
+              <a:t> to determine optimum hyper-parameters for the best r2 score</a:t>
+            </a:r>
+          </a:p>
+        </p:txBody>
+      </p:sp>
+      <p:sp>
+        <p:nvSpPr>
+          <p:cNvPr id="31" name="Freeform: Shape 30">
+            <a:extLst>
+              <a:ext uri="{FF2B5EF4-FFF2-40B4-BE49-F238E27FC236}">
+                <a16:creationId xmlns:a16="http://schemas.microsoft.com/office/drawing/2014/main" id="{3F86357A-FC59-4E64-A550-D98A57AF9CF9}"/>
+              </a:ext>
+            </a:extLst>
+          </p:cNvPr>
+          <p:cNvSpPr/>
+          <p:nvPr/>
+        </p:nvSpPr>
+        <p:spPr>
+          <a:xfrm>
+            <a:off x="6657633" y="778727"/>
+            <a:ext cx="2166729" cy="856728"/>
+          </a:xfrm>
+          <a:custGeom>
+            <a:avLst/>
+            <a:gdLst>
+              <a:gd name="connsiteX0" fmla="*/ 0 w 2357070"/>
+              <a:gd name="connsiteY0" fmla="*/ 275034 h 1649872"/>
+              <a:gd name="connsiteX1" fmla="*/ 275034 w 2357070"/>
+              <a:gd name="connsiteY1" fmla="*/ 0 h 1649872"/>
+              <a:gd name="connsiteX2" fmla="*/ 2082036 w 2357070"/>
+              <a:gd name="connsiteY2" fmla="*/ 0 h 1649872"/>
+              <a:gd name="connsiteX3" fmla="*/ 2357070 w 2357070"/>
+              <a:gd name="connsiteY3" fmla="*/ 275034 h 1649872"/>
+              <a:gd name="connsiteX4" fmla="*/ 2357070 w 2357070"/>
+              <a:gd name="connsiteY4" fmla="*/ 1374838 h 1649872"/>
+              <a:gd name="connsiteX5" fmla="*/ 2082036 w 2357070"/>
+              <a:gd name="connsiteY5" fmla="*/ 1649872 h 1649872"/>
+              <a:gd name="connsiteX6" fmla="*/ 275034 w 2357070"/>
+              <a:gd name="connsiteY6" fmla="*/ 1649872 h 1649872"/>
+              <a:gd name="connsiteX7" fmla="*/ 0 w 2357070"/>
+              <a:gd name="connsiteY7" fmla="*/ 1374838 h 1649872"/>
+              <a:gd name="connsiteX8" fmla="*/ 0 w 2357070"/>
+              <a:gd name="connsiteY8" fmla="*/ 275034 h 1649872"/>
+            </a:gdLst>
+            <a:ahLst/>
+            <a:cxnLst>
+              <a:cxn ang="0">
+                <a:pos x="connsiteX0" y="connsiteY0"/>
+              </a:cxn>
+              <a:cxn ang="0">
+                <a:pos x="connsiteX1" y="connsiteY1"/>
+              </a:cxn>
+              <a:cxn ang="0">
+                <a:pos x="connsiteX2" y="connsiteY2"/>
+              </a:cxn>
+              <a:cxn ang="0">
+                <a:pos x="connsiteX3" y="connsiteY3"/>
+              </a:cxn>
+              <a:cxn ang="0">
+                <a:pos x="connsiteX4" y="connsiteY4"/>
+              </a:cxn>
+              <a:cxn ang="0">
+                <a:pos x="connsiteX5" y="connsiteY5"/>
+              </a:cxn>
+              <a:cxn ang="0">
+                <a:pos x="connsiteX6" y="connsiteY6"/>
+              </a:cxn>
+              <a:cxn ang="0">
+                <a:pos x="connsiteX7" y="connsiteY7"/>
+              </a:cxn>
+              <a:cxn ang="0">
+                <a:pos x="connsiteX8" y="connsiteY8"/>
+              </a:cxn>
+            </a:cxnLst>
+            <a:rect l="l" t="t" r="r" b="b"/>
+            <a:pathLst>
+              <a:path w="2357070" h="1649872">
+                <a:moveTo>
+                  <a:pt x="0" y="275034"/>
+                </a:moveTo>
+                <a:cubicBezTo>
+                  <a:pt x="0" y="123137"/>
+                  <a:pt x="123137" y="0"/>
+                  <a:pt x="275034" y="0"/>
+                </a:cubicBezTo>
+                <a:lnTo>
+                  <a:pt x="2082036" y="0"/>
+                </a:lnTo>
+                <a:cubicBezTo>
+                  <a:pt x="2233933" y="0"/>
+                  <a:pt x="2357070" y="123137"/>
+                  <a:pt x="2357070" y="275034"/>
+                </a:cubicBezTo>
+                <a:lnTo>
+                  <a:pt x="2357070" y="1374838"/>
+                </a:lnTo>
+                <a:cubicBezTo>
+                  <a:pt x="2357070" y="1526735"/>
+                  <a:pt x="2233933" y="1649872"/>
+                  <a:pt x="2082036" y="1649872"/>
+                </a:cubicBezTo>
+                <a:lnTo>
+                  <a:pt x="275034" y="1649872"/>
+                </a:lnTo>
+                <a:cubicBezTo>
+                  <a:pt x="123137" y="1649872"/>
+                  <a:pt x="0" y="1526735"/>
+                  <a:pt x="0" y="1374838"/>
+                </a:cubicBezTo>
+                <a:lnTo>
+                  <a:pt x="0" y="275034"/>
+                </a:lnTo>
+                <a:close/>
+              </a:path>
+            </a:pathLst>
+          </a:custGeom>
+          <a:noFill/>
+          <a:ln>
+            <a:solidFill>
+              <a:schemeClr val="accent1"/>
+            </a:solidFill>
+          </a:ln>
+        </p:spPr>
+        <p:style>
+          <a:lnRef idx="2">
+            <a:schemeClr val="lt1">
+              <a:hueOff val="0"/>
+              <a:satOff val="0"/>
+              <a:lumOff val="0"/>
+              <a:alphaOff val="0"/>
+            </a:schemeClr>
+          </a:lnRef>
+          <a:fillRef idx="1">
+            <a:schemeClr val="accent1">
+              <a:hueOff val="0"/>
+              <a:satOff val="0"/>
+              <a:lumOff val="0"/>
+              <a:alphaOff val="0"/>
+            </a:schemeClr>
+          </a:fillRef>
+          <a:effectRef idx="0">
+            <a:schemeClr val="accent1">
+              <a:hueOff val="0"/>
+              <a:satOff val="0"/>
+              <a:lumOff val="0"/>
+              <a:alphaOff val="0"/>
+            </a:schemeClr>
+          </a:effectRef>
+          <a:fontRef idx="minor">
+            <a:schemeClr val="lt1"/>
+          </a:fontRef>
+        </p:style>
+        <p:txBody>
+          <a:bodyPr spcFirstLastPara="0" vert="horz" wrap="square" lIns="133895" tIns="133895" rIns="133895" bIns="133895" numCol="1" spcCol="1270" anchor="ctr" anchorCtr="0">
+            <a:noAutofit/>
+          </a:bodyPr>
+          <a:lstStyle/>
+          <a:p>
+            <a:pPr lvl="0" defTabSz="622300">
+              <a:lnSpc>
+                <a:spcPct val="90000"/>
+              </a:lnSpc>
+              <a:spcBef>
+                <a:spcPct val="0"/>
+              </a:spcBef>
+              <a:spcAft>
+                <a:spcPct val="35000"/>
+              </a:spcAft>
+            </a:pPr>
+            <a:r>
+              <a:rPr lang="en-US" sz="1200" b="1" kern="1200" dirty="0">
+                <a:solidFill>
+                  <a:schemeClr val="tx1"/>
+                </a:solidFill>
+              </a:rPr>
+              <a:t>Step3</a:t>
+            </a:r>
+            <a:r>
+              <a:rPr lang="en-US" sz="1200" kern="1200" dirty="0">
+                <a:solidFill>
+                  <a:schemeClr val="tx1"/>
+                </a:solidFill>
+              </a:rPr>
+              <a:t> – Finalize model by comparing r2 scores against base and fine </a:t>
+            </a:r>
+            <a:r>
+              <a:rPr lang="en-US" sz="1200" dirty="0">
+                <a:solidFill>
+                  <a:schemeClr val="tx1"/>
+                </a:solidFill>
+              </a:rPr>
+              <a:t>tuned</a:t>
+            </a:r>
+            <a:r>
+              <a:rPr lang="en-US" sz="1200" kern="1200" dirty="0">
+                <a:solidFill>
+                  <a:schemeClr val="tx1"/>
+                </a:solidFill>
+              </a:rPr>
+              <a:t> </a:t>
+            </a:r>
+            <a:r>
+              <a:rPr lang="en-US" sz="1200" dirty="0">
+                <a:solidFill>
+                  <a:schemeClr val="tx1"/>
+                </a:solidFill>
+              </a:rPr>
+              <a:t>models</a:t>
+            </a:r>
+            <a:br>
+              <a:rPr lang="en-US" sz="1200" dirty="0">
+                <a:solidFill>
+                  <a:schemeClr val="tx1"/>
+                </a:solidFill>
+              </a:rPr>
+            </a:br>
+            <a:r>
+              <a:rPr lang="en-US" sz="1200" dirty="0">
+                <a:solidFill>
+                  <a:schemeClr val="tx1"/>
+                </a:solidFill>
+              </a:rPr>
+              <a:t>Obtain Root Mean Square Error (RMSE) and r2</a:t>
+            </a:r>
+            <a:endParaRPr lang="en-US" sz="1200" kern="1200" dirty="0">
+              <a:solidFill>
+                <a:schemeClr val="tx1"/>
+              </a:solidFill>
+            </a:endParaRPr>
+          </a:p>
+        </p:txBody>
+      </p:sp>
+      <p:graphicFrame>
+        <p:nvGraphicFramePr>
+          <p:cNvPr id="37" name="Table 36">
+            <a:extLst>
+              <a:ext uri="{FF2B5EF4-FFF2-40B4-BE49-F238E27FC236}">
+                <a16:creationId xmlns:a16="http://schemas.microsoft.com/office/drawing/2014/main" id="{A8BDD122-C0F0-4FDB-8714-C90A322FF873}"/>
+              </a:ext>
+            </a:extLst>
+          </p:cNvPr>
+          <p:cNvGraphicFramePr>
+            <a:graphicFrameLocks noGrp="1"/>
+          </p:cNvGraphicFramePr>
+          <p:nvPr>
+            <p:extLst/>
+          </p:nvPr>
+        </p:nvGraphicFramePr>
+        <p:xfrm>
+          <a:off x="930773" y="3662567"/>
+          <a:ext cx="8252788" cy="1524186"/>
+        </p:xfrm>
+        <a:graphic>
+          <a:graphicData uri="http://schemas.openxmlformats.org/drawingml/2006/table">
+            <a:tbl>
+              <a:tblPr firstRow="1" bandRow="1">
+                <a:tableStyleId>{3B4B98B0-60AC-42C2-AFA5-B58CD77FA1E5}</a:tableStyleId>
+              </a:tblPr>
+              <a:tblGrid>
+                <a:gridCol w="1373287">
+                  <a:extLst>
+                    <a:ext uri="{9D8B030D-6E8A-4147-A177-3AD203B41FA5}">
+                      <a16:colId xmlns:a16="http://schemas.microsoft.com/office/drawing/2014/main" val="1628376606"/>
+                    </a:ext>
+                  </a:extLst>
+                </a:gridCol>
+                <a:gridCol w="1208153">
+                  <a:extLst>
+                    <a:ext uri="{9D8B030D-6E8A-4147-A177-3AD203B41FA5}">
+                      <a16:colId xmlns:a16="http://schemas.microsoft.com/office/drawing/2014/main" val="3537171461"/>
+                    </a:ext>
+                  </a:extLst>
+                </a:gridCol>
+                <a:gridCol w="1864374">
+                  <a:extLst>
+                    <a:ext uri="{9D8B030D-6E8A-4147-A177-3AD203B41FA5}">
+                      <a16:colId xmlns:a16="http://schemas.microsoft.com/office/drawing/2014/main" val="992476981"/>
+                    </a:ext>
+                  </a:extLst>
+                </a:gridCol>
+                <a:gridCol w="1694885">
+                  <a:extLst>
+                    <a:ext uri="{9D8B030D-6E8A-4147-A177-3AD203B41FA5}">
+                      <a16:colId xmlns:a16="http://schemas.microsoft.com/office/drawing/2014/main" val="2534363247"/>
+                    </a:ext>
+                  </a:extLst>
+                </a:gridCol>
+                <a:gridCol w="2112089">
+                  <a:extLst>
+                    <a:ext uri="{9D8B030D-6E8A-4147-A177-3AD203B41FA5}">
+                      <a16:colId xmlns:a16="http://schemas.microsoft.com/office/drawing/2014/main" val="1310188564"/>
+                    </a:ext>
+                  </a:extLst>
+                </a:gridCol>
+              </a:tblGrid>
+              <a:tr h="914512">
+                <a:tc>
+                  <a:txBody>
+                    <a:bodyPr/>
+                    <a:lstStyle/>
+                    <a:p>
+                      <a:r>
+                        <a:rPr lang="en-US" sz="1600" dirty="0"/>
+                        <a:t>RESULTS for $</a:t>
+                      </a:r>
+                      <a:endParaRPr lang="en-US" sz="1600" dirty="0">
+                        <a:solidFill>
+                          <a:schemeClr val="tx1"/>
+                        </a:solidFill>
+                      </a:endParaRPr>
+                    </a:p>
+                  </a:txBody>
+                  <a:tcPr/>
+                </a:tc>
+                <a:tc>
+                  <a:txBody>
+                    <a:bodyPr/>
+                    <a:lstStyle/>
+                    <a:p>
+                      <a:r>
+                        <a:rPr lang="en-US" sz="1200" dirty="0"/>
+                        <a:t>Base Model</a:t>
+                      </a:r>
+                    </a:p>
+                  </a:txBody>
+                  <a:tcPr>
+                    <a:solidFill>
+                      <a:schemeClr val="bg2"/>
+                    </a:solidFill>
+                  </a:tcPr>
+                </a:tc>
+                <a:tc>
+                  <a:txBody>
+                    <a:bodyPr/>
+                    <a:lstStyle/>
+                    <a:p>
+                      <a:r>
+                        <a:rPr lang="en-US" sz="1200" dirty="0"/>
+                        <a:t>After 1</a:t>
+                      </a:r>
+                      <a:r>
+                        <a:rPr lang="en-US" sz="1200" baseline="30000" dirty="0"/>
+                        <a:t>st</a:t>
+                      </a:r>
+                      <a:r>
+                        <a:rPr lang="en-US" sz="1200" dirty="0"/>
+                        <a:t> Tuning</a:t>
+                      </a:r>
+                    </a:p>
+                    <a:p>
+                      <a:r>
+                        <a:rPr lang="en-US" sz="1200" dirty="0"/>
+                        <a:t>(</a:t>
+                      </a:r>
+                      <a:r>
+                        <a:rPr lang="en-US" sz="1200" dirty="0" err="1"/>
+                        <a:t>n_estimators</a:t>
+                      </a:r>
+                      <a:r>
+                        <a:rPr lang="en-US" sz="1200" dirty="0"/>
+                        <a:t>)</a:t>
+                      </a:r>
+                    </a:p>
+                  </a:txBody>
+                  <a:tcPr>
+                    <a:solidFill>
+                      <a:schemeClr val="bg2"/>
+                    </a:solidFill>
+                  </a:tcPr>
+                </a:tc>
+                <a:tc>
+                  <a:txBody>
+                    <a:bodyPr/>
+                    <a:lstStyle/>
+                    <a:p>
+                      <a:r>
+                        <a:rPr lang="en-US" sz="1200" dirty="0"/>
+                        <a:t>After 2</a:t>
+                      </a:r>
+                      <a:r>
+                        <a:rPr lang="en-US" sz="1200" baseline="30000" dirty="0"/>
+                        <a:t>nd</a:t>
+                      </a:r>
+                      <a:r>
+                        <a:rPr lang="en-US" sz="1200" dirty="0"/>
+                        <a:t> Tuning</a:t>
+                      </a:r>
+                    </a:p>
+                    <a:p>
+                      <a:r>
+                        <a:rPr lang="en-US" sz="1200" dirty="0"/>
+                        <a:t>(</a:t>
+                      </a:r>
+                      <a:r>
+                        <a:rPr lang="en-US" sz="1200" dirty="0" err="1"/>
+                        <a:t>learning_rate</a:t>
+                      </a:r>
+                      <a:r>
+                        <a:rPr lang="en-US" sz="1200" dirty="0"/>
+                        <a:t> &amp; alpha)</a:t>
+                      </a:r>
+                    </a:p>
+                  </a:txBody>
+                  <a:tcPr>
+                    <a:solidFill>
+                      <a:schemeClr val="bg2"/>
+                    </a:solidFill>
+                  </a:tcPr>
+                </a:tc>
+                <a:tc>
+                  <a:txBody>
+                    <a:bodyPr/>
+                    <a:lstStyle/>
+                    <a:p>
+                      <a:r>
+                        <a:rPr lang="en-US" sz="1200" dirty="0"/>
+                        <a:t>Final Tuning (</a:t>
+                      </a:r>
+                      <a:r>
+                        <a:rPr lang="en-US" sz="1200" dirty="0" err="1"/>
+                        <a:t>max_depth</a:t>
+                      </a:r>
+                      <a:r>
+                        <a:rPr lang="en-US" sz="1200" dirty="0"/>
+                        <a:t> &amp; </a:t>
+                      </a:r>
+                      <a:r>
+                        <a:rPr lang="en-US" sz="1200" dirty="0" err="1"/>
+                        <a:t>min_child_weight</a:t>
+                      </a:r>
+                      <a:r>
+                        <a:rPr lang="en-US" sz="1200" dirty="0"/>
+                        <a:t>)</a:t>
+                      </a:r>
+                    </a:p>
+                  </a:txBody>
+                  <a:tcPr>
+                    <a:solidFill>
+                      <a:schemeClr val="bg2"/>
+                    </a:solidFill>
+                  </a:tcPr>
+                </a:tc>
+                <a:extLst>
+                  <a:ext uri="{0D108BD9-81ED-4DB2-BD59-A6C34878D82A}">
+                    <a16:rowId xmlns:a16="http://schemas.microsoft.com/office/drawing/2014/main" val="1637909296"/>
+                  </a:ext>
+                </a:extLst>
+              </a:tr>
+              <a:tr h="304837">
+                <a:tc>
+                  <a:txBody>
+                    <a:bodyPr/>
+                    <a:lstStyle/>
+                    <a:p>
+                      <a:r>
+                        <a:rPr lang="en-US" sz="1200" dirty="0"/>
+                        <a:t>Test RMSE</a:t>
+                      </a:r>
+                    </a:p>
+                  </a:txBody>
+                  <a:tcPr/>
+                </a:tc>
+                <a:tc>
+                  <a:txBody>
+                    <a:bodyPr/>
+                    <a:lstStyle/>
+                    <a:p>
+                      <a:r>
+                        <a:rPr lang="en-US" sz="1200" dirty="0"/>
+                        <a:t>578.14</a:t>
+                      </a:r>
+                    </a:p>
+                  </a:txBody>
+                  <a:tcPr/>
+                </a:tc>
+                <a:tc>
+                  <a:txBody>
+                    <a:bodyPr/>
+                    <a:lstStyle/>
+                    <a:p>
+                      <a:r>
+                        <a:rPr lang="en-US" sz="1200" dirty="0"/>
+                        <a:t>478.54</a:t>
+                      </a:r>
+                    </a:p>
+                  </a:txBody>
+                  <a:tcPr/>
+                </a:tc>
+                <a:tc>
+                  <a:txBody>
+                    <a:bodyPr/>
+                    <a:lstStyle/>
+                    <a:p>
+                      <a:r>
+                        <a:rPr lang="en-US" sz="1200" dirty="0"/>
+                        <a:t>464.93</a:t>
+                      </a:r>
+                    </a:p>
+                  </a:txBody>
+                  <a:tcPr/>
+                </a:tc>
+                <a:tc>
+                  <a:txBody>
+                    <a:bodyPr/>
+                    <a:lstStyle/>
+                    <a:p>
+                      <a:r>
+                        <a:rPr lang="en-US" sz="1200" dirty="0"/>
+                        <a:t>459.51</a:t>
+                      </a:r>
+                    </a:p>
+                  </a:txBody>
+                  <a:tcPr/>
+                </a:tc>
+                <a:extLst>
+                  <a:ext uri="{0D108BD9-81ED-4DB2-BD59-A6C34878D82A}">
+                    <a16:rowId xmlns:a16="http://schemas.microsoft.com/office/drawing/2014/main" val="3035129995"/>
+                  </a:ext>
+                </a:extLst>
+              </a:tr>
+              <a:tr h="304837">
+                <a:tc>
+                  <a:txBody>
+                    <a:bodyPr/>
+                    <a:lstStyle/>
+                    <a:p>
+                      <a:r>
+                        <a:rPr lang="en-US" sz="1200" dirty="0"/>
+                        <a:t>Test r</a:t>
+                      </a:r>
+                      <a:r>
+                        <a:rPr lang="en-US" sz="1200" baseline="30000" dirty="0"/>
+                        <a:t>2</a:t>
+                      </a:r>
+                    </a:p>
+                  </a:txBody>
+                  <a:tcPr/>
+                </a:tc>
+                <a:tc>
+                  <a:txBody>
+                    <a:bodyPr/>
+                    <a:lstStyle/>
+                    <a:p>
+                      <a:r>
+                        <a:rPr lang="en-US" sz="1200" dirty="0"/>
+                        <a:t>74.3%</a:t>
+                      </a:r>
+                    </a:p>
+                  </a:txBody>
+                  <a:tcPr/>
+                </a:tc>
+                <a:tc>
+                  <a:txBody>
+                    <a:bodyPr/>
+                    <a:lstStyle/>
+                    <a:p>
+                      <a:r>
+                        <a:rPr lang="en-US" sz="1200" dirty="0"/>
+                        <a:t>82.39%</a:t>
+                      </a:r>
+                    </a:p>
+                  </a:txBody>
+                  <a:tcPr/>
+                </a:tc>
+                <a:tc>
+                  <a:txBody>
+                    <a:bodyPr/>
+                    <a:lstStyle/>
+                    <a:p>
+                      <a:r>
+                        <a:rPr lang="en-US" sz="1200" dirty="0"/>
+                        <a:t>83.38%</a:t>
+                      </a:r>
+                    </a:p>
+                  </a:txBody>
+                  <a:tcPr/>
+                </a:tc>
+                <a:tc>
+                  <a:txBody>
+                    <a:bodyPr/>
+                    <a:lstStyle/>
+                    <a:p>
+                      <a:r>
+                        <a:rPr lang="en-US" sz="1200" dirty="0"/>
+                        <a:t>83.77%</a:t>
+                      </a:r>
+                    </a:p>
+                  </a:txBody>
+                  <a:tcPr/>
+                </a:tc>
+                <a:extLst>
+                  <a:ext uri="{0D108BD9-81ED-4DB2-BD59-A6C34878D82A}">
+                    <a16:rowId xmlns:a16="http://schemas.microsoft.com/office/drawing/2014/main" val="3998100381"/>
+                  </a:ext>
+                </a:extLst>
+              </a:tr>
+            </a:tbl>
+          </a:graphicData>
+        </a:graphic>
+      </p:graphicFrame>
+      <p:sp>
+        <p:nvSpPr>
+          <p:cNvPr id="40" name="Arrow: Right 39">
+            <a:extLst>
+              <a:ext uri="{FF2B5EF4-FFF2-40B4-BE49-F238E27FC236}">
+                <a16:creationId xmlns:a16="http://schemas.microsoft.com/office/drawing/2014/main" id="{DE470760-77B6-4DA0-BFE4-61CBDABB9866}"/>
+              </a:ext>
+            </a:extLst>
+          </p:cNvPr>
+          <p:cNvSpPr/>
+          <p:nvPr/>
+        </p:nvSpPr>
+        <p:spPr>
+          <a:xfrm>
+            <a:off x="3333868" y="1093302"/>
+            <a:ext cx="291135" cy="168965"/>
+          </a:xfrm>
+          <a:prstGeom prst="rightArrow">
+            <a:avLst/>
+          </a:prstGeom>
+        </p:spPr>
+        <p:style>
+          <a:lnRef idx="2">
+            <a:schemeClr val="accent1">
+              <a:shade val="50000"/>
+            </a:schemeClr>
+          </a:lnRef>
+          <a:fillRef idx="1">
+            <a:schemeClr val="accent1"/>
+          </a:fillRef>
+          <a:effectRef idx="0">
+            <a:schemeClr val="accent1"/>
+          </a:effectRef>
+          <a:fontRef idx="minor">
+            <a:schemeClr val="lt1"/>
+          </a:fontRef>
+        </p:style>
+        <p:txBody>
+          <a:bodyPr rtlCol="0" anchor="ctr"/>
+          <a:lstStyle/>
+          <a:p>
+            <a:pPr algn="ctr"/>
+            <a:endParaRPr lang="en-US"/>
+          </a:p>
+        </p:txBody>
+      </p:sp>
+      <p:sp>
+        <p:nvSpPr>
+          <p:cNvPr id="41" name="Arrow: Right 40">
+            <a:extLst>
+              <a:ext uri="{FF2B5EF4-FFF2-40B4-BE49-F238E27FC236}">
+                <a16:creationId xmlns:a16="http://schemas.microsoft.com/office/drawing/2014/main" id="{D9F80517-458A-487B-98D3-5A87E9DE1DE3}"/>
+              </a:ext>
+            </a:extLst>
+          </p:cNvPr>
+          <p:cNvSpPr/>
+          <p:nvPr/>
+        </p:nvSpPr>
+        <p:spPr>
+          <a:xfrm>
+            <a:off x="6275063" y="1093302"/>
+            <a:ext cx="291135" cy="168965"/>
+          </a:xfrm>
+          <a:prstGeom prst="rightArrow">
+            <a:avLst/>
+          </a:prstGeom>
+        </p:spPr>
+        <p:style>
+          <a:lnRef idx="2">
+            <a:schemeClr val="accent1">
+              <a:shade val="50000"/>
+            </a:schemeClr>
+          </a:lnRef>
+          <a:fillRef idx="1">
+            <a:schemeClr val="accent1"/>
+          </a:fillRef>
+          <a:effectRef idx="0">
+            <a:schemeClr val="accent1"/>
+          </a:effectRef>
+          <a:fontRef idx="minor">
+            <a:schemeClr val="lt1"/>
+          </a:fontRef>
+        </p:style>
+        <p:txBody>
+          <a:bodyPr rtlCol="0" anchor="ctr"/>
+          <a:lstStyle/>
+          <a:p>
+            <a:pPr algn="ctr"/>
+            <a:endParaRPr lang="en-US"/>
+          </a:p>
+        </p:txBody>
+      </p:sp>
+      <p:sp>
+        <p:nvSpPr>
+          <p:cNvPr id="2" name="Rectangle 1">
+            <a:extLst>
+              <a:ext uri="{FF2B5EF4-FFF2-40B4-BE49-F238E27FC236}">
+                <a16:creationId xmlns:a16="http://schemas.microsoft.com/office/drawing/2014/main" id="{D02B9AD4-09F1-4D5D-B275-4B9C7E94CB8E}"/>
+              </a:ext>
+            </a:extLst>
+          </p:cNvPr>
+          <p:cNvSpPr/>
+          <p:nvPr/>
+        </p:nvSpPr>
+        <p:spPr>
+          <a:xfrm>
+            <a:off x="930773" y="1910639"/>
+            <a:ext cx="4764446" cy="369332"/>
+          </a:xfrm>
+          <a:prstGeom prst="rect">
+            <a:avLst/>
+          </a:prstGeom>
+        </p:spPr>
+        <p:txBody>
+          <a:bodyPr wrap="none">
+            <a:spAutoFit/>
+          </a:bodyPr>
+          <a:lstStyle/>
+          <a:p>
+            <a:r>
+              <a:rPr lang="en-US" dirty="0"/>
+              <a:t>Split data into attributes and </a:t>
+            </a:r>
+            <a:r>
+              <a:rPr lang="en-US" dirty="0" err="1"/>
+              <a:t>and</a:t>
+            </a:r>
+            <a:r>
+              <a:rPr lang="en-US" dirty="0"/>
+              <a:t> label sets </a:t>
+            </a:r>
+          </a:p>
+        </p:txBody>
+      </p:sp>
+      <p:sp>
+        <p:nvSpPr>
+          <p:cNvPr id="3" name="Rectangle 2">
+            <a:extLst>
+              <a:ext uri="{FF2B5EF4-FFF2-40B4-BE49-F238E27FC236}">
+                <a16:creationId xmlns:a16="http://schemas.microsoft.com/office/drawing/2014/main" id="{9CA93407-BDC4-4C02-8C2F-FB4B4B6D2E2D}"/>
+              </a:ext>
+            </a:extLst>
+          </p:cNvPr>
+          <p:cNvSpPr/>
+          <p:nvPr/>
+        </p:nvSpPr>
+        <p:spPr>
+          <a:xfrm>
+            <a:off x="1129467" y="2743677"/>
+            <a:ext cx="2762551" cy="369332"/>
+          </a:xfrm>
+          <a:prstGeom prst="rect">
+            <a:avLst/>
+          </a:prstGeom>
+        </p:spPr>
+        <p:txBody>
+          <a:bodyPr wrap="none">
+            <a:spAutoFit/>
+          </a:bodyPr>
+          <a:lstStyle/>
+          <a:p>
+            <a:r>
+              <a:rPr lang="en-US" dirty="0"/>
+              <a:t>Training and testing data</a:t>
+            </a:r>
+          </a:p>
+        </p:txBody>
+      </p:sp>
+    </p:spTree>
+    <p:extLst>
+      <p:ext uri="{BB962C8B-B14F-4D97-AF65-F5344CB8AC3E}">
+        <p14:creationId xmlns:p14="http://schemas.microsoft.com/office/powerpoint/2010/main" val="590067435"/>
+      </p:ext>
+    </p:extLst>
+  </p:cSld>
+  <p:clrMapOvr>
+    <a:masterClrMapping/>
+  </p:clrMapOvr>
+</p:sld>
+</file>
+
+<file path=ppt/slides/slide8.xml><?xml version="1.0" encoding="utf-8"?>
 <p:sld xmlns:a="http://schemas.openxmlformats.org/drawingml/2006/main" xmlns:r="http://schemas.openxmlformats.org/officeDocument/2006/relationships" xmlns:p="http://schemas.openxmlformats.org/presentationml/2006/main">
   <p:cSld>
     <p:spTree>
@@ -8257,1040 +11444,7 @@
 </p:sld>
 </file>
 
-<file path=ppt/slides/slide6.xml><?xml version="1.0" encoding="utf-8"?>
-<p:sld xmlns:a="http://schemas.openxmlformats.org/drawingml/2006/main" xmlns:r="http://schemas.openxmlformats.org/officeDocument/2006/relationships" xmlns:p="http://schemas.openxmlformats.org/presentationml/2006/main">
-  <p:cSld>
-    <p:spTree>
-      <p:nvGrpSpPr>
-        <p:cNvPr id="1" name=""/>
-        <p:cNvGrpSpPr/>
-        <p:nvPr/>
-      </p:nvGrpSpPr>
-      <p:grpSpPr>
-        <a:xfrm>
-          <a:off x="0" y="0"/>
-          <a:ext cx="0" cy="0"/>
-          <a:chOff x="0" y="0"/>
-          <a:chExt cx="0" cy="0"/>
-        </a:xfrm>
-      </p:grpSpPr>
-      <p:sp>
-        <p:nvSpPr>
-          <p:cNvPr id="5" name="TextBox 4">
-            <a:extLst>
-              <a:ext uri="{FF2B5EF4-FFF2-40B4-BE49-F238E27FC236}">
-                <a16:creationId xmlns:a16="http://schemas.microsoft.com/office/drawing/2014/main" id="{E618A879-07CD-4346-87B2-78C6583069E6}"/>
-              </a:ext>
-            </a:extLst>
-          </p:cNvPr>
-          <p:cNvSpPr txBox="1"/>
-          <p:nvPr/>
-        </p:nvSpPr>
-        <p:spPr>
-          <a:xfrm>
-            <a:off x="228601" y="188844"/>
-            <a:ext cx="10396329" cy="338554"/>
-          </a:xfrm>
-          <a:prstGeom prst="rect">
-            <a:avLst/>
-          </a:prstGeom>
-          <a:noFill/>
-        </p:spPr>
-        <p:txBody>
-          <a:bodyPr wrap="square" rtlCol="0">
-            <a:spAutoFit/>
-          </a:bodyPr>
-          <a:lstStyle/>
-          <a:p>
-            <a:r>
-              <a:rPr lang="en-US" sz="1600" dirty="0"/>
-              <a:t>Linear Regression Models : </a:t>
-            </a:r>
-          </a:p>
-        </p:txBody>
-      </p:sp>
-      <p:sp>
-        <p:nvSpPr>
-          <p:cNvPr id="27" name="Freeform: Shape 26">
-            <a:extLst>
-              <a:ext uri="{FF2B5EF4-FFF2-40B4-BE49-F238E27FC236}">
-                <a16:creationId xmlns:a16="http://schemas.microsoft.com/office/drawing/2014/main" id="{08A6CB71-224C-4627-9A69-EB399C26D260}"/>
-              </a:ext>
-            </a:extLst>
-          </p:cNvPr>
-          <p:cNvSpPr/>
-          <p:nvPr/>
-        </p:nvSpPr>
-        <p:spPr>
-          <a:xfrm>
-            <a:off x="727970" y="723461"/>
-            <a:ext cx="2671213" cy="930102"/>
-          </a:xfrm>
-          <a:custGeom>
-            <a:avLst/>
-            <a:gdLst>
-              <a:gd name="connsiteX0" fmla="*/ 0 w 2357070"/>
-              <a:gd name="connsiteY0" fmla="*/ 275034 h 1649872"/>
-              <a:gd name="connsiteX1" fmla="*/ 275034 w 2357070"/>
-              <a:gd name="connsiteY1" fmla="*/ 0 h 1649872"/>
-              <a:gd name="connsiteX2" fmla="*/ 2082036 w 2357070"/>
-              <a:gd name="connsiteY2" fmla="*/ 0 h 1649872"/>
-              <a:gd name="connsiteX3" fmla="*/ 2357070 w 2357070"/>
-              <a:gd name="connsiteY3" fmla="*/ 275034 h 1649872"/>
-              <a:gd name="connsiteX4" fmla="*/ 2357070 w 2357070"/>
-              <a:gd name="connsiteY4" fmla="*/ 1374838 h 1649872"/>
-              <a:gd name="connsiteX5" fmla="*/ 2082036 w 2357070"/>
-              <a:gd name="connsiteY5" fmla="*/ 1649872 h 1649872"/>
-              <a:gd name="connsiteX6" fmla="*/ 275034 w 2357070"/>
-              <a:gd name="connsiteY6" fmla="*/ 1649872 h 1649872"/>
-              <a:gd name="connsiteX7" fmla="*/ 0 w 2357070"/>
-              <a:gd name="connsiteY7" fmla="*/ 1374838 h 1649872"/>
-              <a:gd name="connsiteX8" fmla="*/ 0 w 2357070"/>
-              <a:gd name="connsiteY8" fmla="*/ 275034 h 1649872"/>
-            </a:gdLst>
-            <a:ahLst/>
-            <a:cxnLst>
-              <a:cxn ang="0">
-                <a:pos x="connsiteX0" y="connsiteY0"/>
-              </a:cxn>
-              <a:cxn ang="0">
-                <a:pos x="connsiteX1" y="connsiteY1"/>
-              </a:cxn>
-              <a:cxn ang="0">
-                <a:pos x="connsiteX2" y="connsiteY2"/>
-              </a:cxn>
-              <a:cxn ang="0">
-                <a:pos x="connsiteX3" y="connsiteY3"/>
-              </a:cxn>
-              <a:cxn ang="0">
-                <a:pos x="connsiteX4" y="connsiteY4"/>
-              </a:cxn>
-              <a:cxn ang="0">
-                <a:pos x="connsiteX5" y="connsiteY5"/>
-              </a:cxn>
-              <a:cxn ang="0">
-                <a:pos x="connsiteX6" y="connsiteY6"/>
-              </a:cxn>
-              <a:cxn ang="0">
-                <a:pos x="connsiteX7" y="connsiteY7"/>
-              </a:cxn>
-              <a:cxn ang="0">
-                <a:pos x="connsiteX8" y="connsiteY8"/>
-              </a:cxn>
-            </a:cxnLst>
-            <a:rect l="l" t="t" r="r" b="b"/>
-            <a:pathLst>
-              <a:path w="2357070" h="1649872">
-                <a:moveTo>
-                  <a:pt x="0" y="275034"/>
-                </a:moveTo>
-                <a:cubicBezTo>
-                  <a:pt x="0" y="123137"/>
-                  <a:pt x="123137" y="0"/>
-                  <a:pt x="275034" y="0"/>
-                </a:cubicBezTo>
-                <a:lnTo>
-                  <a:pt x="2082036" y="0"/>
-                </a:lnTo>
-                <a:cubicBezTo>
-                  <a:pt x="2233933" y="0"/>
-                  <a:pt x="2357070" y="123137"/>
-                  <a:pt x="2357070" y="275034"/>
-                </a:cubicBezTo>
-                <a:lnTo>
-                  <a:pt x="2357070" y="1374838"/>
-                </a:lnTo>
-                <a:cubicBezTo>
-                  <a:pt x="2357070" y="1526735"/>
-                  <a:pt x="2233933" y="1649872"/>
-                  <a:pt x="2082036" y="1649872"/>
-                </a:cubicBezTo>
-                <a:lnTo>
-                  <a:pt x="275034" y="1649872"/>
-                </a:lnTo>
-                <a:cubicBezTo>
-                  <a:pt x="123137" y="1649872"/>
-                  <a:pt x="0" y="1526735"/>
-                  <a:pt x="0" y="1374838"/>
-                </a:cubicBezTo>
-                <a:lnTo>
-                  <a:pt x="0" y="275034"/>
-                </a:lnTo>
-                <a:close/>
-              </a:path>
-            </a:pathLst>
-          </a:custGeom>
-          <a:noFill/>
-          <a:ln>
-            <a:solidFill>
-              <a:schemeClr val="accent1"/>
-            </a:solidFill>
-          </a:ln>
-        </p:spPr>
-        <p:style>
-          <a:lnRef idx="2">
-            <a:schemeClr val="lt1">
-              <a:hueOff val="0"/>
-              <a:satOff val="0"/>
-              <a:lumOff val="0"/>
-              <a:alphaOff val="0"/>
-            </a:schemeClr>
-          </a:lnRef>
-          <a:fillRef idx="1">
-            <a:schemeClr val="accent1">
-              <a:hueOff val="0"/>
-              <a:satOff val="0"/>
-              <a:lumOff val="0"/>
-              <a:alphaOff val="0"/>
-            </a:schemeClr>
-          </a:fillRef>
-          <a:effectRef idx="0">
-            <a:schemeClr val="accent1">
-              <a:hueOff val="0"/>
-              <a:satOff val="0"/>
-              <a:lumOff val="0"/>
-              <a:alphaOff val="0"/>
-            </a:schemeClr>
-          </a:effectRef>
-          <a:fontRef idx="minor">
-            <a:schemeClr val="lt1"/>
-          </a:fontRef>
-        </p:style>
-        <p:txBody>
-          <a:bodyPr spcFirstLastPara="0" vert="horz" wrap="square" lIns="133895" tIns="133895" rIns="133895" bIns="133895" numCol="1" spcCol="1270" anchor="ctr" anchorCtr="0">
-            <a:noAutofit/>
-          </a:bodyPr>
-          <a:lstStyle/>
-          <a:p>
-            <a:pPr marL="0" lvl="0" indent="0" algn="l" defTabSz="622300">
-              <a:lnSpc>
-                <a:spcPct val="90000"/>
-              </a:lnSpc>
-              <a:spcBef>
-                <a:spcPct val="0"/>
-              </a:spcBef>
-              <a:spcAft>
-                <a:spcPct val="35000"/>
-              </a:spcAft>
-              <a:buNone/>
-            </a:pPr>
-            <a:r>
-              <a:rPr lang="en-US" sz="1200" b="1" kern="1200" dirty="0">
-                <a:solidFill>
-                  <a:schemeClr val="tx1"/>
-                </a:solidFill>
-              </a:rPr>
-              <a:t>Step 1</a:t>
-            </a:r>
-            <a:r>
-              <a:rPr lang="en-US" sz="1200" kern="1200" dirty="0">
-                <a:solidFill>
-                  <a:schemeClr val="tx1"/>
-                </a:solidFill>
-              </a:rPr>
-              <a:t> – Creating base Model for Linear Regression </a:t>
-            </a:r>
-          </a:p>
-          <a:p>
-            <a:pPr marL="0" lvl="0" indent="0" algn="l" defTabSz="622300">
-              <a:lnSpc>
-                <a:spcPct val="90000"/>
-              </a:lnSpc>
-              <a:spcBef>
-                <a:spcPct val="0"/>
-              </a:spcBef>
-              <a:spcAft>
-                <a:spcPct val="35000"/>
-              </a:spcAft>
-              <a:buNone/>
-            </a:pPr>
-            <a:r>
-              <a:rPr lang="en-US" sz="1200" dirty="0">
-                <a:solidFill>
-                  <a:schemeClr val="tx1"/>
-                </a:solidFill>
-              </a:rPr>
-              <a:t>(Linear, Lasso , ElasticNet)</a:t>
-            </a:r>
-            <a:endParaRPr lang="en-US" sz="1200" kern="1200" dirty="0">
-              <a:solidFill>
-                <a:schemeClr val="tx1"/>
-              </a:solidFill>
-            </a:endParaRPr>
-          </a:p>
-        </p:txBody>
-      </p:sp>
-      <p:sp>
-        <p:nvSpPr>
-          <p:cNvPr id="29" name="Freeform: Shape 28">
-            <a:extLst>
-              <a:ext uri="{FF2B5EF4-FFF2-40B4-BE49-F238E27FC236}">
-                <a16:creationId xmlns:a16="http://schemas.microsoft.com/office/drawing/2014/main" id="{CC082855-0F08-43EA-B263-25A0DB88F36C}"/>
-              </a:ext>
-            </a:extLst>
-          </p:cNvPr>
-          <p:cNvSpPr/>
-          <p:nvPr/>
-        </p:nvSpPr>
-        <p:spPr>
-          <a:xfrm>
-            <a:off x="3690318" y="665826"/>
-            <a:ext cx="2473983" cy="987758"/>
-          </a:xfrm>
-          <a:custGeom>
-            <a:avLst/>
-            <a:gdLst>
-              <a:gd name="connsiteX0" fmla="*/ 0 w 2357070"/>
-              <a:gd name="connsiteY0" fmla="*/ 275034 h 1649872"/>
-              <a:gd name="connsiteX1" fmla="*/ 275034 w 2357070"/>
-              <a:gd name="connsiteY1" fmla="*/ 0 h 1649872"/>
-              <a:gd name="connsiteX2" fmla="*/ 2082036 w 2357070"/>
-              <a:gd name="connsiteY2" fmla="*/ 0 h 1649872"/>
-              <a:gd name="connsiteX3" fmla="*/ 2357070 w 2357070"/>
-              <a:gd name="connsiteY3" fmla="*/ 275034 h 1649872"/>
-              <a:gd name="connsiteX4" fmla="*/ 2357070 w 2357070"/>
-              <a:gd name="connsiteY4" fmla="*/ 1374838 h 1649872"/>
-              <a:gd name="connsiteX5" fmla="*/ 2082036 w 2357070"/>
-              <a:gd name="connsiteY5" fmla="*/ 1649872 h 1649872"/>
-              <a:gd name="connsiteX6" fmla="*/ 275034 w 2357070"/>
-              <a:gd name="connsiteY6" fmla="*/ 1649872 h 1649872"/>
-              <a:gd name="connsiteX7" fmla="*/ 0 w 2357070"/>
-              <a:gd name="connsiteY7" fmla="*/ 1374838 h 1649872"/>
-              <a:gd name="connsiteX8" fmla="*/ 0 w 2357070"/>
-              <a:gd name="connsiteY8" fmla="*/ 275034 h 1649872"/>
-            </a:gdLst>
-            <a:ahLst/>
-            <a:cxnLst>
-              <a:cxn ang="0">
-                <a:pos x="connsiteX0" y="connsiteY0"/>
-              </a:cxn>
-              <a:cxn ang="0">
-                <a:pos x="connsiteX1" y="connsiteY1"/>
-              </a:cxn>
-              <a:cxn ang="0">
-                <a:pos x="connsiteX2" y="connsiteY2"/>
-              </a:cxn>
-              <a:cxn ang="0">
-                <a:pos x="connsiteX3" y="connsiteY3"/>
-              </a:cxn>
-              <a:cxn ang="0">
-                <a:pos x="connsiteX4" y="connsiteY4"/>
-              </a:cxn>
-              <a:cxn ang="0">
-                <a:pos x="connsiteX5" y="connsiteY5"/>
-              </a:cxn>
-              <a:cxn ang="0">
-                <a:pos x="connsiteX6" y="connsiteY6"/>
-              </a:cxn>
-              <a:cxn ang="0">
-                <a:pos x="connsiteX7" y="connsiteY7"/>
-              </a:cxn>
-              <a:cxn ang="0">
-                <a:pos x="connsiteX8" y="connsiteY8"/>
-              </a:cxn>
-            </a:cxnLst>
-            <a:rect l="l" t="t" r="r" b="b"/>
-            <a:pathLst>
-              <a:path w="2357070" h="1649872">
-                <a:moveTo>
-                  <a:pt x="0" y="275034"/>
-                </a:moveTo>
-                <a:cubicBezTo>
-                  <a:pt x="0" y="123137"/>
-                  <a:pt x="123137" y="0"/>
-                  <a:pt x="275034" y="0"/>
-                </a:cubicBezTo>
-                <a:lnTo>
-                  <a:pt x="2082036" y="0"/>
-                </a:lnTo>
-                <a:cubicBezTo>
-                  <a:pt x="2233933" y="0"/>
-                  <a:pt x="2357070" y="123137"/>
-                  <a:pt x="2357070" y="275034"/>
-                </a:cubicBezTo>
-                <a:lnTo>
-                  <a:pt x="2357070" y="1374838"/>
-                </a:lnTo>
-                <a:cubicBezTo>
-                  <a:pt x="2357070" y="1526735"/>
-                  <a:pt x="2233933" y="1649872"/>
-                  <a:pt x="2082036" y="1649872"/>
-                </a:cubicBezTo>
-                <a:lnTo>
-                  <a:pt x="275034" y="1649872"/>
-                </a:lnTo>
-                <a:cubicBezTo>
-                  <a:pt x="123137" y="1649872"/>
-                  <a:pt x="0" y="1526735"/>
-                  <a:pt x="0" y="1374838"/>
-                </a:cubicBezTo>
-                <a:lnTo>
-                  <a:pt x="0" y="275034"/>
-                </a:lnTo>
-                <a:close/>
-              </a:path>
-            </a:pathLst>
-          </a:custGeom>
-          <a:noFill/>
-          <a:ln>
-            <a:solidFill>
-              <a:schemeClr val="accent1"/>
-            </a:solidFill>
-          </a:ln>
-        </p:spPr>
-        <p:style>
-          <a:lnRef idx="2">
-            <a:schemeClr val="lt1">
-              <a:hueOff val="0"/>
-              <a:satOff val="0"/>
-              <a:lumOff val="0"/>
-              <a:alphaOff val="0"/>
-            </a:schemeClr>
-          </a:lnRef>
-          <a:fillRef idx="1">
-            <a:schemeClr val="accent1">
-              <a:hueOff val="0"/>
-              <a:satOff val="0"/>
-              <a:lumOff val="0"/>
-              <a:alphaOff val="0"/>
-            </a:schemeClr>
-          </a:fillRef>
-          <a:effectRef idx="0">
-            <a:schemeClr val="accent1">
-              <a:hueOff val="0"/>
-              <a:satOff val="0"/>
-              <a:lumOff val="0"/>
-              <a:alphaOff val="0"/>
-            </a:schemeClr>
-          </a:effectRef>
-          <a:fontRef idx="minor">
-            <a:schemeClr val="lt1"/>
-          </a:fontRef>
-        </p:style>
-        <p:txBody>
-          <a:bodyPr spcFirstLastPara="0" vert="horz" wrap="square" lIns="133895" tIns="133895" rIns="133895" bIns="133895" numCol="1" spcCol="1270" anchor="ctr" anchorCtr="0">
-            <a:noAutofit/>
-          </a:bodyPr>
-          <a:lstStyle/>
-          <a:p>
-            <a:pPr defTabSz="622300">
-              <a:lnSpc>
-                <a:spcPct val="90000"/>
-              </a:lnSpc>
-              <a:spcBef>
-                <a:spcPct val="0"/>
-              </a:spcBef>
-              <a:spcAft>
-                <a:spcPct val="35000"/>
-              </a:spcAft>
-            </a:pPr>
-            <a:r>
-              <a:rPr lang="en-US" sz="1200" b="1" dirty="0">
-                <a:solidFill>
-                  <a:schemeClr val="tx1"/>
-                </a:solidFill>
-              </a:rPr>
-              <a:t>Step2</a:t>
-            </a:r>
-            <a:r>
-              <a:rPr lang="en-US" sz="1200" dirty="0">
-                <a:solidFill>
-                  <a:schemeClr val="tx1"/>
-                </a:solidFill>
-              </a:rPr>
-              <a:t> – Fine Tune model using LassoCV ( for Lasso Model) and determining the best alpha, and performing GridsearchCV for ElasticNet for range of alphas</a:t>
-            </a:r>
-          </a:p>
-        </p:txBody>
-      </p:sp>
-      <p:sp>
-        <p:nvSpPr>
-          <p:cNvPr id="31" name="Freeform: Shape 30">
-            <a:extLst>
-              <a:ext uri="{FF2B5EF4-FFF2-40B4-BE49-F238E27FC236}">
-                <a16:creationId xmlns:a16="http://schemas.microsoft.com/office/drawing/2014/main" id="{3F86357A-FC59-4E64-A550-D98A57AF9CF9}"/>
-              </a:ext>
-            </a:extLst>
-          </p:cNvPr>
-          <p:cNvSpPr/>
-          <p:nvPr/>
-        </p:nvSpPr>
-        <p:spPr>
-          <a:xfrm>
-            <a:off x="6535334" y="723460"/>
-            <a:ext cx="2582033" cy="930103"/>
-          </a:xfrm>
-          <a:custGeom>
-            <a:avLst/>
-            <a:gdLst>
-              <a:gd name="connsiteX0" fmla="*/ 0 w 2357070"/>
-              <a:gd name="connsiteY0" fmla="*/ 275034 h 1649872"/>
-              <a:gd name="connsiteX1" fmla="*/ 275034 w 2357070"/>
-              <a:gd name="connsiteY1" fmla="*/ 0 h 1649872"/>
-              <a:gd name="connsiteX2" fmla="*/ 2082036 w 2357070"/>
-              <a:gd name="connsiteY2" fmla="*/ 0 h 1649872"/>
-              <a:gd name="connsiteX3" fmla="*/ 2357070 w 2357070"/>
-              <a:gd name="connsiteY3" fmla="*/ 275034 h 1649872"/>
-              <a:gd name="connsiteX4" fmla="*/ 2357070 w 2357070"/>
-              <a:gd name="connsiteY4" fmla="*/ 1374838 h 1649872"/>
-              <a:gd name="connsiteX5" fmla="*/ 2082036 w 2357070"/>
-              <a:gd name="connsiteY5" fmla="*/ 1649872 h 1649872"/>
-              <a:gd name="connsiteX6" fmla="*/ 275034 w 2357070"/>
-              <a:gd name="connsiteY6" fmla="*/ 1649872 h 1649872"/>
-              <a:gd name="connsiteX7" fmla="*/ 0 w 2357070"/>
-              <a:gd name="connsiteY7" fmla="*/ 1374838 h 1649872"/>
-              <a:gd name="connsiteX8" fmla="*/ 0 w 2357070"/>
-              <a:gd name="connsiteY8" fmla="*/ 275034 h 1649872"/>
-            </a:gdLst>
-            <a:ahLst/>
-            <a:cxnLst>
-              <a:cxn ang="0">
-                <a:pos x="connsiteX0" y="connsiteY0"/>
-              </a:cxn>
-              <a:cxn ang="0">
-                <a:pos x="connsiteX1" y="connsiteY1"/>
-              </a:cxn>
-              <a:cxn ang="0">
-                <a:pos x="connsiteX2" y="connsiteY2"/>
-              </a:cxn>
-              <a:cxn ang="0">
-                <a:pos x="connsiteX3" y="connsiteY3"/>
-              </a:cxn>
-              <a:cxn ang="0">
-                <a:pos x="connsiteX4" y="connsiteY4"/>
-              </a:cxn>
-              <a:cxn ang="0">
-                <a:pos x="connsiteX5" y="connsiteY5"/>
-              </a:cxn>
-              <a:cxn ang="0">
-                <a:pos x="connsiteX6" y="connsiteY6"/>
-              </a:cxn>
-              <a:cxn ang="0">
-                <a:pos x="connsiteX7" y="connsiteY7"/>
-              </a:cxn>
-              <a:cxn ang="0">
-                <a:pos x="connsiteX8" y="connsiteY8"/>
-              </a:cxn>
-            </a:cxnLst>
-            <a:rect l="l" t="t" r="r" b="b"/>
-            <a:pathLst>
-              <a:path w="2357070" h="1649872">
-                <a:moveTo>
-                  <a:pt x="0" y="275034"/>
-                </a:moveTo>
-                <a:cubicBezTo>
-                  <a:pt x="0" y="123137"/>
-                  <a:pt x="123137" y="0"/>
-                  <a:pt x="275034" y="0"/>
-                </a:cubicBezTo>
-                <a:lnTo>
-                  <a:pt x="2082036" y="0"/>
-                </a:lnTo>
-                <a:cubicBezTo>
-                  <a:pt x="2233933" y="0"/>
-                  <a:pt x="2357070" y="123137"/>
-                  <a:pt x="2357070" y="275034"/>
-                </a:cubicBezTo>
-                <a:lnTo>
-                  <a:pt x="2357070" y="1374838"/>
-                </a:lnTo>
-                <a:cubicBezTo>
-                  <a:pt x="2357070" y="1526735"/>
-                  <a:pt x="2233933" y="1649872"/>
-                  <a:pt x="2082036" y="1649872"/>
-                </a:cubicBezTo>
-                <a:lnTo>
-                  <a:pt x="275034" y="1649872"/>
-                </a:lnTo>
-                <a:cubicBezTo>
-                  <a:pt x="123137" y="1649872"/>
-                  <a:pt x="0" y="1526735"/>
-                  <a:pt x="0" y="1374838"/>
-                </a:cubicBezTo>
-                <a:lnTo>
-                  <a:pt x="0" y="275034"/>
-                </a:lnTo>
-                <a:close/>
-              </a:path>
-            </a:pathLst>
-          </a:custGeom>
-          <a:noFill/>
-          <a:ln>
-            <a:solidFill>
-              <a:schemeClr val="accent1"/>
-            </a:solidFill>
-          </a:ln>
-        </p:spPr>
-        <p:style>
-          <a:lnRef idx="2">
-            <a:schemeClr val="lt1">
-              <a:hueOff val="0"/>
-              <a:satOff val="0"/>
-              <a:lumOff val="0"/>
-              <a:alphaOff val="0"/>
-            </a:schemeClr>
-          </a:lnRef>
-          <a:fillRef idx="1">
-            <a:schemeClr val="accent1">
-              <a:hueOff val="0"/>
-              <a:satOff val="0"/>
-              <a:lumOff val="0"/>
-              <a:alphaOff val="0"/>
-            </a:schemeClr>
-          </a:fillRef>
-          <a:effectRef idx="0">
-            <a:schemeClr val="accent1">
-              <a:hueOff val="0"/>
-              <a:satOff val="0"/>
-              <a:lumOff val="0"/>
-              <a:alphaOff val="0"/>
-            </a:schemeClr>
-          </a:effectRef>
-          <a:fontRef idx="minor">
-            <a:schemeClr val="lt1"/>
-          </a:fontRef>
-        </p:style>
-        <p:txBody>
-          <a:bodyPr spcFirstLastPara="0" vert="horz" wrap="square" lIns="133895" tIns="133895" rIns="133895" bIns="133895" numCol="1" spcCol="1270" anchor="ctr" anchorCtr="0">
-            <a:noAutofit/>
-          </a:bodyPr>
-          <a:lstStyle/>
-          <a:p>
-            <a:pPr marL="0" lvl="0" indent="0" algn="l" defTabSz="622300">
-              <a:lnSpc>
-                <a:spcPct val="90000"/>
-              </a:lnSpc>
-              <a:spcBef>
-                <a:spcPct val="0"/>
-              </a:spcBef>
-              <a:spcAft>
-                <a:spcPct val="35000"/>
-              </a:spcAft>
-              <a:buNone/>
-            </a:pPr>
-            <a:r>
-              <a:rPr lang="en-US" sz="1200" b="1" kern="1200" dirty="0">
-                <a:solidFill>
-                  <a:schemeClr val="tx1"/>
-                </a:solidFill>
-              </a:rPr>
-              <a:t>Step3</a:t>
-            </a:r>
-            <a:r>
-              <a:rPr lang="en-US" sz="1200" kern="1200" dirty="0">
-                <a:solidFill>
-                  <a:schemeClr val="tx1"/>
-                </a:solidFill>
-              </a:rPr>
-              <a:t> – Compare different models for accuracy</a:t>
-            </a:r>
-          </a:p>
-        </p:txBody>
-      </p:sp>
-      <p:graphicFrame>
-        <p:nvGraphicFramePr>
-          <p:cNvPr id="37" name="Table 36">
-            <a:extLst>
-              <a:ext uri="{FF2B5EF4-FFF2-40B4-BE49-F238E27FC236}">
-                <a16:creationId xmlns:a16="http://schemas.microsoft.com/office/drawing/2014/main" id="{A8BDD122-C0F0-4FDB-8714-C90A322FF873}"/>
-              </a:ext>
-            </a:extLst>
-          </p:cNvPr>
-          <p:cNvGraphicFramePr>
-            <a:graphicFrameLocks noGrp="1"/>
-          </p:cNvGraphicFramePr>
-          <p:nvPr>
-            <p:extLst>
-              <p:ext uri="{D42A27DB-BD31-4B8C-83A1-F6EECF244321}">
-                <p14:modId xmlns:p14="http://schemas.microsoft.com/office/powerpoint/2010/main" val="3921586709"/>
-              </p:ext>
-            </p:extLst>
-          </p:nvPr>
-        </p:nvGraphicFramePr>
-        <p:xfrm>
-          <a:off x="2063575" y="2023403"/>
-          <a:ext cx="5873062" cy="1971549"/>
-        </p:xfrm>
-        <a:graphic>
-          <a:graphicData uri="http://schemas.openxmlformats.org/drawingml/2006/table">
-            <a:tbl>
-              <a:tblPr firstRow="1" bandRow="1">
-                <a:tableStyleId>{3B4B98B0-60AC-42C2-AFA5-B58CD77FA1E5}</a:tableStyleId>
-              </a:tblPr>
-              <a:tblGrid>
-                <a:gridCol w="1130445">
-                  <a:extLst>
-                    <a:ext uri="{9D8B030D-6E8A-4147-A177-3AD203B41FA5}">
-                      <a16:colId xmlns:a16="http://schemas.microsoft.com/office/drawing/2014/main" val="1628376606"/>
-                    </a:ext>
-                  </a:extLst>
-                </a:gridCol>
-                <a:gridCol w="1561076">
-                  <a:extLst>
-                    <a:ext uri="{9D8B030D-6E8A-4147-A177-3AD203B41FA5}">
-                      <a16:colId xmlns:a16="http://schemas.microsoft.com/office/drawing/2014/main" val="3537171461"/>
-                    </a:ext>
-                  </a:extLst>
-                </a:gridCol>
-                <a:gridCol w="1307487">
-                  <a:extLst>
-                    <a:ext uri="{9D8B030D-6E8A-4147-A177-3AD203B41FA5}">
-                      <a16:colId xmlns:a16="http://schemas.microsoft.com/office/drawing/2014/main" val="2534363247"/>
-                    </a:ext>
-                  </a:extLst>
-                </a:gridCol>
-                <a:gridCol w="1874054">
-                  <a:extLst>
-                    <a:ext uri="{9D8B030D-6E8A-4147-A177-3AD203B41FA5}">
-                      <a16:colId xmlns:a16="http://schemas.microsoft.com/office/drawing/2014/main" val="3554354182"/>
-                    </a:ext>
-                  </a:extLst>
-                </a:gridCol>
-              </a:tblGrid>
-              <a:tr h="1081138">
-                <a:tc>
-                  <a:txBody>
-                    <a:bodyPr/>
-                    <a:lstStyle/>
-                    <a:p>
-                      <a:r>
-                        <a:rPr lang="en-US" sz="1600" dirty="0"/>
-                        <a:t>RESULTS for $</a:t>
-                      </a:r>
-                      <a:endParaRPr lang="en-US" sz="1600" dirty="0">
-                        <a:solidFill>
-                          <a:schemeClr val="tx1"/>
-                        </a:solidFill>
-                      </a:endParaRPr>
-                    </a:p>
-                  </a:txBody>
-                  <a:tcPr/>
-                </a:tc>
-                <a:tc>
-                  <a:txBody>
-                    <a:bodyPr/>
-                    <a:lstStyle/>
-                    <a:p>
-                      <a:r>
-                        <a:rPr lang="en-US" sz="1200" dirty="0"/>
-                        <a:t>Linear</a:t>
-                      </a:r>
-                    </a:p>
-                  </a:txBody>
-                  <a:tcPr>
-                    <a:solidFill>
-                      <a:schemeClr val="bg2"/>
-                    </a:solidFill>
-                  </a:tcPr>
-                </a:tc>
-                <a:tc>
-                  <a:txBody>
-                    <a:bodyPr/>
-                    <a:lstStyle/>
-                    <a:p>
-                      <a:r>
-                        <a:rPr lang="en-US" sz="1200" dirty="0"/>
-                        <a:t>LassoCV</a:t>
-                      </a:r>
-                    </a:p>
-                  </a:txBody>
-                  <a:tcPr>
-                    <a:solidFill>
-                      <a:schemeClr val="bg2"/>
-                    </a:solidFill>
-                  </a:tcPr>
-                </a:tc>
-                <a:tc>
-                  <a:txBody>
-                    <a:bodyPr/>
-                    <a:lstStyle/>
-                    <a:p>
-                      <a:r>
-                        <a:rPr lang="en-US" sz="1200" dirty="0"/>
-                        <a:t>Elastic Net</a:t>
-                      </a:r>
-                    </a:p>
-                  </a:txBody>
-                  <a:tcPr>
-                    <a:solidFill>
-                      <a:schemeClr val="bg2"/>
-                    </a:solidFill>
-                  </a:tcPr>
-                </a:tc>
-                <a:extLst>
-                  <a:ext uri="{0D108BD9-81ED-4DB2-BD59-A6C34878D82A}">
-                    <a16:rowId xmlns:a16="http://schemas.microsoft.com/office/drawing/2014/main" val="1637909296"/>
-                  </a:ext>
-                </a:extLst>
-              </a:tr>
-              <a:tr h="530032">
-                <a:tc>
-                  <a:txBody>
-                    <a:bodyPr/>
-                    <a:lstStyle/>
-                    <a:p>
-                      <a:r>
-                        <a:rPr lang="en-US" sz="1200" dirty="0"/>
-                        <a:t>Test RMSE</a:t>
-                      </a:r>
-                    </a:p>
-                  </a:txBody>
-                  <a:tcPr/>
-                </a:tc>
-                <a:tc>
-                  <a:txBody>
-                    <a:bodyPr/>
-                    <a:lstStyle/>
-                    <a:p>
-                      <a:r>
-                        <a:rPr lang="en-US" sz="1200" dirty="0"/>
-                        <a:t>346.4495</a:t>
-                      </a:r>
-                    </a:p>
-                  </a:txBody>
-                  <a:tcPr/>
-                </a:tc>
-                <a:tc>
-                  <a:txBody>
-                    <a:bodyPr/>
-                    <a:lstStyle/>
-                    <a:p>
-                      <a:r>
-                        <a:rPr lang="en-US" sz="1200" dirty="0"/>
-                        <a:t>346.2505</a:t>
-                      </a:r>
-                    </a:p>
-                  </a:txBody>
-                  <a:tcPr/>
-                </a:tc>
-                <a:tc>
-                  <a:txBody>
-                    <a:bodyPr/>
-                    <a:lstStyle/>
-                    <a:p>
-                      <a:r>
-                        <a:rPr lang="en-US" sz="1200" dirty="0"/>
-                        <a:t>346.4526</a:t>
-                      </a:r>
-                    </a:p>
-                  </a:txBody>
-                  <a:tcPr/>
-                </a:tc>
-                <a:extLst>
-                  <a:ext uri="{0D108BD9-81ED-4DB2-BD59-A6C34878D82A}">
-                    <a16:rowId xmlns:a16="http://schemas.microsoft.com/office/drawing/2014/main" val="3035129995"/>
-                  </a:ext>
-                </a:extLst>
-              </a:tr>
-              <a:tr h="360379">
-                <a:tc>
-                  <a:txBody>
-                    <a:bodyPr/>
-                    <a:lstStyle/>
-                    <a:p>
-                      <a:r>
-                        <a:rPr lang="en-US" sz="1200" dirty="0"/>
-                        <a:t>Test r</a:t>
-                      </a:r>
-                      <a:r>
-                        <a:rPr lang="en-US" sz="1200" baseline="30000" dirty="0"/>
-                        <a:t>2</a:t>
-                      </a:r>
-                    </a:p>
-                  </a:txBody>
-                  <a:tcPr/>
-                </a:tc>
-                <a:tc>
-                  <a:txBody>
-                    <a:bodyPr/>
-                    <a:lstStyle/>
-                    <a:p>
-                      <a:r>
-                        <a:rPr lang="en-US" sz="1200" dirty="0"/>
-                        <a:t>81.08%</a:t>
-                      </a:r>
-                    </a:p>
-                  </a:txBody>
-                  <a:tcPr/>
-                </a:tc>
-                <a:tc>
-                  <a:txBody>
-                    <a:bodyPr/>
-                    <a:lstStyle/>
-                    <a:p>
-                      <a:r>
-                        <a:rPr lang="en-US" sz="1200" dirty="0"/>
-                        <a:t>81.11%</a:t>
-                      </a:r>
-                    </a:p>
-                  </a:txBody>
-                  <a:tcPr/>
-                </a:tc>
-                <a:tc>
-                  <a:txBody>
-                    <a:bodyPr/>
-                    <a:lstStyle/>
-                    <a:p>
-                      <a:r>
-                        <a:rPr lang="en-US" sz="1200" dirty="0"/>
-                        <a:t>81.08%</a:t>
-                      </a:r>
-                    </a:p>
-                  </a:txBody>
-                  <a:tcPr/>
-                </a:tc>
-                <a:extLst>
-                  <a:ext uri="{0D108BD9-81ED-4DB2-BD59-A6C34878D82A}">
-                    <a16:rowId xmlns:a16="http://schemas.microsoft.com/office/drawing/2014/main" val="3998100381"/>
-                  </a:ext>
-                </a:extLst>
-              </a:tr>
-            </a:tbl>
-          </a:graphicData>
-        </a:graphic>
-      </p:graphicFrame>
-      <p:sp>
-        <p:nvSpPr>
-          <p:cNvPr id="40" name="Arrow: Right 39">
-            <a:extLst>
-              <a:ext uri="{FF2B5EF4-FFF2-40B4-BE49-F238E27FC236}">
-                <a16:creationId xmlns:a16="http://schemas.microsoft.com/office/drawing/2014/main" id="{DE470760-77B6-4DA0-BFE4-61CBDABB9866}"/>
-              </a:ext>
-            </a:extLst>
-          </p:cNvPr>
-          <p:cNvSpPr/>
-          <p:nvPr/>
-        </p:nvSpPr>
-        <p:spPr>
-          <a:xfrm>
-            <a:off x="3399183" y="1093302"/>
-            <a:ext cx="291135" cy="168965"/>
-          </a:xfrm>
-          <a:prstGeom prst="rightArrow">
-            <a:avLst/>
-          </a:prstGeom>
-        </p:spPr>
-        <p:style>
-          <a:lnRef idx="2">
-            <a:schemeClr val="accent1">
-              <a:shade val="50000"/>
-            </a:schemeClr>
-          </a:lnRef>
-          <a:fillRef idx="1">
-            <a:schemeClr val="accent1"/>
-          </a:fillRef>
-          <a:effectRef idx="0">
-            <a:schemeClr val="accent1"/>
-          </a:effectRef>
-          <a:fontRef idx="minor">
-            <a:schemeClr val="lt1"/>
-          </a:fontRef>
-        </p:style>
-        <p:txBody>
-          <a:bodyPr rtlCol="0" anchor="ctr"/>
-          <a:lstStyle/>
-          <a:p>
-            <a:pPr algn="ctr"/>
-            <a:endParaRPr lang="en-US"/>
-          </a:p>
-        </p:txBody>
-      </p:sp>
-      <p:sp>
-        <p:nvSpPr>
-          <p:cNvPr id="41" name="Arrow: Right 40">
-            <a:extLst>
-              <a:ext uri="{FF2B5EF4-FFF2-40B4-BE49-F238E27FC236}">
-                <a16:creationId xmlns:a16="http://schemas.microsoft.com/office/drawing/2014/main" id="{D9F80517-458A-487B-98D3-5A87E9DE1DE3}"/>
-              </a:ext>
-            </a:extLst>
-          </p:cNvPr>
-          <p:cNvSpPr/>
-          <p:nvPr/>
-        </p:nvSpPr>
-        <p:spPr>
-          <a:xfrm>
-            <a:off x="6164301" y="1071985"/>
-            <a:ext cx="291135" cy="168965"/>
-          </a:xfrm>
-          <a:prstGeom prst="rightArrow">
-            <a:avLst/>
-          </a:prstGeom>
-        </p:spPr>
-        <p:style>
-          <a:lnRef idx="2">
-            <a:schemeClr val="accent1">
-              <a:shade val="50000"/>
-            </a:schemeClr>
-          </a:lnRef>
-          <a:fillRef idx="1">
-            <a:schemeClr val="accent1"/>
-          </a:fillRef>
-          <a:effectRef idx="0">
-            <a:schemeClr val="accent1"/>
-          </a:effectRef>
-          <a:fontRef idx="minor">
-            <a:schemeClr val="lt1"/>
-          </a:fontRef>
-        </p:style>
-        <p:txBody>
-          <a:bodyPr rtlCol="0" anchor="ctr"/>
-          <a:lstStyle/>
-          <a:p>
-            <a:pPr algn="ctr"/>
-            <a:endParaRPr lang="en-US"/>
-          </a:p>
-        </p:txBody>
-      </p:sp>
-      <p:pic>
-        <p:nvPicPr>
-          <p:cNvPr id="6" name="Picture 5">
-            <a:extLst>
-              <a:ext uri="{FF2B5EF4-FFF2-40B4-BE49-F238E27FC236}">
-                <a16:creationId xmlns:a16="http://schemas.microsoft.com/office/drawing/2014/main" id="{A3F6FCB1-101E-4F84-B2F4-CFE85833AB6A}"/>
-              </a:ext>
-            </a:extLst>
-          </p:cNvPr>
-          <p:cNvPicPr>
-            <a:picLocks noChangeAspect="1"/>
-          </p:cNvPicPr>
-          <p:nvPr/>
-        </p:nvPicPr>
-        <p:blipFill>
-          <a:blip r:embed="rId2">
-            <a:extLst>
-              <a:ext uri="{28A0092B-C50C-407E-A947-70E740481C1C}">
-                <a14:useLocalDpi xmlns:a14="http://schemas.microsoft.com/office/drawing/2010/main" val="0"/>
-              </a:ext>
-            </a:extLst>
-          </a:blip>
-          <a:stretch>
-            <a:fillRect/>
-          </a:stretch>
-        </p:blipFill>
-        <p:spPr>
-          <a:xfrm>
-            <a:off x="2763081" y="4219023"/>
-            <a:ext cx="3904049" cy="2800105"/>
-          </a:xfrm>
-          <a:prstGeom prst="rect">
-            <a:avLst/>
-          </a:prstGeom>
-        </p:spPr>
-      </p:pic>
-    </p:spTree>
-    <p:extLst>
-      <p:ext uri="{BB962C8B-B14F-4D97-AF65-F5344CB8AC3E}">
-        <p14:creationId xmlns:p14="http://schemas.microsoft.com/office/powerpoint/2010/main" val="1142068182"/>
-      </p:ext>
-    </p:extLst>
-  </p:cSld>
-  <p:clrMapOvr>
-    <a:masterClrMapping/>
-  </p:clrMapOvr>
-</p:sld>
-</file>
-
-<file path=ppt/slides/slide7.xml><?xml version="1.0" encoding="utf-8"?>
+<file path=ppt/slides/slide9.xml><?xml version="1.0" encoding="utf-8"?>
 <p:sld xmlns:a="http://schemas.openxmlformats.org/drawingml/2006/main" xmlns:r="http://schemas.openxmlformats.org/officeDocument/2006/relationships" xmlns:p="http://schemas.openxmlformats.org/presentationml/2006/main">
   <p:cSld>
     <p:spTree>
@@ -9329,7 +11483,7 @@
         </p:blipFill>
         <p:spPr>
           <a:xfrm>
-            <a:off x="130036" y="162133"/>
+            <a:off x="130036" y="92559"/>
             <a:ext cx="8284462" cy="4499320"/>
           </a:xfrm>
           <a:prstGeom prst="rect">
@@ -9605,4 +11759,299 @@
     </a:ext>
   </a:extLst>
 </a:theme>
+</file>
+
+<file path=ppt/theme/theme2.xml><?xml version="1.0" encoding="utf-8"?>
+<a:theme xmlns:a="http://schemas.openxmlformats.org/drawingml/2006/main" name="Office Theme">
+  <a:themeElements>
+    <a:clrScheme name="Office">
+      <a:dk1>
+        <a:sysClr val="windowText" lastClr="000000"/>
+      </a:dk1>
+      <a:lt1>
+        <a:sysClr val="window" lastClr="FFFFFF"/>
+      </a:lt1>
+      <a:dk2>
+        <a:srgbClr val="44546A"/>
+      </a:dk2>
+      <a:lt2>
+        <a:srgbClr val="E7E6E6"/>
+      </a:lt2>
+      <a:accent1>
+        <a:srgbClr val="4472C4"/>
+      </a:accent1>
+      <a:accent2>
+        <a:srgbClr val="ED7D31"/>
+      </a:accent2>
+      <a:accent3>
+        <a:srgbClr val="A5A5A5"/>
+      </a:accent3>
+      <a:accent4>
+        <a:srgbClr val="FFC000"/>
+      </a:accent4>
+      <a:accent5>
+        <a:srgbClr val="5B9BD5"/>
+      </a:accent5>
+      <a:accent6>
+        <a:srgbClr val="70AD47"/>
+      </a:accent6>
+      <a:hlink>
+        <a:srgbClr val="0563C1"/>
+      </a:hlink>
+      <a:folHlink>
+        <a:srgbClr val="954F72"/>
+      </a:folHlink>
+    </a:clrScheme>
+    <a:fontScheme name="Office">
+      <a:majorFont>
+        <a:latin typeface="Calibri Light" panose="020F0302020204030204"/>
+        <a:ea typeface=""/>
+        <a:cs typeface=""/>
+        <a:font script="Jpan" typeface="游ゴシック Light"/>
+        <a:font script="Hang" typeface="맑은 고딕"/>
+        <a:font script="Hans" typeface="等线 Light"/>
+        <a:font script="Hant" typeface="新細明體"/>
+        <a:font script="Arab" typeface="Times New Roman"/>
+        <a:font script="Hebr" typeface="Times New Roman"/>
+        <a:font script="Thai" typeface="Angsana New"/>
+        <a:font script="Ethi" typeface="Nyala"/>
+        <a:font script="Beng" typeface="Vrinda"/>
+        <a:font script="Gujr" typeface="Shruti"/>
+        <a:font script="Khmr" typeface="MoolBoran"/>
+        <a:font script="Knda" typeface="Tunga"/>
+        <a:font script="Guru" typeface="Raavi"/>
+        <a:font script="Cans" typeface="Euphemia"/>
+        <a:font script="Cher" typeface="Plantagenet Cherokee"/>
+        <a:font script="Yiii" typeface="Microsoft Yi Baiti"/>
+        <a:font script="Tibt" typeface="Microsoft Himalaya"/>
+        <a:font script="Thaa" typeface="MV Boli"/>
+        <a:font script="Deva" typeface="Mangal"/>
+        <a:font script="Telu" typeface="Gautami"/>
+        <a:font script="Taml" typeface="Latha"/>
+        <a:font script="Syrc" typeface="Estrangelo Edessa"/>
+        <a:font script="Orya" typeface="Kalinga"/>
+        <a:font script="Mlym" typeface="Kartika"/>
+        <a:font script="Laoo" typeface="DokChampa"/>
+        <a:font script="Sinh" typeface="Iskoola Pota"/>
+        <a:font script="Mong" typeface="Mongolian Baiti"/>
+        <a:font script="Viet" typeface="Times New Roman"/>
+        <a:font script="Uigh" typeface="Microsoft Uighur"/>
+        <a:font script="Geor" typeface="Sylfaen"/>
+        <a:font script="Armn" typeface="Arial"/>
+        <a:font script="Bugi" typeface="Leelawadee UI"/>
+        <a:font script="Bopo" typeface="Microsoft JhengHei"/>
+        <a:font script="Java" typeface="Javanese Text"/>
+        <a:font script="Lisu" typeface="Segoe UI"/>
+        <a:font script="Mymr" typeface="Myanmar Text"/>
+        <a:font script="Nkoo" typeface="Ebrima"/>
+        <a:font script="Olck" typeface="Nirmala UI"/>
+        <a:font script="Osma" typeface="Ebrima"/>
+        <a:font script="Phag" typeface="Phagspa"/>
+        <a:font script="Syrn" typeface="Estrangelo Edessa"/>
+        <a:font script="Syrj" typeface="Estrangelo Edessa"/>
+        <a:font script="Syre" typeface="Estrangelo Edessa"/>
+        <a:font script="Sora" typeface="Nirmala UI"/>
+        <a:font script="Tale" typeface="Microsoft Tai Le"/>
+        <a:font script="Talu" typeface="Microsoft New Tai Lue"/>
+        <a:font script="Tfng" typeface="Ebrima"/>
+      </a:majorFont>
+      <a:minorFont>
+        <a:latin typeface="Calibri" panose="020F0502020204030204"/>
+        <a:ea typeface=""/>
+        <a:cs typeface=""/>
+        <a:font script="Jpan" typeface="游ゴシック"/>
+        <a:font script="Hang" typeface="맑은 고딕"/>
+        <a:font script="Hans" typeface="等线"/>
+        <a:font script="Hant" typeface="新細明體"/>
+        <a:font script="Arab" typeface="Arial"/>
+        <a:font script="Hebr" typeface="Arial"/>
+        <a:font script="Thai" typeface="Cordia New"/>
+        <a:font script="Ethi" typeface="Nyala"/>
+        <a:font script="Beng" typeface="Vrinda"/>
+        <a:font script="Gujr" typeface="Shruti"/>
+        <a:font script="Khmr" typeface="DaunPenh"/>
+        <a:font script="Knda" typeface="Tunga"/>
+        <a:font script="Guru" typeface="Raavi"/>
+        <a:font script="Cans" typeface="Euphemia"/>
+        <a:font script="Cher" typeface="Plantagenet Cherokee"/>
+        <a:font script="Yiii" typeface="Microsoft Yi Baiti"/>
+        <a:font script="Tibt" typeface="Microsoft Himalaya"/>
+        <a:font script="Thaa" typeface="MV Boli"/>
+        <a:font script="Deva" typeface="Mangal"/>
+        <a:font script="Telu" typeface="Gautami"/>
+        <a:font script="Taml" typeface="Latha"/>
+        <a:font script="Syrc" typeface="Estrangelo Edessa"/>
+        <a:font script="Orya" typeface="Kalinga"/>
+        <a:font script="Mlym" typeface="Kartika"/>
+        <a:font script="Laoo" typeface="DokChampa"/>
+        <a:font script="Sinh" typeface="Iskoola Pota"/>
+        <a:font script="Mong" typeface="Mongolian Baiti"/>
+        <a:font script="Viet" typeface="Arial"/>
+        <a:font script="Uigh" typeface="Microsoft Uighur"/>
+        <a:font script="Geor" typeface="Sylfaen"/>
+        <a:font script="Armn" typeface="Arial"/>
+        <a:font script="Bugi" typeface="Leelawadee UI"/>
+        <a:font script="Bopo" typeface="Microsoft JhengHei"/>
+        <a:font script="Java" typeface="Javanese Text"/>
+        <a:font script="Lisu" typeface="Segoe UI"/>
+        <a:font script="Mymr" typeface="Myanmar Text"/>
+        <a:font script="Nkoo" typeface="Ebrima"/>
+        <a:font script="Olck" typeface="Nirmala UI"/>
+        <a:font script="Osma" typeface="Ebrima"/>
+        <a:font script="Phag" typeface="Phagspa"/>
+        <a:font script="Syrn" typeface="Estrangelo Edessa"/>
+        <a:font script="Syrj" typeface="Estrangelo Edessa"/>
+        <a:font script="Syre" typeface="Estrangelo Edessa"/>
+        <a:font script="Sora" typeface="Nirmala UI"/>
+        <a:font script="Tale" typeface="Microsoft Tai Le"/>
+        <a:font script="Talu" typeface="Microsoft New Tai Lue"/>
+        <a:font script="Tfng" typeface="Ebrima"/>
+      </a:minorFont>
+    </a:fontScheme>
+    <a:fmtScheme name="Office">
+      <a:fillStyleLst>
+        <a:solidFill>
+          <a:schemeClr val="phClr"/>
+        </a:solidFill>
+        <a:gradFill rotWithShape="1">
+          <a:gsLst>
+            <a:gs pos="0">
+              <a:schemeClr val="phClr">
+                <a:lumMod val="110000"/>
+                <a:satMod val="105000"/>
+                <a:tint val="67000"/>
+              </a:schemeClr>
+            </a:gs>
+            <a:gs pos="50000">
+              <a:schemeClr val="phClr">
+                <a:lumMod val="105000"/>
+                <a:satMod val="103000"/>
+                <a:tint val="73000"/>
+              </a:schemeClr>
+            </a:gs>
+            <a:gs pos="100000">
+              <a:schemeClr val="phClr">
+                <a:lumMod val="105000"/>
+                <a:satMod val="109000"/>
+                <a:tint val="81000"/>
+              </a:schemeClr>
+            </a:gs>
+          </a:gsLst>
+          <a:lin ang="5400000" scaled="0"/>
+        </a:gradFill>
+        <a:gradFill rotWithShape="1">
+          <a:gsLst>
+            <a:gs pos="0">
+              <a:schemeClr val="phClr">
+                <a:satMod val="103000"/>
+                <a:lumMod val="102000"/>
+                <a:tint val="94000"/>
+              </a:schemeClr>
+            </a:gs>
+            <a:gs pos="50000">
+              <a:schemeClr val="phClr">
+                <a:satMod val="110000"/>
+                <a:lumMod val="100000"/>
+                <a:shade val="100000"/>
+              </a:schemeClr>
+            </a:gs>
+            <a:gs pos="100000">
+              <a:schemeClr val="phClr">
+                <a:lumMod val="99000"/>
+                <a:satMod val="120000"/>
+                <a:shade val="78000"/>
+              </a:schemeClr>
+            </a:gs>
+          </a:gsLst>
+          <a:lin ang="5400000" scaled="0"/>
+        </a:gradFill>
+      </a:fillStyleLst>
+      <a:lnStyleLst>
+        <a:ln w="6350" cap="flat" cmpd="sng" algn="ctr">
+          <a:solidFill>
+            <a:schemeClr val="phClr"/>
+          </a:solidFill>
+          <a:prstDash val="solid"/>
+          <a:miter lim="800000"/>
+        </a:ln>
+        <a:ln w="12700" cap="flat" cmpd="sng" algn="ctr">
+          <a:solidFill>
+            <a:schemeClr val="phClr"/>
+          </a:solidFill>
+          <a:prstDash val="solid"/>
+          <a:miter lim="800000"/>
+        </a:ln>
+        <a:ln w="19050" cap="flat" cmpd="sng" algn="ctr">
+          <a:solidFill>
+            <a:schemeClr val="phClr"/>
+          </a:solidFill>
+          <a:prstDash val="solid"/>
+          <a:miter lim="800000"/>
+        </a:ln>
+      </a:lnStyleLst>
+      <a:effectStyleLst>
+        <a:effectStyle>
+          <a:effectLst/>
+        </a:effectStyle>
+        <a:effectStyle>
+          <a:effectLst/>
+        </a:effectStyle>
+        <a:effectStyle>
+          <a:effectLst>
+            <a:outerShdw blurRad="57150" dist="19050" dir="5400000" algn="ctr" rotWithShape="0">
+              <a:srgbClr val="000000">
+                <a:alpha val="63000"/>
+              </a:srgbClr>
+            </a:outerShdw>
+          </a:effectLst>
+        </a:effectStyle>
+      </a:effectStyleLst>
+      <a:bgFillStyleLst>
+        <a:solidFill>
+          <a:schemeClr val="phClr"/>
+        </a:solidFill>
+        <a:solidFill>
+          <a:schemeClr val="phClr">
+            <a:tint val="95000"/>
+            <a:satMod val="170000"/>
+          </a:schemeClr>
+        </a:solidFill>
+        <a:gradFill rotWithShape="1">
+          <a:gsLst>
+            <a:gs pos="0">
+              <a:schemeClr val="phClr">
+                <a:tint val="93000"/>
+                <a:satMod val="150000"/>
+                <a:shade val="98000"/>
+                <a:lumMod val="102000"/>
+              </a:schemeClr>
+            </a:gs>
+            <a:gs pos="50000">
+              <a:schemeClr val="phClr">
+                <a:tint val="98000"/>
+                <a:satMod val="130000"/>
+                <a:shade val="90000"/>
+                <a:lumMod val="103000"/>
+              </a:schemeClr>
+            </a:gs>
+            <a:gs pos="100000">
+              <a:schemeClr val="phClr">
+                <a:shade val="63000"/>
+                <a:satMod val="120000"/>
+              </a:schemeClr>
+            </a:gs>
+          </a:gsLst>
+          <a:lin ang="5400000" scaled="0"/>
+        </a:gradFill>
+      </a:bgFillStyleLst>
+    </a:fmtScheme>
+  </a:themeElements>
+  <a:objectDefaults/>
+  <a:extraClrSchemeLst/>
+  <a:extLst>
+    <a:ext uri="{05A4C25C-085E-4340-85A3-A5531E510DB2}">
+      <thm15:themeFamily xmlns:thm15="http://schemas.microsoft.com/office/thememl/2012/main" name="Office Theme" id="{62F939B6-93AF-4DB8-9C6B-D6C7DFDC589F}" vid="{4A3C46E8-61CC-4603-A589-7422A47A8E4A}"/>
+    </a:ext>
+  </a:extLst>
+</a:theme>
 </file>
</xml_diff>

<commit_message>
Pushing changes made to feature select, and presentation
</commit_message>
<xml_diff>
--- a/PresentationSlide.pptx
+++ b/PresentationSlide.pptx
@@ -10,7 +10,7 @@
   <p:sldIdLst>
     <p:sldId id="263" r:id="rId2"/>
     <p:sldId id="257" r:id="rId3"/>
-    <p:sldId id="258" r:id="rId4"/>
+    <p:sldId id="272" r:id="rId4"/>
     <p:sldId id="265" r:id="rId5"/>
     <p:sldId id="266" r:id="rId6"/>
     <p:sldId id="271" r:id="rId7"/>
@@ -209,7 +209,7 @@
           <a:p>
             <a:fld id="{56736620-B21F-45EF-A4D5-5E8A85A3D184}" type="datetimeFigureOut">
               <a:rPr lang="en-US" smtClean="0"/>
-              <a:t>5/15/2019</a:t>
+              <a:t>5/16/2019</a:t>
             </a:fld>
             <a:endParaRPr lang="en-US"/>
           </a:p>
@@ -1847,7 +1847,7 @@
           <a:p>
             <a:fld id="{7A82A0F7-BB1D-413C-A3FC-04CC3F8F42C9}" type="datetimeFigureOut">
               <a:rPr lang="en-US" smtClean="0"/>
-              <a:t>5/15/2019</a:t>
+              <a:t>5/16/2019</a:t>
             </a:fld>
             <a:endParaRPr lang="en-US"/>
           </a:p>
@@ -2098,7 +2098,7 @@
           <a:p>
             <a:fld id="{7A82A0F7-BB1D-413C-A3FC-04CC3F8F42C9}" type="datetimeFigureOut">
               <a:rPr lang="en-US" smtClean="0"/>
-              <a:t>5/15/2019</a:t>
+              <a:t>5/16/2019</a:t>
             </a:fld>
             <a:endParaRPr lang="en-US"/>
           </a:p>
@@ -2412,7 +2412,7 @@
           <a:p>
             <a:fld id="{7A82A0F7-BB1D-413C-A3FC-04CC3F8F42C9}" type="datetimeFigureOut">
               <a:rPr lang="en-US" smtClean="0"/>
-              <a:t>5/15/2019</a:t>
+              <a:t>5/16/2019</a:t>
             </a:fld>
             <a:endParaRPr lang="en-US"/>
           </a:p>
@@ -2753,7 +2753,7 @@
           <a:p>
             <a:fld id="{7A82A0F7-BB1D-413C-A3FC-04CC3F8F42C9}" type="datetimeFigureOut">
               <a:rPr lang="en-US" smtClean="0"/>
-              <a:t>5/15/2019</a:t>
+              <a:t>5/16/2019</a:t>
             </a:fld>
             <a:endParaRPr lang="en-US"/>
           </a:p>
@@ -3067,7 +3067,7 @@
           <a:p>
             <a:fld id="{7A82A0F7-BB1D-413C-A3FC-04CC3F8F42C9}" type="datetimeFigureOut">
               <a:rPr lang="en-US" smtClean="0"/>
-              <a:t>5/15/2019</a:t>
+              <a:t>5/16/2019</a:t>
             </a:fld>
             <a:endParaRPr lang="en-US"/>
           </a:p>
@@ -3460,7 +3460,7 @@
           <a:p>
             <a:fld id="{7A82A0F7-BB1D-413C-A3FC-04CC3F8F42C9}" type="datetimeFigureOut">
               <a:rPr lang="en-US" smtClean="0"/>
-              <a:t>5/15/2019</a:t>
+              <a:t>5/16/2019</a:t>
             </a:fld>
             <a:endParaRPr lang="en-US"/>
           </a:p>
@@ -3630,7 +3630,7 @@
           <a:p>
             <a:fld id="{7A82A0F7-BB1D-413C-A3FC-04CC3F8F42C9}" type="datetimeFigureOut">
               <a:rPr lang="en-US" smtClean="0"/>
-              <a:t>5/15/2019</a:t>
+              <a:t>5/16/2019</a:t>
             </a:fld>
             <a:endParaRPr lang="en-US"/>
           </a:p>
@@ -3810,7 +3810,7 @@
           <a:p>
             <a:fld id="{7A82A0F7-BB1D-413C-A3FC-04CC3F8F42C9}" type="datetimeFigureOut">
               <a:rPr lang="en-US" smtClean="0"/>
-              <a:t>5/15/2019</a:t>
+              <a:t>5/16/2019</a:t>
             </a:fld>
             <a:endParaRPr lang="en-US"/>
           </a:p>
@@ -3986,7 +3986,7 @@
           <a:p>
             <a:fld id="{7A82A0F7-BB1D-413C-A3FC-04CC3F8F42C9}" type="datetimeFigureOut">
               <a:rPr lang="en-US" smtClean="0"/>
-              <a:t>5/15/2019</a:t>
+              <a:t>5/16/2019</a:t>
             </a:fld>
             <a:endParaRPr lang="en-US"/>
           </a:p>
@@ -4233,7 +4233,7 @@
           <a:p>
             <a:fld id="{7A82A0F7-BB1D-413C-A3FC-04CC3F8F42C9}" type="datetimeFigureOut">
               <a:rPr lang="en-US" smtClean="0"/>
-              <a:t>5/15/2019</a:t>
+              <a:t>5/16/2019</a:t>
             </a:fld>
             <a:endParaRPr lang="en-US"/>
           </a:p>
@@ -4465,7 +4465,7 @@
           <a:p>
             <a:fld id="{7A82A0F7-BB1D-413C-A3FC-04CC3F8F42C9}" type="datetimeFigureOut">
               <a:rPr lang="en-US" smtClean="0"/>
-              <a:t>5/15/2019</a:t>
+              <a:t>5/16/2019</a:t>
             </a:fld>
             <a:endParaRPr lang="en-US"/>
           </a:p>
@@ -4839,7 +4839,7 @@
           <a:p>
             <a:fld id="{7A82A0F7-BB1D-413C-A3FC-04CC3F8F42C9}" type="datetimeFigureOut">
               <a:rPr lang="en-US" smtClean="0"/>
-              <a:t>5/15/2019</a:t>
+              <a:t>5/16/2019</a:t>
             </a:fld>
             <a:endParaRPr lang="en-US"/>
           </a:p>
@@ -4962,7 +4962,7 @@
           <a:p>
             <a:fld id="{7A82A0F7-BB1D-413C-A3FC-04CC3F8F42C9}" type="datetimeFigureOut">
               <a:rPr lang="en-US" smtClean="0"/>
-              <a:t>5/15/2019</a:t>
+              <a:t>5/16/2019</a:t>
             </a:fld>
             <a:endParaRPr lang="en-US"/>
           </a:p>
@@ -5057,7 +5057,7 @@
           <a:p>
             <a:fld id="{7A82A0F7-BB1D-413C-A3FC-04CC3F8F42C9}" type="datetimeFigureOut">
               <a:rPr lang="en-US" smtClean="0"/>
-              <a:t>5/15/2019</a:t>
+              <a:t>5/16/2019</a:t>
             </a:fld>
             <a:endParaRPr lang="en-US"/>
           </a:p>
@@ -5312,7 +5312,7 @@
           <a:p>
             <a:fld id="{7A82A0F7-BB1D-413C-A3FC-04CC3F8F42C9}" type="datetimeFigureOut">
               <a:rPr lang="en-US" smtClean="0"/>
-              <a:t>5/15/2019</a:t>
+              <a:t>5/16/2019</a:t>
             </a:fld>
             <a:endParaRPr lang="en-US"/>
           </a:p>
@@ -5575,7 +5575,7 @@
           <a:p>
             <a:fld id="{7A82A0F7-BB1D-413C-A3FC-04CC3F8F42C9}" type="datetimeFigureOut">
               <a:rPr lang="en-US" smtClean="0"/>
-              <a:t>5/15/2019</a:t>
+              <a:t>5/16/2019</a:t>
             </a:fld>
             <a:endParaRPr lang="en-US"/>
           </a:p>
@@ -6318,7 +6318,7 @@
           <a:p>
             <a:fld id="{7A82A0F7-BB1D-413C-A3FC-04CC3F8F42C9}" type="datetimeFigureOut">
               <a:rPr lang="en-US" smtClean="0"/>
-              <a:t>5/15/2019</a:t>
+              <a:t>5/16/2019</a:t>
             </a:fld>
             <a:endParaRPr lang="en-US"/>
           </a:p>
@@ -12823,12 +12823,14 @@
         </p:nvSpPr>
         <p:spPr>
           <a:xfrm>
-            <a:off x="1127464" y="470517"/>
-            <a:ext cx="3116062" cy="435005"/>
+            <a:off x="1127463" y="326369"/>
+            <a:ext cx="3320250" cy="392722"/>
           </a:xfrm>
         </p:spPr>
         <p:txBody>
-          <a:bodyPr/>
+          <a:bodyPr>
+            <a:normAutofit fontScale="90000"/>
+          </a:bodyPr>
           <a:lstStyle/>
           <a:p>
             <a:r>
@@ -12838,41 +12840,6 @@
           </a:p>
         </p:txBody>
       </p:sp>
-      <p:pic>
-        <p:nvPicPr>
-          <p:cNvPr id="6" name="Content Placeholder 5">
-            <a:extLst>
-              <a:ext uri="{FF2B5EF4-FFF2-40B4-BE49-F238E27FC236}">
-                <a16:creationId xmlns:a16="http://schemas.microsoft.com/office/drawing/2014/main" id="{17023D77-B482-4B49-B5A9-F25757355299}"/>
-              </a:ext>
-            </a:extLst>
-          </p:cNvPr>
-          <p:cNvPicPr>
-            <a:picLocks noGrp="1" noChangeAspect="1"/>
-          </p:cNvPicPr>
-          <p:nvPr>
-            <p:ph idx="1"/>
-          </p:nvPr>
-        </p:nvPicPr>
-        <p:blipFill>
-          <a:blip r:embed="rId2">
-            <a:extLst>
-              <a:ext uri="{28A0092B-C50C-407E-A947-70E740481C1C}">
-                <a14:useLocalDpi xmlns:a14="http://schemas.microsoft.com/office/drawing/2010/main" val="0"/>
-              </a:ext>
-            </a:extLst>
-          </a:blip>
-          <a:stretch>
-            <a:fillRect/>
-          </a:stretch>
-        </p:blipFill>
-        <p:spPr>
-          <a:xfrm>
-            <a:off x="4580407" y="0"/>
-            <a:ext cx="4589533" cy="2707689"/>
-          </a:xfrm>
-        </p:spPr>
-      </p:pic>
       <p:sp>
         <p:nvSpPr>
           <p:cNvPr id="4" name="Text Placeholder 3">
@@ -12891,13 +12858,13 @@
         </p:nvSpPr>
         <p:spPr>
           <a:xfrm>
-            <a:off x="677336" y="1012055"/>
-            <a:ext cx="3770378" cy="2849731"/>
+            <a:off x="360396" y="639193"/>
+            <a:ext cx="4335891" cy="2433946"/>
           </a:xfrm>
         </p:spPr>
         <p:txBody>
           <a:bodyPr>
-            <a:normAutofit fontScale="40000" lnSpcReduction="20000"/>
+            <a:normAutofit fontScale="32500" lnSpcReduction="20000"/>
           </a:bodyPr>
           <a:lstStyle/>
           <a:p>
@@ -12933,7 +12900,7 @@
           <a:p>
             <a:r>
               <a:rPr lang="en-US" sz="2100" dirty="0"/>
-              <a:t>Low Importance Features-Identify features with Low importance (i.e. where cumulative importance is below the threshold of 98 %)</a:t>
+              <a:t>Low Importance Features-Identify features with Low importance (i.e. where cumulative importance is below the threshold of 95%)</a:t>
             </a:r>
           </a:p>
           <a:p>
@@ -12942,7 +12909,7 @@
           <a:p>
             <a:r>
               <a:rPr lang="en-US" sz="2100" dirty="0"/>
-              <a:t>After transformation and merging  initial set of features to begin with was 194 and with feature selection, the number of features that were identified as having an impact to the pricing or BTU was determined to be 86</a:t>
+              <a:t>After transformation and merging  initial set of features to begin with was 185 and with feature selection, the number of features that were identified as having an impact to the pricing or BTU was determined to be 91</a:t>
             </a:r>
           </a:p>
           <a:p>
@@ -12973,10 +12940,10 @@
       </p:sp>
       <p:pic>
         <p:nvPicPr>
-          <p:cNvPr id="8" name="Picture 7">
+          <p:cNvPr id="5" name="Picture 4">
             <a:extLst>
               <a:ext uri="{FF2B5EF4-FFF2-40B4-BE49-F238E27FC236}">
-                <a16:creationId xmlns:a16="http://schemas.microsoft.com/office/drawing/2014/main" id="{CF3F796C-70B4-4A89-AF5C-A3F75C038782}"/>
+                <a16:creationId xmlns:a16="http://schemas.microsoft.com/office/drawing/2014/main" id="{9E60A879-2195-436C-95BC-0157272A9142}"/>
               </a:ext>
             </a:extLst>
           </p:cNvPr>
@@ -12984,6 +12951,44 @@
             <a:picLocks noChangeAspect="1"/>
           </p:cNvPicPr>
           <p:nvPr/>
+        </p:nvPicPr>
+        <p:blipFill>
+          <a:blip r:embed="rId2">
+            <a:extLst>
+              <a:ext uri="{28A0092B-C50C-407E-A947-70E740481C1C}">
+                <a14:useLocalDpi xmlns:a14="http://schemas.microsoft.com/office/drawing/2010/main" val="0"/>
+              </a:ext>
+            </a:extLst>
+          </a:blip>
+          <a:stretch>
+            <a:fillRect/>
+          </a:stretch>
+        </p:blipFill>
+        <p:spPr>
+          <a:xfrm>
+            <a:off x="4770916" y="3073138"/>
+            <a:ext cx="4974346" cy="3621031"/>
+          </a:xfrm>
+          <a:prstGeom prst="rect">
+            <a:avLst/>
+          </a:prstGeom>
+        </p:spPr>
+      </p:pic>
+      <p:pic>
+        <p:nvPicPr>
+          <p:cNvPr id="12" name="Content Placeholder 11">
+            <a:extLst>
+              <a:ext uri="{FF2B5EF4-FFF2-40B4-BE49-F238E27FC236}">
+                <a16:creationId xmlns:a16="http://schemas.microsoft.com/office/drawing/2014/main" id="{A44F3521-DA0E-4DF7-8F9A-482D9B1C02AC}"/>
+              </a:ext>
+            </a:extLst>
+          </p:cNvPr>
+          <p:cNvPicPr>
+            <a:picLocks noGrp="1" noChangeAspect="1"/>
+          </p:cNvPicPr>
+          <p:nvPr>
+            <p:ph idx="1"/>
+          </p:nvPr>
         </p:nvPicPr>
         <p:blipFill>
           <a:blip r:embed="rId3">
@@ -12999,20 +13004,17 @@
         </p:blipFill>
         <p:spPr>
           <a:xfrm>
-            <a:off x="5202315" y="3172674"/>
-            <a:ext cx="4115133" cy="3086084"/>
+            <a:off x="4873658" y="326368"/>
+            <a:ext cx="4513262" cy="2746770"/>
           </a:xfrm>
-          <a:prstGeom prst="rect">
-            <a:avLst/>
-          </a:prstGeom>
         </p:spPr>
       </p:pic>
       <p:pic>
         <p:nvPicPr>
-          <p:cNvPr id="10" name="Picture 9">
+          <p:cNvPr id="16" name="Picture 15">
             <a:extLst>
               <a:ext uri="{FF2B5EF4-FFF2-40B4-BE49-F238E27FC236}">
-                <a16:creationId xmlns:a16="http://schemas.microsoft.com/office/drawing/2014/main" id="{F697EE75-49E4-49EA-A779-14CA01293DBB}"/>
+                <a16:creationId xmlns:a16="http://schemas.microsoft.com/office/drawing/2014/main" id="{417A4022-651D-4C2D-8339-E0B80044F432}"/>
               </a:ext>
             </a:extLst>
           </p:cNvPr>
@@ -13035,8 +13037,8 @@
         </p:blipFill>
         <p:spPr>
           <a:xfrm>
-            <a:off x="1127464" y="3223128"/>
-            <a:ext cx="3231472" cy="3506147"/>
+            <a:off x="360396" y="3344314"/>
+            <a:ext cx="3871013" cy="3784861"/>
           </a:xfrm>
           <a:prstGeom prst="rect">
             <a:avLst/>
@@ -13046,7 +13048,7 @@
     </p:spTree>
     <p:extLst>
       <p:ext uri="{BB962C8B-B14F-4D97-AF65-F5344CB8AC3E}">
-        <p14:creationId xmlns:p14="http://schemas.microsoft.com/office/powerpoint/2010/main" val="707371002"/>
+        <p14:creationId xmlns:p14="http://schemas.microsoft.com/office/powerpoint/2010/main" val="2872529695"/>
       </p:ext>
     </p:extLst>
   </p:cSld>

</xml_diff>

<commit_message>
Pushing changes to xgboost output
</commit_message>
<xml_diff>
--- a/PresentationSlide.pptx
+++ b/PresentationSlide.pptx
@@ -12007,7 +12007,11 @@
             <a:graphicFrameLocks noGrp="1"/>
           </p:cNvGraphicFramePr>
           <p:nvPr>
-            <p:extLst/>
+            <p:extLst>
+              <p:ext uri="{D42A27DB-BD31-4B8C-83A1-F6EECF244321}">
+                <p14:modId xmlns:p14="http://schemas.microsoft.com/office/powerpoint/2010/main" val="2778701468"/>
+              </p:ext>
+            </p:extLst>
           </p:nvPr>
         </p:nvGraphicFramePr>
         <p:xfrm>
@@ -12231,7 +12235,7 @@
                     <a:p>
                       <a:r>
                         <a:rPr lang="en-US" sz="1200" dirty="0"/>
-                        <a:t>578.14</a:t>
+                        <a:t>360.56</a:t>
                       </a:r>
                     </a:p>
                   </a:txBody>
@@ -12244,7 +12248,7 @@
                     <a:p>
                       <a:r>
                         <a:rPr lang="en-US" sz="1200" dirty="0"/>
-                        <a:t>478.54</a:t>
+                        <a:t>295.44</a:t>
                       </a:r>
                     </a:p>
                   </a:txBody>
@@ -12257,7 +12261,7 @@
                     <a:p>
                       <a:r>
                         <a:rPr lang="en-US" sz="1200" dirty="0"/>
-                        <a:t>464.93</a:t>
+                        <a:t>257.61</a:t>
                       </a:r>
                     </a:p>
                   </a:txBody>
@@ -12270,7 +12274,7 @@
                     <a:p>
                       <a:r>
                         <a:rPr lang="en-US" sz="1200" dirty="0"/>
-                        <a:t>459.51</a:t>
+                        <a:t>252.76</a:t>
                       </a:r>
                     </a:p>
                   </a:txBody>
@@ -12307,7 +12311,7 @@
                     <a:p>
                       <a:r>
                         <a:rPr lang="en-US" sz="1200" dirty="0"/>
-                        <a:t>74.3%</a:t>
+                        <a:t>79.07%</a:t>
                       </a:r>
                     </a:p>
                   </a:txBody>
@@ -12320,7 +12324,7 @@
                     <a:p>
                       <a:r>
                         <a:rPr lang="en-US" sz="1200" dirty="0"/>
-                        <a:t>82.39%</a:t>
+                        <a:t>85.95%</a:t>
                       </a:r>
                     </a:p>
                   </a:txBody>
@@ -12333,7 +12337,7 @@
                     <a:p>
                       <a:r>
                         <a:rPr lang="en-US" sz="1200" dirty="0"/>
-                        <a:t>83.38%</a:t>
+                        <a:t>89.32%</a:t>
                       </a:r>
                     </a:p>
                   </a:txBody>
@@ -12346,7 +12350,7 @@
                     <a:p>
                       <a:r>
                         <a:rPr lang="en-US" sz="1200" dirty="0"/>
-                        <a:t>83.77%</a:t>
+                        <a:t>89.67%</a:t>
                       </a:r>
                     </a:p>
                   </a:txBody>

</xml_diff>